<commit_message>
Pushing changes to some files for lec-31
</commit_message>
<xml_diff>
--- a/tyler/meena/cs220/s21/materials/lec_31_S21.pptx
+++ b/tyler/meena/cs220/s21/materials/lec_31_S21.pptx
@@ -367,6 +367,11 @@
       </a:defRPr>
     </a:lvl9pPr>
   </p:defaultTextStyle>
+  <p:extLst>
+    <p:ext uri="{EFAFB233-063F-42B5-8137-9DF3F51BA10A}">
+      <p15:sldGuideLst xmlns:p15="http://schemas.microsoft.com/office/powerpoint/2012/main"/>
+    </p:ext>
+  </p:extLst>
 </p:presentation>
 </file>
 
@@ -2185,7 +2190,7 @@
           </a:ln>
           <a:extLst>
             <a:ext uri="{C572A759-6A51-4108-AA02-DFA0A04FC94B}">
-              <ma14:wrappingTextBoxFlag xmlns:ma14="http://schemas.microsoft.com/office/mac/drawingml/2011/main" xmlns:a14="http://schemas.microsoft.com/office/drawing/2010/main" xmlns:m="http://schemas.openxmlformats.org/officeDocument/2006/math" xmlns="" val="1"/>
+              <ma14:wrappingTextBoxFlag xmlns="" xmlns:m="http://schemas.openxmlformats.org/officeDocument/2006/math" xmlns:a14="http://schemas.microsoft.com/office/drawing/2010/main" xmlns:ma14="http://schemas.microsoft.com/office/mac/drawingml/2011/main" val="1"/>
             </a:ext>
           </a:extLst>
         </p:spPr>
@@ -2224,7 +2229,7 @@
           </a:ln>
           <a:extLst>
             <a:ext uri="{C572A759-6A51-4108-AA02-DFA0A04FC94B}">
-              <ma14:wrappingTextBoxFlag xmlns:ma14="http://schemas.microsoft.com/office/mac/drawingml/2011/main" xmlns:a14="http://schemas.microsoft.com/office/drawing/2010/main" xmlns:m="http://schemas.openxmlformats.org/officeDocument/2006/math" xmlns="" val="1"/>
+              <ma14:wrappingTextBoxFlag xmlns="" xmlns:m="http://schemas.openxmlformats.org/officeDocument/2006/math" xmlns:a14="http://schemas.microsoft.com/office/drawing/2010/main" xmlns:ma14="http://schemas.microsoft.com/office/mac/drawingml/2011/main" val="1"/>
             </a:ext>
           </a:extLst>
         </p:spPr>
@@ -3123,7 +3128,9 @@
           </a:prstGeom>
         </p:spPr>
         <p:txBody>
-          <a:bodyPr/>
+          <a:bodyPr>
+            <a:normAutofit lnSpcReduction="10000"/>
+          </a:bodyPr>
           <a:lstStyle>
             <a:lvl1pPr>
               <a:defRPr>
@@ -3141,14 +3148,14 @@
               </a:spcBef>
             </a:pPr>
             <a:r>
-              <a:rPr lang="en-US" altLang="en-US" dirty="0"/>
+              <a:rPr lang="en-US" altLang="en-US" b="1" dirty="0"/>
               <a:t>Meena </a:t>
             </a:r>
             <a:r>
-              <a:rPr lang="en-US" altLang="en-US" dirty="0" err="1"/>
+              <a:rPr lang="en-US" altLang="en-US" b="1" dirty="0" err="1"/>
               <a:t>Syamkumar</a:t>
             </a:r>
-            <a:endParaRPr lang="en-US" altLang="en-US" dirty="0"/>
+            <a:endParaRPr lang="en-US" altLang="en-US" b="1" dirty="0"/>
           </a:p>
           <a:p>
             <a:pPr>
@@ -3157,14 +3164,14 @@
               </a:spcBef>
             </a:pPr>
             <a:r>
-              <a:rPr lang="en-US" altLang="en-US" dirty="0"/>
-              <a:t>Mike </a:t>
-            </a:r>
-            <a:r>
-              <a:rPr lang="en-US" altLang="en-US" dirty="0" err="1"/>
-              <a:t>Doescher</a:t>
-            </a:r>
-            <a:endParaRPr lang="en-US" altLang="en-US" dirty="0"/>
+              <a:rPr lang="en-US" altLang="en-US" b="1" dirty="0"/>
+              <a:t>Andy </a:t>
+            </a:r>
+            <a:r>
+              <a:rPr lang="en-US" altLang="en-US" b="1" dirty="0" err="1"/>
+              <a:t>Kuemmel</a:t>
+            </a:r>
+            <a:endParaRPr lang="en-US" altLang="en-US" b="1" dirty="0"/>
           </a:p>
         </p:txBody>
       </p:sp>
@@ -3430,7 +3437,7 @@
           </a:ln>
           <a:extLst>
             <a:ext uri="{C572A759-6A51-4108-AA02-DFA0A04FC94B}">
-              <ma14:wrappingTextBoxFlag xmlns:ma14="http://schemas.microsoft.com/office/mac/drawingml/2011/main" xmlns:a14="http://schemas.microsoft.com/office/drawing/2010/main" xmlns:m="http://schemas.openxmlformats.org/officeDocument/2006/math" xmlns="" val="1"/>
+              <ma14:wrappingTextBoxFlag xmlns="" xmlns:m="http://schemas.openxmlformats.org/officeDocument/2006/math" xmlns:a14="http://schemas.microsoft.com/office/drawing/2010/main" xmlns:ma14="http://schemas.microsoft.com/office/mac/drawingml/2011/main" val="1"/>
             </a:ext>
           </a:extLst>
         </p:spPr>
@@ -3465,7 +3472,7 @@
           </a:ln>
           <a:extLst>
             <a:ext uri="{C572A759-6A51-4108-AA02-DFA0A04FC94B}">
-              <ma14:wrappingTextBoxFlag xmlns:ma14="http://schemas.microsoft.com/office/mac/drawingml/2011/main" xmlns:a14="http://schemas.microsoft.com/office/drawing/2010/main" xmlns:m="http://schemas.openxmlformats.org/officeDocument/2006/math" xmlns="" val="1"/>
+              <ma14:wrappingTextBoxFlag xmlns="" xmlns:m="http://schemas.openxmlformats.org/officeDocument/2006/math" xmlns:a14="http://schemas.microsoft.com/office/drawing/2010/main" xmlns:ma14="http://schemas.microsoft.com/office/mac/drawingml/2011/main" val="1"/>
             </a:ext>
           </a:extLst>
         </p:spPr>
@@ -3500,7 +3507,7 @@
           </a:ln>
           <a:extLst>
             <a:ext uri="{C572A759-6A51-4108-AA02-DFA0A04FC94B}">
-              <ma14:wrappingTextBoxFlag xmlns:ma14="http://schemas.microsoft.com/office/mac/drawingml/2011/main" xmlns:a14="http://schemas.microsoft.com/office/drawing/2010/main" xmlns:m="http://schemas.openxmlformats.org/officeDocument/2006/math" xmlns="" val="1"/>
+              <ma14:wrappingTextBoxFlag xmlns="" xmlns:m="http://schemas.openxmlformats.org/officeDocument/2006/math" xmlns:a14="http://schemas.microsoft.com/office/drawing/2010/main" xmlns:ma14="http://schemas.microsoft.com/office/mac/drawingml/2011/main" val="1"/>
             </a:ext>
           </a:extLst>
         </p:spPr>
@@ -3546,7 +3553,7 @@
           </a:ln>
           <a:extLst>
             <a:ext uri="{C572A759-6A51-4108-AA02-DFA0A04FC94B}">
-              <ma14:wrappingTextBoxFlag xmlns:ma14="http://schemas.microsoft.com/office/mac/drawingml/2011/main" xmlns:a14="http://schemas.microsoft.com/office/drawing/2010/main" xmlns:m="http://schemas.openxmlformats.org/officeDocument/2006/math" xmlns="" val="1"/>
+              <ma14:wrappingTextBoxFlag xmlns="" xmlns:m="http://schemas.openxmlformats.org/officeDocument/2006/math" xmlns:a14="http://schemas.microsoft.com/office/drawing/2010/main" xmlns:ma14="http://schemas.microsoft.com/office/mac/drawingml/2011/main" val="1"/>
             </a:ext>
           </a:extLst>
         </p:spPr>
@@ -3880,7 +3887,7 @@
           </a:ln>
           <a:extLst>
             <a:ext uri="{C572A759-6A51-4108-AA02-DFA0A04FC94B}">
-              <ma14:wrappingTextBoxFlag xmlns:ma14="http://schemas.microsoft.com/office/mac/drawingml/2011/main" xmlns:a14="http://schemas.microsoft.com/office/drawing/2010/main" xmlns:m="http://schemas.openxmlformats.org/officeDocument/2006/math" xmlns="" val="1"/>
+              <ma14:wrappingTextBoxFlag xmlns="" xmlns:m="http://schemas.openxmlformats.org/officeDocument/2006/math" xmlns:a14="http://schemas.microsoft.com/office/drawing/2010/main" xmlns:ma14="http://schemas.microsoft.com/office/mac/drawingml/2011/main" val="1"/>
             </a:ext>
           </a:extLst>
         </p:spPr>
@@ -3915,7 +3922,7 @@
           </a:ln>
           <a:extLst>
             <a:ext uri="{C572A759-6A51-4108-AA02-DFA0A04FC94B}">
-              <ma14:wrappingTextBoxFlag xmlns:ma14="http://schemas.microsoft.com/office/mac/drawingml/2011/main" xmlns:a14="http://schemas.microsoft.com/office/drawing/2010/main" xmlns:m="http://schemas.openxmlformats.org/officeDocument/2006/math" xmlns="" val="1"/>
+              <ma14:wrappingTextBoxFlag xmlns="" xmlns:m="http://schemas.openxmlformats.org/officeDocument/2006/math" xmlns:a14="http://schemas.microsoft.com/office/drawing/2010/main" xmlns:ma14="http://schemas.microsoft.com/office/mac/drawingml/2011/main" val="1"/>
             </a:ext>
           </a:extLst>
         </p:spPr>
@@ -3950,7 +3957,7 @@
           </a:ln>
           <a:extLst>
             <a:ext uri="{C572A759-6A51-4108-AA02-DFA0A04FC94B}">
-              <ma14:wrappingTextBoxFlag xmlns:ma14="http://schemas.microsoft.com/office/mac/drawingml/2011/main" xmlns:a14="http://schemas.microsoft.com/office/drawing/2010/main" xmlns:m="http://schemas.openxmlformats.org/officeDocument/2006/math" xmlns="" val="1"/>
+              <ma14:wrappingTextBoxFlag xmlns="" xmlns:m="http://schemas.openxmlformats.org/officeDocument/2006/math" xmlns:a14="http://schemas.microsoft.com/office/drawing/2010/main" xmlns:ma14="http://schemas.microsoft.com/office/mac/drawingml/2011/main" val="1"/>
             </a:ext>
           </a:extLst>
         </p:spPr>
@@ -3996,7 +4003,7 @@
           </a:ln>
           <a:extLst>
             <a:ext uri="{C572A759-6A51-4108-AA02-DFA0A04FC94B}">
-              <ma14:wrappingTextBoxFlag xmlns:ma14="http://schemas.microsoft.com/office/mac/drawingml/2011/main" xmlns:a14="http://schemas.microsoft.com/office/drawing/2010/main" xmlns:m="http://schemas.openxmlformats.org/officeDocument/2006/math" xmlns="" val="1"/>
+              <ma14:wrappingTextBoxFlag xmlns="" xmlns:m="http://schemas.openxmlformats.org/officeDocument/2006/math" xmlns:a14="http://schemas.microsoft.com/office/drawing/2010/main" xmlns:ma14="http://schemas.microsoft.com/office/mac/drawingml/2011/main" val="1"/>
             </a:ext>
           </a:extLst>
         </p:spPr>
@@ -4093,7 +4100,7 @@
           </a:ln>
           <a:extLst>
             <a:ext uri="{C572A759-6A51-4108-AA02-DFA0A04FC94B}">
-              <ma14:wrappingTextBoxFlag xmlns:ma14="http://schemas.microsoft.com/office/mac/drawingml/2011/main" xmlns:a14="http://schemas.microsoft.com/office/drawing/2010/main" xmlns:m="http://schemas.openxmlformats.org/officeDocument/2006/math" xmlns="" val="1"/>
+              <ma14:wrappingTextBoxFlag xmlns="" xmlns:m="http://schemas.openxmlformats.org/officeDocument/2006/math" xmlns:a14="http://schemas.microsoft.com/office/drawing/2010/main" xmlns:ma14="http://schemas.microsoft.com/office/mac/drawingml/2011/main" val="1"/>
             </a:ext>
           </a:extLst>
         </p:spPr>
@@ -4135,7 +4142,7 @@
           </a:ln>
           <a:extLst>
             <a:ext uri="{C572A759-6A51-4108-AA02-DFA0A04FC94B}">
-              <ma14:wrappingTextBoxFlag xmlns:ma14="http://schemas.microsoft.com/office/mac/drawingml/2011/main" xmlns:a14="http://schemas.microsoft.com/office/drawing/2010/main" xmlns:m="http://schemas.openxmlformats.org/officeDocument/2006/math" xmlns="" val="1"/>
+              <ma14:wrappingTextBoxFlag xmlns="" xmlns:m="http://schemas.openxmlformats.org/officeDocument/2006/math" xmlns:a14="http://schemas.microsoft.com/office/drawing/2010/main" xmlns:ma14="http://schemas.microsoft.com/office/mac/drawingml/2011/main" val="1"/>
             </a:ext>
           </a:extLst>
         </p:spPr>
@@ -4424,7 +4431,7 @@
           </a:ln>
           <a:extLst>
             <a:ext uri="{C572A759-6A51-4108-AA02-DFA0A04FC94B}">
-              <ma14:wrappingTextBoxFlag xmlns:ma14="http://schemas.microsoft.com/office/mac/drawingml/2011/main" xmlns:a14="http://schemas.microsoft.com/office/drawing/2010/main" xmlns:m="http://schemas.openxmlformats.org/officeDocument/2006/math" xmlns="" val="1"/>
+              <ma14:wrappingTextBoxFlag xmlns="" xmlns:m="http://schemas.openxmlformats.org/officeDocument/2006/math" xmlns:a14="http://schemas.microsoft.com/office/drawing/2010/main" xmlns:ma14="http://schemas.microsoft.com/office/mac/drawingml/2011/main" val="1"/>
             </a:ext>
           </a:extLst>
         </p:spPr>
@@ -4459,7 +4466,7 @@
           </a:ln>
           <a:extLst>
             <a:ext uri="{C572A759-6A51-4108-AA02-DFA0A04FC94B}">
-              <ma14:wrappingTextBoxFlag xmlns:ma14="http://schemas.microsoft.com/office/mac/drawingml/2011/main" xmlns:a14="http://schemas.microsoft.com/office/drawing/2010/main" xmlns:m="http://schemas.openxmlformats.org/officeDocument/2006/math" xmlns="" val="1"/>
+              <ma14:wrappingTextBoxFlag xmlns="" xmlns:m="http://schemas.openxmlformats.org/officeDocument/2006/math" xmlns:a14="http://schemas.microsoft.com/office/drawing/2010/main" xmlns:ma14="http://schemas.microsoft.com/office/mac/drawingml/2011/main" val="1"/>
             </a:ext>
           </a:extLst>
         </p:spPr>
@@ -4494,7 +4501,7 @@
           </a:ln>
           <a:extLst>
             <a:ext uri="{C572A759-6A51-4108-AA02-DFA0A04FC94B}">
-              <ma14:wrappingTextBoxFlag xmlns:ma14="http://schemas.microsoft.com/office/mac/drawingml/2011/main" xmlns:a14="http://schemas.microsoft.com/office/drawing/2010/main" xmlns:m="http://schemas.openxmlformats.org/officeDocument/2006/math" xmlns="" val="1"/>
+              <ma14:wrappingTextBoxFlag xmlns="" xmlns:m="http://schemas.openxmlformats.org/officeDocument/2006/math" xmlns:a14="http://schemas.microsoft.com/office/drawing/2010/main" xmlns:ma14="http://schemas.microsoft.com/office/mac/drawingml/2011/main" val="1"/>
             </a:ext>
           </a:extLst>
         </p:spPr>
@@ -4540,7 +4547,7 @@
           </a:ln>
           <a:extLst>
             <a:ext uri="{C572A759-6A51-4108-AA02-DFA0A04FC94B}">
-              <ma14:wrappingTextBoxFlag xmlns:ma14="http://schemas.microsoft.com/office/mac/drawingml/2011/main" xmlns:a14="http://schemas.microsoft.com/office/drawing/2010/main" xmlns:m="http://schemas.openxmlformats.org/officeDocument/2006/math" xmlns="" val="1"/>
+              <ma14:wrappingTextBoxFlag xmlns="" xmlns:m="http://schemas.openxmlformats.org/officeDocument/2006/math" xmlns:a14="http://schemas.microsoft.com/office/drawing/2010/main" xmlns:ma14="http://schemas.microsoft.com/office/mac/drawingml/2011/main" val="1"/>
             </a:ext>
           </a:extLst>
         </p:spPr>
@@ -4637,7 +4644,7 @@
           </a:ln>
           <a:extLst>
             <a:ext uri="{C572A759-6A51-4108-AA02-DFA0A04FC94B}">
-              <ma14:wrappingTextBoxFlag xmlns:ma14="http://schemas.microsoft.com/office/mac/drawingml/2011/main" xmlns:a14="http://schemas.microsoft.com/office/drawing/2010/main" xmlns:m="http://schemas.openxmlformats.org/officeDocument/2006/math" xmlns="" val="1"/>
+              <ma14:wrappingTextBoxFlag xmlns="" xmlns:m="http://schemas.openxmlformats.org/officeDocument/2006/math" xmlns:a14="http://schemas.microsoft.com/office/drawing/2010/main" xmlns:ma14="http://schemas.microsoft.com/office/mac/drawingml/2011/main" val="1"/>
             </a:ext>
           </a:extLst>
         </p:spPr>
@@ -4922,7 +4929,7 @@
           </a:ln>
           <a:extLst>
             <a:ext uri="{C572A759-6A51-4108-AA02-DFA0A04FC94B}">
-              <ma14:wrappingTextBoxFlag xmlns:ma14="http://schemas.microsoft.com/office/mac/drawingml/2011/main" xmlns:a14="http://schemas.microsoft.com/office/drawing/2010/main" xmlns:m="http://schemas.openxmlformats.org/officeDocument/2006/math" xmlns="" val="1"/>
+              <ma14:wrappingTextBoxFlag xmlns="" xmlns:m="http://schemas.openxmlformats.org/officeDocument/2006/math" xmlns:a14="http://schemas.microsoft.com/office/drawing/2010/main" xmlns:ma14="http://schemas.microsoft.com/office/mac/drawingml/2011/main" val="1"/>
             </a:ext>
           </a:extLst>
         </p:spPr>
@@ -4957,7 +4964,7 @@
           </a:ln>
           <a:extLst>
             <a:ext uri="{C572A759-6A51-4108-AA02-DFA0A04FC94B}">
-              <ma14:wrappingTextBoxFlag xmlns:ma14="http://schemas.microsoft.com/office/mac/drawingml/2011/main" xmlns:a14="http://schemas.microsoft.com/office/drawing/2010/main" xmlns:m="http://schemas.openxmlformats.org/officeDocument/2006/math" xmlns="" val="1"/>
+              <ma14:wrappingTextBoxFlag xmlns="" xmlns:m="http://schemas.openxmlformats.org/officeDocument/2006/math" xmlns:a14="http://schemas.microsoft.com/office/drawing/2010/main" xmlns:ma14="http://schemas.microsoft.com/office/mac/drawingml/2011/main" val="1"/>
             </a:ext>
           </a:extLst>
         </p:spPr>
@@ -4992,7 +4999,7 @@
           </a:ln>
           <a:extLst>
             <a:ext uri="{C572A759-6A51-4108-AA02-DFA0A04FC94B}">
-              <ma14:wrappingTextBoxFlag xmlns:ma14="http://schemas.microsoft.com/office/mac/drawingml/2011/main" xmlns:a14="http://schemas.microsoft.com/office/drawing/2010/main" xmlns:m="http://schemas.openxmlformats.org/officeDocument/2006/math" xmlns="" val="1"/>
+              <ma14:wrappingTextBoxFlag xmlns="" xmlns:m="http://schemas.openxmlformats.org/officeDocument/2006/math" xmlns:a14="http://schemas.microsoft.com/office/drawing/2010/main" xmlns:ma14="http://schemas.microsoft.com/office/mac/drawingml/2011/main" val="1"/>
             </a:ext>
           </a:extLst>
         </p:spPr>
@@ -5038,7 +5045,7 @@
           </a:ln>
           <a:extLst>
             <a:ext uri="{C572A759-6A51-4108-AA02-DFA0A04FC94B}">
-              <ma14:wrappingTextBoxFlag xmlns:ma14="http://schemas.microsoft.com/office/mac/drawingml/2011/main" xmlns:a14="http://schemas.microsoft.com/office/drawing/2010/main" xmlns:m="http://schemas.openxmlformats.org/officeDocument/2006/math" xmlns="" val="1"/>
+              <ma14:wrappingTextBoxFlag xmlns="" xmlns:m="http://schemas.openxmlformats.org/officeDocument/2006/math" xmlns:a14="http://schemas.microsoft.com/office/drawing/2010/main" xmlns:ma14="http://schemas.microsoft.com/office/mac/drawingml/2011/main" val="1"/>
             </a:ext>
           </a:extLst>
         </p:spPr>
@@ -5129,7 +5136,7 @@
           </a:ln>
           <a:extLst>
             <a:ext uri="{C572A759-6A51-4108-AA02-DFA0A04FC94B}">
-              <ma14:wrappingTextBoxFlag xmlns:ma14="http://schemas.microsoft.com/office/mac/drawingml/2011/main" xmlns:a14="http://schemas.microsoft.com/office/drawing/2010/main" xmlns:m="http://schemas.openxmlformats.org/officeDocument/2006/math" xmlns="" val="1"/>
+              <ma14:wrappingTextBoxFlag xmlns="" xmlns:m="http://schemas.openxmlformats.org/officeDocument/2006/math" xmlns:a14="http://schemas.microsoft.com/office/drawing/2010/main" xmlns:ma14="http://schemas.microsoft.com/office/mac/drawingml/2011/main" val="1"/>
             </a:ext>
           </a:extLst>
         </p:spPr>
@@ -5176,7 +5183,7 @@
           </a:ln>
           <a:extLst>
             <a:ext uri="{C572A759-6A51-4108-AA02-DFA0A04FC94B}">
-              <ma14:wrappingTextBoxFlag xmlns:ma14="http://schemas.microsoft.com/office/mac/drawingml/2011/main" xmlns:a14="http://schemas.microsoft.com/office/drawing/2010/main" xmlns:m="http://schemas.openxmlformats.org/officeDocument/2006/math" xmlns="" val="1"/>
+              <ma14:wrappingTextBoxFlag xmlns="" xmlns:m="http://schemas.openxmlformats.org/officeDocument/2006/math" xmlns:a14="http://schemas.microsoft.com/office/drawing/2010/main" xmlns:ma14="http://schemas.microsoft.com/office/mac/drawingml/2011/main" val="1"/>
             </a:ext>
           </a:extLst>
         </p:spPr>
@@ -5229,7 +5236,7 @@
           </a:ln>
           <a:extLst>
             <a:ext uri="{C572A759-6A51-4108-AA02-DFA0A04FC94B}">
-              <ma14:wrappingTextBoxFlag xmlns:ma14="http://schemas.microsoft.com/office/mac/drawingml/2011/main" xmlns:a14="http://schemas.microsoft.com/office/drawing/2010/main" xmlns:m="http://schemas.openxmlformats.org/officeDocument/2006/math" xmlns="" val="1"/>
+              <ma14:wrappingTextBoxFlag xmlns="" xmlns:m="http://schemas.openxmlformats.org/officeDocument/2006/math" xmlns:a14="http://schemas.microsoft.com/office/drawing/2010/main" xmlns:ma14="http://schemas.microsoft.com/office/mac/drawingml/2011/main" val="1"/>
             </a:ext>
           </a:extLst>
         </p:spPr>
@@ -5514,7 +5521,7 @@
           </a:ln>
           <a:extLst>
             <a:ext uri="{C572A759-6A51-4108-AA02-DFA0A04FC94B}">
-              <ma14:wrappingTextBoxFlag xmlns:ma14="http://schemas.microsoft.com/office/mac/drawingml/2011/main" xmlns:a14="http://schemas.microsoft.com/office/drawing/2010/main" xmlns:m="http://schemas.openxmlformats.org/officeDocument/2006/math" xmlns="" val="1"/>
+              <ma14:wrappingTextBoxFlag xmlns="" xmlns:m="http://schemas.openxmlformats.org/officeDocument/2006/math" xmlns:a14="http://schemas.microsoft.com/office/drawing/2010/main" xmlns:ma14="http://schemas.microsoft.com/office/mac/drawingml/2011/main" val="1"/>
             </a:ext>
           </a:extLst>
         </p:spPr>
@@ -5549,7 +5556,7 @@
           </a:ln>
           <a:extLst>
             <a:ext uri="{C572A759-6A51-4108-AA02-DFA0A04FC94B}">
-              <ma14:wrappingTextBoxFlag xmlns:ma14="http://schemas.microsoft.com/office/mac/drawingml/2011/main" xmlns:a14="http://schemas.microsoft.com/office/drawing/2010/main" xmlns:m="http://schemas.openxmlformats.org/officeDocument/2006/math" xmlns="" val="1"/>
+              <ma14:wrappingTextBoxFlag xmlns="" xmlns:m="http://schemas.openxmlformats.org/officeDocument/2006/math" xmlns:a14="http://schemas.microsoft.com/office/drawing/2010/main" xmlns:ma14="http://schemas.microsoft.com/office/mac/drawingml/2011/main" val="1"/>
             </a:ext>
           </a:extLst>
         </p:spPr>
@@ -5584,7 +5591,7 @@
           </a:ln>
           <a:extLst>
             <a:ext uri="{C572A759-6A51-4108-AA02-DFA0A04FC94B}">
-              <ma14:wrappingTextBoxFlag xmlns:ma14="http://schemas.microsoft.com/office/mac/drawingml/2011/main" xmlns:a14="http://schemas.microsoft.com/office/drawing/2010/main" xmlns:m="http://schemas.openxmlformats.org/officeDocument/2006/math" xmlns="" val="1"/>
+              <ma14:wrappingTextBoxFlag xmlns="" xmlns:m="http://schemas.openxmlformats.org/officeDocument/2006/math" xmlns:a14="http://schemas.microsoft.com/office/drawing/2010/main" xmlns:ma14="http://schemas.microsoft.com/office/mac/drawingml/2011/main" val="1"/>
             </a:ext>
           </a:extLst>
         </p:spPr>
@@ -5821,7 +5828,7 @@
           </a:ln>
           <a:extLst>
             <a:ext uri="{C572A759-6A51-4108-AA02-DFA0A04FC94B}">
-              <ma14:wrappingTextBoxFlag xmlns:ma14="http://schemas.microsoft.com/office/mac/drawingml/2011/main" xmlns:a14="http://schemas.microsoft.com/office/drawing/2010/main" xmlns:m="http://schemas.openxmlformats.org/officeDocument/2006/math" xmlns="" val="1"/>
+              <ma14:wrappingTextBoxFlag xmlns="" xmlns:m="http://schemas.openxmlformats.org/officeDocument/2006/math" xmlns:a14="http://schemas.microsoft.com/office/drawing/2010/main" xmlns:ma14="http://schemas.microsoft.com/office/mac/drawingml/2011/main" val="1"/>
             </a:ext>
           </a:extLst>
         </p:spPr>
@@ -5869,7 +5876,7 @@
           </a:ln>
           <a:extLst>
             <a:ext uri="{C572A759-6A51-4108-AA02-DFA0A04FC94B}">
-              <ma14:wrappingTextBoxFlag xmlns:ma14="http://schemas.microsoft.com/office/mac/drawingml/2011/main" xmlns:a14="http://schemas.microsoft.com/office/drawing/2010/main" xmlns:m="http://schemas.openxmlformats.org/officeDocument/2006/math" xmlns="" val="1"/>
+              <ma14:wrappingTextBoxFlag xmlns="" xmlns:m="http://schemas.openxmlformats.org/officeDocument/2006/math" xmlns:a14="http://schemas.microsoft.com/office/drawing/2010/main" xmlns:ma14="http://schemas.microsoft.com/office/mac/drawingml/2011/main" val="1"/>
             </a:ext>
           </a:extLst>
         </p:spPr>
@@ -5917,7 +5924,7 @@
           </a:ln>
           <a:extLst>
             <a:ext uri="{C572A759-6A51-4108-AA02-DFA0A04FC94B}">
-              <ma14:wrappingTextBoxFlag xmlns:ma14="http://schemas.microsoft.com/office/mac/drawingml/2011/main" xmlns:a14="http://schemas.microsoft.com/office/drawing/2010/main" xmlns:m="http://schemas.openxmlformats.org/officeDocument/2006/math" xmlns="" val="1"/>
+              <ma14:wrappingTextBoxFlag xmlns="" xmlns:m="http://schemas.openxmlformats.org/officeDocument/2006/math" xmlns:a14="http://schemas.microsoft.com/office/drawing/2010/main" xmlns:ma14="http://schemas.microsoft.com/office/mac/drawingml/2011/main" val="1"/>
             </a:ext>
           </a:extLst>
         </p:spPr>
@@ -5962,7 +5969,7 @@
           </a:ln>
           <a:extLst>
             <a:ext uri="{C572A759-6A51-4108-AA02-DFA0A04FC94B}">
-              <ma14:wrappingTextBoxFlag xmlns:ma14="http://schemas.microsoft.com/office/mac/drawingml/2011/main" xmlns:a14="http://schemas.microsoft.com/office/drawing/2010/main" xmlns:m="http://schemas.openxmlformats.org/officeDocument/2006/math" xmlns="" val="1"/>
+              <ma14:wrappingTextBoxFlag xmlns="" xmlns:m="http://schemas.openxmlformats.org/officeDocument/2006/math" xmlns:a14="http://schemas.microsoft.com/office/drawing/2010/main" xmlns:ma14="http://schemas.microsoft.com/office/mac/drawingml/2011/main" val="1"/>
             </a:ext>
           </a:extLst>
         </p:spPr>
@@ -6015,7 +6022,7 @@
           </a:ln>
           <a:extLst>
             <a:ext uri="{C572A759-6A51-4108-AA02-DFA0A04FC94B}">
-              <ma14:wrappingTextBoxFlag xmlns:ma14="http://schemas.microsoft.com/office/mac/drawingml/2011/main" xmlns:a14="http://schemas.microsoft.com/office/drawing/2010/main" xmlns:m="http://schemas.openxmlformats.org/officeDocument/2006/math" xmlns="" val="1"/>
+              <ma14:wrappingTextBoxFlag xmlns="" xmlns:m="http://schemas.openxmlformats.org/officeDocument/2006/math" xmlns:a14="http://schemas.microsoft.com/office/drawing/2010/main" xmlns:ma14="http://schemas.microsoft.com/office/mac/drawingml/2011/main" val="1"/>
             </a:ext>
           </a:extLst>
         </p:spPr>
@@ -6068,7 +6075,7 @@
           </a:ln>
           <a:extLst>
             <a:ext uri="{C572A759-6A51-4108-AA02-DFA0A04FC94B}">
-              <ma14:wrappingTextBoxFlag xmlns:ma14="http://schemas.microsoft.com/office/mac/drawingml/2011/main" xmlns:a14="http://schemas.microsoft.com/office/drawing/2010/main" xmlns:m="http://schemas.openxmlformats.org/officeDocument/2006/math" xmlns="" val="1"/>
+              <ma14:wrappingTextBoxFlag xmlns="" xmlns:m="http://schemas.openxmlformats.org/officeDocument/2006/math" xmlns:a14="http://schemas.microsoft.com/office/drawing/2010/main" xmlns:ma14="http://schemas.microsoft.com/office/mac/drawingml/2011/main" val="1"/>
             </a:ext>
           </a:extLst>
         </p:spPr>
@@ -6361,7 +6368,7 @@
           </a:ln>
           <a:extLst>
             <a:ext uri="{C572A759-6A51-4108-AA02-DFA0A04FC94B}">
-              <ma14:wrappingTextBoxFlag xmlns:ma14="http://schemas.microsoft.com/office/mac/drawingml/2011/main" xmlns:a14="http://schemas.microsoft.com/office/drawing/2010/main" xmlns:m="http://schemas.openxmlformats.org/officeDocument/2006/math" xmlns="" val="1"/>
+              <ma14:wrappingTextBoxFlag xmlns="" xmlns:m="http://schemas.openxmlformats.org/officeDocument/2006/math" xmlns:a14="http://schemas.microsoft.com/office/drawing/2010/main" xmlns:ma14="http://schemas.microsoft.com/office/mac/drawingml/2011/main" val="1"/>
             </a:ext>
           </a:extLst>
         </p:spPr>
@@ -6396,7 +6403,7 @@
           </a:ln>
           <a:extLst>
             <a:ext uri="{C572A759-6A51-4108-AA02-DFA0A04FC94B}">
-              <ma14:wrappingTextBoxFlag xmlns:ma14="http://schemas.microsoft.com/office/mac/drawingml/2011/main" xmlns:a14="http://schemas.microsoft.com/office/drawing/2010/main" xmlns:m="http://schemas.openxmlformats.org/officeDocument/2006/math" xmlns="" val="1"/>
+              <ma14:wrappingTextBoxFlag xmlns="" xmlns:m="http://schemas.openxmlformats.org/officeDocument/2006/math" xmlns:a14="http://schemas.microsoft.com/office/drawing/2010/main" xmlns:ma14="http://schemas.microsoft.com/office/mac/drawingml/2011/main" val="1"/>
             </a:ext>
           </a:extLst>
         </p:spPr>
@@ -6431,7 +6438,7 @@
           </a:ln>
           <a:extLst>
             <a:ext uri="{C572A759-6A51-4108-AA02-DFA0A04FC94B}">
-              <ma14:wrappingTextBoxFlag xmlns:ma14="http://schemas.microsoft.com/office/mac/drawingml/2011/main" xmlns:a14="http://schemas.microsoft.com/office/drawing/2010/main" xmlns:m="http://schemas.openxmlformats.org/officeDocument/2006/math" xmlns="" val="1"/>
+              <ma14:wrappingTextBoxFlag xmlns="" xmlns:m="http://schemas.openxmlformats.org/officeDocument/2006/math" xmlns:a14="http://schemas.microsoft.com/office/drawing/2010/main" xmlns:ma14="http://schemas.microsoft.com/office/mac/drawingml/2011/main" val="1"/>
             </a:ext>
           </a:extLst>
         </p:spPr>
@@ -6489,7 +6496,7 @@
           </a:ln>
           <a:extLst>
             <a:ext uri="{C572A759-6A51-4108-AA02-DFA0A04FC94B}">
-              <ma14:wrappingTextBoxFlag xmlns:ma14="http://schemas.microsoft.com/office/mac/drawingml/2011/main" xmlns:a14="http://schemas.microsoft.com/office/drawing/2010/main" xmlns:m="http://schemas.openxmlformats.org/officeDocument/2006/math" xmlns="" val="1"/>
+              <ma14:wrappingTextBoxFlag xmlns="" xmlns:m="http://schemas.openxmlformats.org/officeDocument/2006/math" xmlns:a14="http://schemas.microsoft.com/office/drawing/2010/main" xmlns:ma14="http://schemas.microsoft.com/office/mac/drawingml/2011/main" val="1"/>
             </a:ext>
           </a:extLst>
         </p:spPr>
@@ -6528,7 +6535,7 @@
           </a:ln>
           <a:extLst>
             <a:ext uri="{C572A759-6A51-4108-AA02-DFA0A04FC94B}">
-              <ma14:wrappingTextBoxFlag xmlns:ma14="http://schemas.microsoft.com/office/mac/drawingml/2011/main" xmlns:a14="http://schemas.microsoft.com/office/drawing/2010/main" xmlns:m="http://schemas.openxmlformats.org/officeDocument/2006/math" xmlns="" val="1"/>
+              <ma14:wrappingTextBoxFlag xmlns="" xmlns:m="http://schemas.openxmlformats.org/officeDocument/2006/math" xmlns:a14="http://schemas.microsoft.com/office/drawing/2010/main" xmlns:ma14="http://schemas.microsoft.com/office/mac/drawingml/2011/main" val="1"/>
             </a:ext>
           </a:extLst>
         </p:spPr>
@@ -6825,7 +6832,7 @@
           </a:ln>
           <a:extLst>
             <a:ext uri="{C572A759-6A51-4108-AA02-DFA0A04FC94B}">
-              <ma14:wrappingTextBoxFlag xmlns:ma14="http://schemas.microsoft.com/office/mac/drawingml/2011/main" xmlns:a14="http://schemas.microsoft.com/office/drawing/2010/main" xmlns:m="http://schemas.openxmlformats.org/officeDocument/2006/math" xmlns="" val="1"/>
+              <ma14:wrappingTextBoxFlag xmlns="" xmlns:m="http://schemas.openxmlformats.org/officeDocument/2006/math" xmlns:a14="http://schemas.microsoft.com/office/drawing/2010/main" xmlns:ma14="http://schemas.microsoft.com/office/mac/drawingml/2011/main" val="1"/>
             </a:ext>
           </a:extLst>
         </p:spPr>
@@ -6860,7 +6867,7 @@
           </a:ln>
           <a:extLst>
             <a:ext uri="{C572A759-6A51-4108-AA02-DFA0A04FC94B}">
-              <ma14:wrappingTextBoxFlag xmlns:ma14="http://schemas.microsoft.com/office/mac/drawingml/2011/main" xmlns:a14="http://schemas.microsoft.com/office/drawing/2010/main" xmlns:m="http://schemas.openxmlformats.org/officeDocument/2006/math" xmlns="" val="1"/>
+              <ma14:wrappingTextBoxFlag xmlns="" xmlns:m="http://schemas.openxmlformats.org/officeDocument/2006/math" xmlns:a14="http://schemas.microsoft.com/office/drawing/2010/main" xmlns:ma14="http://schemas.microsoft.com/office/mac/drawingml/2011/main" val="1"/>
             </a:ext>
           </a:extLst>
         </p:spPr>
@@ -6895,7 +6902,7 @@
           </a:ln>
           <a:extLst>
             <a:ext uri="{C572A759-6A51-4108-AA02-DFA0A04FC94B}">
-              <ma14:wrappingTextBoxFlag xmlns:ma14="http://schemas.microsoft.com/office/mac/drawingml/2011/main" xmlns:a14="http://schemas.microsoft.com/office/drawing/2010/main" xmlns:m="http://schemas.openxmlformats.org/officeDocument/2006/math" xmlns="" val="1"/>
+              <ma14:wrappingTextBoxFlag xmlns="" xmlns:m="http://schemas.openxmlformats.org/officeDocument/2006/math" xmlns:a14="http://schemas.microsoft.com/office/drawing/2010/main" xmlns:ma14="http://schemas.microsoft.com/office/mac/drawingml/2011/main" val="1"/>
             </a:ext>
           </a:extLst>
         </p:spPr>
@@ -6953,7 +6960,7 @@
           </a:ln>
           <a:extLst>
             <a:ext uri="{C572A759-6A51-4108-AA02-DFA0A04FC94B}">
-              <ma14:wrappingTextBoxFlag xmlns:ma14="http://schemas.microsoft.com/office/mac/drawingml/2011/main" xmlns:a14="http://schemas.microsoft.com/office/drawing/2010/main" xmlns:m="http://schemas.openxmlformats.org/officeDocument/2006/math" xmlns="" val="1"/>
+              <ma14:wrappingTextBoxFlag xmlns="" xmlns:m="http://schemas.openxmlformats.org/officeDocument/2006/math" xmlns:a14="http://schemas.microsoft.com/office/drawing/2010/main" xmlns:ma14="http://schemas.microsoft.com/office/mac/drawingml/2011/main" val="1"/>
             </a:ext>
           </a:extLst>
         </p:spPr>
@@ -6992,7 +6999,7 @@
           </a:ln>
           <a:extLst>
             <a:ext uri="{C572A759-6A51-4108-AA02-DFA0A04FC94B}">
-              <ma14:wrappingTextBoxFlag xmlns:ma14="http://schemas.microsoft.com/office/mac/drawingml/2011/main" xmlns:a14="http://schemas.microsoft.com/office/drawing/2010/main" xmlns:m="http://schemas.openxmlformats.org/officeDocument/2006/math" xmlns="" val="1"/>
+              <ma14:wrappingTextBoxFlag xmlns="" xmlns:m="http://schemas.openxmlformats.org/officeDocument/2006/math" xmlns:a14="http://schemas.microsoft.com/office/drawing/2010/main" xmlns:ma14="http://schemas.microsoft.com/office/mac/drawingml/2011/main" val="1"/>
             </a:ext>
           </a:extLst>
         </p:spPr>
@@ -7039,7 +7046,7 @@
           </a:ln>
           <a:extLst>
             <a:ext uri="{C572A759-6A51-4108-AA02-DFA0A04FC94B}">
-              <ma14:wrappingTextBoxFlag xmlns:ma14="http://schemas.microsoft.com/office/mac/drawingml/2011/main" xmlns:a14="http://schemas.microsoft.com/office/drawing/2010/main" xmlns:m="http://schemas.openxmlformats.org/officeDocument/2006/math" xmlns="" val="1"/>
+              <ma14:wrappingTextBoxFlag xmlns="" xmlns:m="http://schemas.openxmlformats.org/officeDocument/2006/math" xmlns:a14="http://schemas.microsoft.com/office/drawing/2010/main" xmlns:ma14="http://schemas.microsoft.com/office/mac/drawingml/2011/main" val="1"/>
             </a:ext>
           </a:extLst>
         </p:spPr>
@@ -7378,7 +7385,7 @@
           </a:ln>
           <a:extLst>
             <a:ext uri="{C572A759-6A51-4108-AA02-DFA0A04FC94B}">
-              <ma14:wrappingTextBoxFlag xmlns:ma14="http://schemas.microsoft.com/office/mac/drawingml/2011/main" xmlns:a14="http://schemas.microsoft.com/office/drawing/2010/main" xmlns:m="http://schemas.openxmlformats.org/officeDocument/2006/math" xmlns="" val="1"/>
+              <ma14:wrappingTextBoxFlag xmlns="" xmlns:m="http://schemas.openxmlformats.org/officeDocument/2006/math" xmlns:a14="http://schemas.microsoft.com/office/drawing/2010/main" xmlns:ma14="http://schemas.microsoft.com/office/mac/drawingml/2011/main" val="1"/>
             </a:ext>
           </a:extLst>
         </p:spPr>
@@ -7413,7 +7420,7 @@
           </a:ln>
           <a:extLst>
             <a:ext uri="{C572A759-6A51-4108-AA02-DFA0A04FC94B}">
-              <ma14:wrappingTextBoxFlag xmlns:ma14="http://schemas.microsoft.com/office/mac/drawingml/2011/main" xmlns:a14="http://schemas.microsoft.com/office/drawing/2010/main" xmlns:m="http://schemas.openxmlformats.org/officeDocument/2006/math" xmlns="" val="1"/>
+              <ma14:wrappingTextBoxFlag xmlns="" xmlns:m="http://schemas.openxmlformats.org/officeDocument/2006/math" xmlns:a14="http://schemas.microsoft.com/office/drawing/2010/main" xmlns:ma14="http://schemas.microsoft.com/office/mac/drawingml/2011/main" val="1"/>
             </a:ext>
           </a:extLst>
         </p:spPr>
@@ -7448,7 +7455,7 @@
           </a:ln>
           <a:extLst>
             <a:ext uri="{C572A759-6A51-4108-AA02-DFA0A04FC94B}">
-              <ma14:wrappingTextBoxFlag xmlns:ma14="http://schemas.microsoft.com/office/mac/drawingml/2011/main" xmlns:a14="http://schemas.microsoft.com/office/drawing/2010/main" xmlns:m="http://schemas.openxmlformats.org/officeDocument/2006/math" xmlns="" val="1"/>
+              <ma14:wrappingTextBoxFlag xmlns="" xmlns:m="http://schemas.openxmlformats.org/officeDocument/2006/math" xmlns:a14="http://schemas.microsoft.com/office/drawing/2010/main" xmlns:ma14="http://schemas.microsoft.com/office/mac/drawingml/2011/main" val="1"/>
             </a:ext>
           </a:extLst>
         </p:spPr>
@@ -7495,7 +7502,7 @@
           </a:ln>
           <a:extLst>
             <a:ext uri="{C572A759-6A51-4108-AA02-DFA0A04FC94B}">
-              <ma14:wrappingTextBoxFlag xmlns:ma14="http://schemas.microsoft.com/office/mac/drawingml/2011/main" xmlns:a14="http://schemas.microsoft.com/office/drawing/2010/main" xmlns:m="http://schemas.openxmlformats.org/officeDocument/2006/math" xmlns="" val="1"/>
+              <ma14:wrappingTextBoxFlag xmlns="" xmlns:m="http://schemas.openxmlformats.org/officeDocument/2006/math" xmlns:a14="http://schemas.microsoft.com/office/drawing/2010/main" xmlns:ma14="http://schemas.microsoft.com/office/mac/drawingml/2011/main" val="1"/>
             </a:ext>
           </a:extLst>
         </p:spPr>
@@ -7591,7 +7598,7 @@
           </a:ln>
           <a:extLst>
             <a:ext uri="{C572A759-6A51-4108-AA02-DFA0A04FC94B}">
-              <ma14:wrappingTextBoxFlag xmlns:ma14="http://schemas.microsoft.com/office/mac/drawingml/2011/main" xmlns:a14="http://schemas.microsoft.com/office/drawing/2010/main" xmlns:m="http://schemas.openxmlformats.org/officeDocument/2006/math" xmlns="" val="1"/>
+              <ma14:wrappingTextBoxFlag xmlns="" xmlns:m="http://schemas.openxmlformats.org/officeDocument/2006/math" xmlns:a14="http://schemas.microsoft.com/office/drawing/2010/main" xmlns:ma14="http://schemas.microsoft.com/office/mac/drawingml/2011/main" val="1"/>
             </a:ext>
           </a:extLst>
         </p:spPr>
@@ -7892,7 +7899,7 @@
           </a:ln>
           <a:extLst>
             <a:ext uri="{C572A759-6A51-4108-AA02-DFA0A04FC94B}">
-              <ma14:wrappingTextBoxFlag xmlns:ma14="http://schemas.microsoft.com/office/mac/drawingml/2011/main" xmlns:a14="http://schemas.microsoft.com/office/drawing/2010/main" xmlns:m="http://schemas.openxmlformats.org/officeDocument/2006/math" xmlns="" val="1"/>
+              <ma14:wrappingTextBoxFlag xmlns="" xmlns:m="http://schemas.openxmlformats.org/officeDocument/2006/math" xmlns:a14="http://schemas.microsoft.com/office/drawing/2010/main" xmlns:ma14="http://schemas.microsoft.com/office/mac/drawingml/2011/main" val="1"/>
             </a:ext>
           </a:extLst>
         </p:spPr>
@@ -7927,7 +7934,7 @@
           </a:ln>
           <a:extLst>
             <a:ext uri="{C572A759-6A51-4108-AA02-DFA0A04FC94B}">
-              <ma14:wrappingTextBoxFlag xmlns:ma14="http://schemas.microsoft.com/office/mac/drawingml/2011/main" xmlns:a14="http://schemas.microsoft.com/office/drawing/2010/main" xmlns:m="http://schemas.openxmlformats.org/officeDocument/2006/math" xmlns="" val="1"/>
+              <ma14:wrappingTextBoxFlag xmlns="" xmlns:m="http://schemas.openxmlformats.org/officeDocument/2006/math" xmlns:a14="http://schemas.microsoft.com/office/drawing/2010/main" xmlns:ma14="http://schemas.microsoft.com/office/mac/drawingml/2011/main" val="1"/>
             </a:ext>
           </a:extLst>
         </p:spPr>
@@ -7962,7 +7969,7 @@
           </a:ln>
           <a:extLst>
             <a:ext uri="{C572A759-6A51-4108-AA02-DFA0A04FC94B}">
-              <ma14:wrappingTextBoxFlag xmlns:ma14="http://schemas.microsoft.com/office/mac/drawingml/2011/main" xmlns:a14="http://schemas.microsoft.com/office/drawing/2010/main" xmlns:m="http://schemas.openxmlformats.org/officeDocument/2006/math" xmlns="" val="1"/>
+              <ma14:wrappingTextBoxFlag xmlns="" xmlns:m="http://schemas.openxmlformats.org/officeDocument/2006/math" xmlns:a14="http://schemas.microsoft.com/office/drawing/2010/main" xmlns:ma14="http://schemas.microsoft.com/office/mac/drawingml/2011/main" val="1"/>
             </a:ext>
           </a:extLst>
         </p:spPr>
@@ -8009,7 +8016,7 @@
           </a:ln>
           <a:extLst>
             <a:ext uri="{C572A759-6A51-4108-AA02-DFA0A04FC94B}">
-              <ma14:wrappingTextBoxFlag xmlns:ma14="http://schemas.microsoft.com/office/mac/drawingml/2011/main" xmlns:a14="http://schemas.microsoft.com/office/drawing/2010/main" xmlns:m="http://schemas.openxmlformats.org/officeDocument/2006/math" xmlns="" val="1"/>
+              <ma14:wrappingTextBoxFlag xmlns="" xmlns:m="http://schemas.openxmlformats.org/officeDocument/2006/math" xmlns:a14="http://schemas.microsoft.com/office/drawing/2010/main" xmlns:ma14="http://schemas.microsoft.com/office/mac/drawingml/2011/main" val="1"/>
             </a:ext>
           </a:extLst>
         </p:spPr>
@@ -8105,7 +8112,7 @@
           </a:ln>
           <a:extLst>
             <a:ext uri="{C572A759-6A51-4108-AA02-DFA0A04FC94B}">
-              <ma14:wrappingTextBoxFlag xmlns:ma14="http://schemas.microsoft.com/office/mac/drawingml/2011/main" xmlns:a14="http://schemas.microsoft.com/office/drawing/2010/main" xmlns:m="http://schemas.openxmlformats.org/officeDocument/2006/math" xmlns="" val="1"/>
+              <ma14:wrappingTextBoxFlag xmlns="" xmlns:m="http://schemas.openxmlformats.org/officeDocument/2006/math" xmlns:a14="http://schemas.microsoft.com/office/drawing/2010/main" xmlns:ma14="http://schemas.microsoft.com/office/mac/drawingml/2011/main" val="1"/>
             </a:ext>
           </a:extLst>
         </p:spPr>
@@ -8175,7 +8182,7 @@
           </a:ln>
           <a:extLst>
             <a:ext uri="{C572A759-6A51-4108-AA02-DFA0A04FC94B}">
-              <ma14:wrappingTextBoxFlag xmlns:ma14="http://schemas.microsoft.com/office/mac/drawingml/2011/main" xmlns:a14="http://schemas.microsoft.com/office/drawing/2010/main" xmlns:m="http://schemas.openxmlformats.org/officeDocument/2006/math" xmlns="" val="1"/>
+              <ma14:wrappingTextBoxFlag xmlns="" xmlns:m="http://schemas.openxmlformats.org/officeDocument/2006/math" xmlns:a14="http://schemas.microsoft.com/office/drawing/2010/main" xmlns:ma14="http://schemas.microsoft.com/office/mac/drawingml/2011/main" val="1"/>
             </a:ext>
           </a:extLst>
         </p:spPr>
@@ -8687,7 +8694,7 @@
           </a:ln>
           <a:extLst>
             <a:ext uri="{C572A759-6A51-4108-AA02-DFA0A04FC94B}">
-              <ma14:wrappingTextBoxFlag xmlns:ma14="http://schemas.microsoft.com/office/mac/drawingml/2011/main" xmlns:a14="http://schemas.microsoft.com/office/drawing/2010/main" xmlns:m="http://schemas.openxmlformats.org/officeDocument/2006/math" xmlns="" val="1"/>
+              <ma14:wrappingTextBoxFlag xmlns="" xmlns:m="http://schemas.openxmlformats.org/officeDocument/2006/math" xmlns:a14="http://schemas.microsoft.com/office/drawing/2010/main" xmlns:ma14="http://schemas.microsoft.com/office/mac/drawingml/2011/main" val="1"/>
             </a:ext>
           </a:extLst>
         </p:spPr>
@@ -8722,7 +8729,7 @@
           </a:ln>
           <a:extLst>
             <a:ext uri="{C572A759-6A51-4108-AA02-DFA0A04FC94B}">
-              <ma14:wrappingTextBoxFlag xmlns:ma14="http://schemas.microsoft.com/office/mac/drawingml/2011/main" xmlns:a14="http://schemas.microsoft.com/office/drawing/2010/main" xmlns:m="http://schemas.openxmlformats.org/officeDocument/2006/math" xmlns="" val="1"/>
+              <ma14:wrappingTextBoxFlag xmlns="" xmlns:m="http://schemas.openxmlformats.org/officeDocument/2006/math" xmlns:a14="http://schemas.microsoft.com/office/drawing/2010/main" xmlns:ma14="http://schemas.microsoft.com/office/mac/drawingml/2011/main" val="1"/>
             </a:ext>
           </a:extLst>
         </p:spPr>
@@ -8757,7 +8764,7 @@
           </a:ln>
           <a:extLst>
             <a:ext uri="{C572A759-6A51-4108-AA02-DFA0A04FC94B}">
-              <ma14:wrappingTextBoxFlag xmlns:ma14="http://schemas.microsoft.com/office/mac/drawingml/2011/main" xmlns:a14="http://schemas.microsoft.com/office/drawing/2010/main" xmlns:m="http://schemas.openxmlformats.org/officeDocument/2006/math" xmlns="" val="1"/>
+              <ma14:wrappingTextBoxFlag xmlns="" xmlns:m="http://schemas.openxmlformats.org/officeDocument/2006/math" xmlns:a14="http://schemas.microsoft.com/office/drawing/2010/main" xmlns:ma14="http://schemas.microsoft.com/office/mac/drawingml/2011/main" val="1"/>
             </a:ext>
           </a:extLst>
         </p:spPr>
@@ -8804,7 +8811,7 @@
           </a:ln>
           <a:extLst>
             <a:ext uri="{C572A759-6A51-4108-AA02-DFA0A04FC94B}">
-              <ma14:wrappingTextBoxFlag xmlns:ma14="http://schemas.microsoft.com/office/mac/drawingml/2011/main" xmlns:a14="http://schemas.microsoft.com/office/drawing/2010/main" xmlns:m="http://schemas.openxmlformats.org/officeDocument/2006/math" xmlns="" val="1"/>
+              <ma14:wrappingTextBoxFlag xmlns="" xmlns:m="http://schemas.openxmlformats.org/officeDocument/2006/math" xmlns:a14="http://schemas.microsoft.com/office/drawing/2010/main" xmlns:ma14="http://schemas.microsoft.com/office/mac/drawingml/2011/main" val="1"/>
             </a:ext>
           </a:extLst>
         </p:spPr>
@@ -8900,7 +8907,7 @@
           </a:ln>
           <a:extLst>
             <a:ext uri="{C572A759-6A51-4108-AA02-DFA0A04FC94B}">
-              <ma14:wrappingTextBoxFlag xmlns:ma14="http://schemas.microsoft.com/office/mac/drawingml/2011/main" xmlns:a14="http://schemas.microsoft.com/office/drawing/2010/main" xmlns:m="http://schemas.openxmlformats.org/officeDocument/2006/math" xmlns="" val="1"/>
+              <ma14:wrappingTextBoxFlag xmlns="" xmlns:m="http://schemas.openxmlformats.org/officeDocument/2006/math" xmlns:a14="http://schemas.microsoft.com/office/drawing/2010/main" xmlns:ma14="http://schemas.microsoft.com/office/mac/drawingml/2011/main" val="1"/>
             </a:ext>
           </a:extLst>
         </p:spPr>
@@ -8970,7 +8977,7 @@
           </a:ln>
           <a:extLst>
             <a:ext uri="{C572A759-6A51-4108-AA02-DFA0A04FC94B}">
-              <ma14:wrappingTextBoxFlag xmlns:ma14="http://schemas.microsoft.com/office/mac/drawingml/2011/main" xmlns:a14="http://schemas.microsoft.com/office/drawing/2010/main" xmlns:m="http://schemas.openxmlformats.org/officeDocument/2006/math" xmlns="" val="1"/>
+              <ma14:wrappingTextBoxFlag xmlns="" xmlns:m="http://schemas.openxmlformats.org/officeDocument/2006/math" xmlns:a14="http://schemas.microsoft.com/office/drawing/2010/main" xmlns:ma14="http://schemas.microsoft.com/office/mac/drawingml/2011/main" val="1"/>
             </a:ext>
           </a:extLst>
         </p:spPr>
@@ -9089,7 +9096,7 @@
           </a:ln>
           <a:extLst>
             <a:ext uri="{C572A759-6A51-4108-AA02-DFA0A04FC94B}">
-              <ma14:wrappingTextBoxFlag xmlns:ma14="http://schemas.microsoft.com/office/mac/drawingml/2011/main" xmlns:a14="http://schemas.microsoft.com/office/drawing/2010/main" xmlns:m="http://schemas.openxmlformats.org/officeDocument/2006/math" xmlns="" val="1"/>
+              <ma14:wrappingTextBoxFlag xmlns="" xmlns:m="http://schemas.openxmlformats.org/officeDocument/2006/math" xmlns:a14="http://schemas.microsoft.com/office/drawing/2010/main" xmlns:ma14="http://schemas.microsoft.com/office/mac/drawingml/2011/main" val="1"/>
             </a:ext>
           </a:extLst>
         </p:spPr>
@@ -9378,7 +9385,7 @@
           </a:ln>
           <a:extLst>
             <a:ext uri="{C572A759-6A51-4108-AA02-DFA0A04FC94B}">
-              <ma14:wrappingTextBoxFlag xmlns:ma14="http://schemas.microsoft.com/office/mac/drawingml/2011/main" xmlns:a14="http://schemas.microsoft.com/office/drawing/2010/main" xmlns:m="http://schemas.openxmlformats.org/officeDocument/2006/math" xmlns="" val="1"/>
+              <ma14:wrappingTextBoxFlag xmlns="" xmlns:m="http://schemas.openxmlformats.org/officeDocument/2006/math" xmlns:a14="http://schemas.microsoft.com/office/drawing/2010/main" xmlns:ma14="http://schemas.microsoft.com/office/mac/drawingml/2011/main" val="1"/>
             </a:ext>
           </a:extLst>
         </p:spPr>
@@ -9413,7 +9420,7 @@
           </a:ln>
           <a:extLst>
             <a:ext uri="{C572A759-6A51-4108-AA02-DFA0A04FC94B}">
-              <ma14:wrappingTextBoxFlag xmlns:ma14="http://schemas.microsoft.com/office/mac/drawingml/2011/main" xmlns:a14="http://schemas.microsoft.com/office/drawing/2010/main" xmlns:m="http://schemas.openxmlformats.org/officeDocument/2006/math" xmlns="" val="1"/>
+              <ma14:wrappingTextBoxFlag xmlns="" xmlns:m="http://schemas.openxmlformats.org/officeDocument/2006/math" xmlns:a14="http://schemas.microsoft.com/office/drawing/2010/main" xmlns:ma14="http://schemas.microsoft.com/office/mac/drawingml/2011/main" val="1"/>
             </a:ext>
           </a:extLst>
         </p:spPr>
@@ -9448,7 +9455,7 @@
           </a:ln>
           <a:extLst>
             <a:ext uri="{C572A759-6A51-4108-AA02-DFA0A04FC94B}">
-              <ma14:wrappingTextBoxFlag xmlns:ma14="http://schemas.microsoft.com/office/mac/drawingml/2011/main" xmlns:a14="http://schemas.microsoft.com/office/drawing/2010/main" xmlns:m="http://schemas.openxmlformats.org/officeDocument/2006/math" xmlns="" val="1"/>
+              <ma14:wrappingTextBoxFlag xmlns="" xmlns:m="http://schemas.openxmlformats.org/officeDocument/2006/math" xmlns:a14="http://schemas.microsoft.com/office/drawing/2010/main" xmlns:ma14="http://schemas.microsoft.com/office/mac/drawingml/2011/main" val="1"/>
             </a:ext>
           </a:extLst>
         </p:spPr>
@@ -9495,7 +9502,7 @@
           </a:ln>
           <a:extLst>
             <a:ext uri="{C572A759-6A51-4108-AA02-DFA0A04FC94B}">
-              <ma14:wrappingTextBoxFlag xmlns:ma14="http://schemas.microsoft.com/office/mac/drawingml/2011/main" xmlns:a14="http://schemas.microsoft.com/office/drawing/2010/main" xmlns:m="http://schemas.openxmlformats.org/officeDocument/2006/math" xmlns="" val="1"/>
+              <ma14:wrappingTextBoxFlag xmlns="" xmlns:m="http://schemas.openxmlformats.org/officeDocument/2006/math" xmlns:a14="http://schemas.microsoft.com/office/drawing/2010/main" xmlns:ma14="http://schemas.microsoft.com/office/mac/drawingml/2011/main" val="1"/>
             </a:ext>
           </a:extLst>
         </p:spPr>
@@ -9593,7 +9600,7 @@
           </a:ln>
           <a:extLst>
             <a:ext uri="{C572A759-6A51-4108-AA02-DFA0A04FC94B}">
-              <ma14:wrappingTextBoxFlag xmlns:ma14="http://schemas.microsoft.com/office/mac/drawingml/2011/main" xmlns:a14="http://schemas.microsoft.com/office/drawing/2010/main" xmlns:m="http://schemas.openxmlformats.org/officeDocument/2006/math" xmlns="" val="1"/>
+              <ma14:wrappingTextBoxFlag xmlns="" xmlns:m="http://schemas.openxmlformats.org/officeDocument/2006/math" xmlns:a14="http://schemas.microsoft.com/office/drawing/2010/main" xmlns:ma14="http://schemas.microsoft.com/office/mac/drawingml/2011/main" val="1"/>
             </a:ext>
           </a:extLst>
         </p:spPr>
@@ -9638,7 +9645,7 @@
           </a:ln>
           <a:extLst>
             <a:ext uri="{C572A759-6A51-4108-AA02-DFA0A04FC94B}">
-              <ma14:wrappingTextBoxFlag xmlns:ma14="http://schemas.microsoft.com/office/mac/drawingml/2011/main" xmlns:a14="http://schemas.microsoft.com/office/drawing/2010/main" xmlns:m="http://schemas.openxmlformats.org/officeDocument/2006/math" xmlns="" val="1"/>
+              <ma14:wrappingTextBoxFlag xmlns="" xmlns:m="http://schemas.openxmlformats.org/officeDocument/2006/math" xmlns:a14="http://schemas.microsoft.com/office/drawing/2010/main" xmlns:ma14="http://schemas.microsoft.com/office/mac/drawingml/2011/main" val="1"/>
             </a:ext>
           </a:extLst>
         </p:spPr>
@@ -9677,7 +9684,7 @@
           </a:ln>
           <a:extLst>
             <a:ext uri="{C572A759-6A51-4108-AA02-DFA0A04FC94B}">
-              <ma14:wrappingTextBoxFlag xmlns:ma14="http://schemas.microsoft.com/office/mac/drawingml/2011/main" xmlns:a14="http://schemas.microsoft.com/office/drawing/2010/main" xmlns:m="http://schemas.openxmlformats.org/officeDocument/2006/math" xmlns="" val="1"/>
+              <ma14:wrappingTextBoxFlag xmlns="" xmlns:m="http://schemas.openxmlformats.org/officeDocument/2006/math" xmlns:a14="http://schemas.microsoft.com/office/drawing/2010/main" xmlns:ma14="http://schemas.microsoft.com/office/mac/drawingml/2011/main" val="1"/>
             </a:ext>
           </a:extLst>
         </p:spPr>
@@ -9719,7 +9726,7 @@
           </a:ln>
           <a:extLst>
             <a:ext uri="{C572A759-6A51-4108-AA02-DFA0A04FC94B}">
-              <ma14:wrappingTextBoxFlag xmlns:ma14="http://schemas.microsoft.com/office/mac/drawingml/2011/main" xmlns:a14="http://schemas.microsoft.com/office/drawing/2010/main" xmlns:m="http://schemas.openxmlformats.org/officeDocument/2006/math" xmlns="" val="1"/>
+              <ma14:wrappingTextBoxFlag xmlns="" xmlns:m="http://schemas.openxmlformats.org/officeDocument/2006/math" xmlns:a14="http://schemas.microsoft.com/office/drawing/2010/main" xmlns:ma14="http://schemas.microsoft.com/office/mac/drawingml/2011/main" val="1"/>
             </a:ext>
           </a:extLst>
         </p:spPr>
@@ -9764,7 +9771,7 @@
           </a:ln>
           <a:extLst>
             <a:ext uri="{C572A759-6A51-4108-AA02-DFA0A04FC94B}">
-              <ma14:wrappingTextBoxFlag xmlns:ma14="http://schemas.microsoft.com/office/mac/drawingml/2011/main" xmlns:a14="http://schemas.microsoft.com/office/drawing/2010/main" xmlns:m="http://schemas.openxmlformats.org/officeDocument/2006/math" xmlns="" val="1"/>
+              <ma14:wrappingTextBoxFlag xmlns="" xmlns:m="http://schemas.openxmlformats.org/officeDocument/2006/math" xmlns:a14="http://schemas.microsoft.com/office/drawing/2010/main" xmlns:ma14="http://schemas.microsoft.com/office/mac/drawingml/2011/main" val="1"/>
             </a:ext>
           </a:extLst>
         </p:spPr>
@@ -9806,7 +9813,7 @@
           </a:ln>
           <a:extLst>
             <a:ext uri="{C572A759-6A51-4108-AA02-DFA0A04FC94B}">
-              <ma14:wrappingTextBoxFlag xmlns:ma14="http://schemas.microsoft.com/office/mac/drawingml/2011/main" xmlns:a14="http://schemas.microsoft.com/office/drawing/2010/main" xmlns:m="http://schemas.openxmlformats.org/officeDocument/2006/math" xmlns="" val="1"/>
+              <ma14:wrappingTextBoxFlag xmlns="" xmlns:m="http://schemas.openxmlformats.org/officeDocument/2006/math" xmlns:a14="http://schemas.microsoft.com/office/drawing/2010/main" xmlns:ma14="http://schemas.microsoft.com/office/mac/drawingml/2011/main" val="1"/>
             </a:ext>
           </a:extLst>
         </p:spPr>
@@ -9851,7 +9858,7 @@
           </a:ln>
           <a:extLst>
             <a:ext uri="{C572A759-6A51-4108-AA02-DFA0A04FC94B}">
-              <ma14:wrappingTextBoxFlag xmlns:ma14="http://schemas.microsoft.com/office/mac/drawingml/2011/main" xmlns:a14="http://schemas.microsoft.com/office/drawing/2010/main" xmlns:m="http://schemas.openxmlformats.org/officeDocument/2006/math" xmlns="" val="1"/>
+              <ma14:wrappingTextBoxFlag xmlns="" xmlns:m="http://schemas.openxmlformats.org/officeDocument/2006/math" xmlns:a14="http://schemas.microsoft.com/office/drawing/2010/main" xmlns:ma14="http://schemas.microsoft.com/office/mac/drawingml/2011/main" val="1"/>
             </a:ext>
           </a:extLst>
         </p:spPr>
@@ -9890,7 +9897,7 @@
           </a:ln>
           <a:extLst>
             <a:ext uri="{C572A759-6A51-4108-AA02-DFA0A04FC94B}">
-              <ma14:wrappingTextBoxFlag xmlns:ma14="http://schemas.microsoft.com/office/mac/drawingml/2011/main" xmlns:a14="http://schemas.microsoft.com/office/drawing/2010/main" xmlns:m="http://schemas.openxmlformats.org/officeDocument/2006/math" xmlns="" val="1"/>
+              <ma14:wrappingTextBoxFlag xmlns="" xmlns:m="http://schemas.openxmlformats.org/officeDocument/2006/math" xmlns:a14="http://schemas.microsoft.com/office/drawing/2010/main" xmlns:ma14="http://schemas.microsoft.com/office/mac/drawingml/2011/main" val="1"/>
             </a:ext>
           </a:extLst>
         </p:spPr>
@@ -9956,7 +9963,7 @@
           </a:ln>
           <a:extLst>
             <a:ext uri="{C572A759-6A51-4108-AA02-DFA0A04FC94B}">
-              <ma14:wrappingTextBoxFlag xmlns:ma14="http://schemas.microsoft.com/office/mac/drawingml/2011/main" xmlns:a14="http://schemas.microsoft.com/office/drawing/2010/main" xmlns:m="http://schemas.openxmlformats.org/officeDocument/2006/math" xmlns="" val="1"/>
+              <ma14:wrappingTextBoxFlag xmlns="" xmlns:m="http://schemas.openxmlformats.org/officeDocument/2006/math" xmlns:a14="http://schemas.microsoft.com/office/drawing/2010/main" xmlns:ma14="http://schemas.microsoft.com/office/mac/drawingml/2011/main" val="1"/>
             </a:ext>
           </a:extLst>
         </p:spPr>
@@ -10417,7 +10424,7 @@
           </a:ln>
           <a:extLst>
             <a:ext uri="{C572A759-6A51-4108-AA02-DFA0A04FC94B}">
-              <ma14:wrappingTextBoxFlag xmlns:ma14="http://schemas.microsoft.com/office/mac/drawingml/2011/main" xmlns:a14="http://schemas.microsoft.com/office/drawing/2010/main" xmlns:m="http://schemas.openxmlformats.org/officeDocument/2006/math" xmlns="" val="1"/>
+              <ma14:wrappingTextBoxFlag xmlns="" xmlns:m="http://schemas.openxmlformats.org/officeDocument/2006/math" xmlns:a14="http://schemas.microsoft.com/office/drawing/2010/main" xmlns:ma14="http://schemas.microsoft.com/office/mac/drawingml/2011/main" val="1"/>
             </a:ext>
           </a:extLst>
         </p:spPr>
@@ -10452,7 +10459,7 @@
           </a:ln>
           <a:extLst>
             <a:ext uri="{C572A759-6A51-4108-AA02-DFA0A04FC94B}">
-              <ma14:wrappingTextBoxFlag xmlns:ma14="http://schemas.microsoft.com/office/mac/drawingml/2011/main" xmlns:a14="http://schemas.microsoft.com/office/drawing/2010/main" xmlns:m="http://schemas.openxmlformats.org/officeDocument/2006/math" xmlns="" val="1"/>
+              <ma14:wrappingTextBoxFlag xmlns="" xmlns:m="http://schemas.openxmlformats.org/officeDocument/2006/math" xmlns:a14="http://schemas.microsoft.com/office/drawing/2010/main" xmlns:ma14="http://schemas.microsoft.com/office/mac/drawingml/2011/main" val="1"/>
             </a:ext>
           </a:extLst>
         </p:spPr>
@@ -10487,7 +10494,7 @@
           </a:ln>
           <a:extLst>
             <a:ext uri="{C572A759-6A51-4108-AA02-DFA0A04FC94B}">
-              <ma14:wrappingTextBoxFlag xmlns:ma14="http://schemas.microsoft.com/office/mac/drawingml/2011/main" xmlns:a14="http://schemas.microsoft.com/office/drawing/2010/main" xmlns:m="http://schemas.openxmlformats.org/officeDocument/2006/math" xmlns="" val="1"/>
+              <ma14:wrappingTextBoxFlag xmlns="" xmlns:m="http://schemas.openxmlformats.org/officeDocument/2006/math" xmlns:a14="http://schemas.microsoft.com/office/drawing/2010/main" xmlns:ma14="http://schemas.microsoft.com/office/mac/drawingml/2011/main" val="1"/>
             </a:ext>
           </a:extLst>
         </p:spPr>
@@ -10534,7 +10541,7 @@
           </a:ln>
           <a:extLst>
             <a:ext uri="{C572A759-6A51-4108-AA02-DFA0A04FC94B}">
-              <ma14:wrappingTextBoxFlag xmlns:ma14="http://schemas.microsoft.com/office/mac/drawingml/2011/main" xmlns:a14="http://schemas.microsoft.com/office/drawing/2010/main" xmlns:m="http://schemas.openxmlformats.org/officeDocument/2006/math" xmlns="" val="1"/>
+              <ma14:wrappingTextBoxFlag xmlns="" xmlns:m="http://schemas.openxmlformats.org/officeDocument/2006/math" xmlns:a14="http://schemas.microsoft.com/office/drawing/2010/main" xmlns:ma14="http://schemas.microsoft.com/office/mac/drawingml/2011/main" val="1"/>
             </a:ext>
           </a:extLst>
         </p:spPr>
@@ -10618,7 +10625,7 @@
           </a:ln>
           <a:extLst>
             <a:ext uri="{C572A759-6A51-4108-AA02-DFA0A04FC94B}">
-              <ma14:wrappingTextBoxFlag xmlns:ma14="http://schemas.microsoft.com/office/mac/drawingml/2011/main" xmlns:a14="http://schemas.microsoft.com/office/drawing/2010/main" xmlns:m="http://schemas.openxmlformats.org/officeDocument/2006/math" xmlns="" val="1"/>
+              <ma14:wrappingTextBoxFlag xmlns="" xmlns:m="http://schemas.openxmlformats.org/officeDocument/2006/math" xmlns:a14="http://schemas.microsoft.com/office/drawing/2010/main" xmlns:ma14="http://schemas.microsoft.com/office/mac/drawingml/2011/main" val="1"/>
             </a:ext>
           </a:extLst>
         </p:spPr>
@@ -10663,7 +10670,7 @@
           </a:ln>
           <a:extLst>
             <a:ext uri="{C572A759-6A51-4108-AA02-DFA0A04FC94B}">
-              <ma14:wrappingTextBoxFlag xmlns:ma14="http://schemas.microsoft.com/office/mac/drawingml/2011/main" xmlns:a14="http://schemas.microsoft.com/office/drawing/2010/main" xmlns:m="http://schemas.openxmlformats.org/officeDocument/2006/math" xmlns="" val="1"/>
+              <ma14:wrappingTextBoxFlag xmlns="" xmlns:m="http://schemas.openxmlformats.org/officeDocument/2006/math" xmlns:a14="http://schemas.microsoft.com/office/drawing/2010/main" xmlns:ma14="http://schemas.microsoft.com/office/mac/drawingml/2011/main" val="1"/>
             </a:ext>
           </a:extLst>
         </p:spPr>
@@ -10702,7 +10709,7 @@
           </a:ln>
           <a:extLst>
             <a:ext uri="{C572A759-6A51-4108-AA02-DFA0A04FC94B}">
-              <ma14:wrappingTextBoxFlag xmlns:ma14="http://schemas.microsoft.com/office/mac/drawingml/2011/main" xmlns:a14="http://schemas.microsoft.com/office/drawing/2010/main" xmlns:m="http://schemas.openxmlformats.org/officeDocument/2006/math" xmlns="" val="1"/>
+              <ma14:wrappingTextBoxFlag xmlns="" xmlns:m="http://schemas.openxmlformats.org/officeDocument/2006/math" xmlns:a14="http://schemas.microsoft.com/office/drawing/2010/main" xmlns:ma14="http://schemas.microsoft.com/office/mac/drawingml/2011/main" val="1"/>
             </a:ext>
           </a:extLst>
         </p:spPr>
@@ -10744,7 +10751,7 @@
           </a:ln>
           <a:extLst>
             <a:ext uri="{C572A759-6A51-4108-AA02-DFA0A04FC94B}">
-              <ma14:wrappingTextBoxFlag xmlns:ma14="http://schemas.microsoft.com/office/mac/drawingml/2011/main" xmlns:a14="http://schemas.microsoft.com/office/drawing/2010/main" xmlns:m="http://schemas.openxmlformats.org/officeDocument/2006/math" xmlns="" val="1"/>
+              <ma14:wrappingTextBoxFlag xmlns="" xmlns:m="http://schemas.openxmlformats.org/officeDocument/2006/math" xmlns:a14="http://schemas.microsoft.com/office/drawing/2010/main" xmlns:ma14="http://schemas.microsoft.com/office/mac/drawingml/2011/main" val="1"/>
             </a:ext>
           </a:extLst>
         </p:spPr>
@@ -10789,7 +10796,7 @@
           </a:ln>
           <a:extLst>
             <a:ext uri="{C572A759-6A51-4108-AA02-DFA0A04FC94B}">
-              <ma14:wrappingTextBoxFlag xmlns:ma14="http://schemas.microsoft.com/office/mac/drawingml/2011/main" xmlns:a14="http://schemas.microsoft.com/office/drawing/2010/main" xmlns:m="http://schemas.openxmlformats.org/officeDocument/2006/math" xmlns="" val="1"/>
+              <ma14:wrappingTextBoxFlag xmlns="" xmlns:m="http://schemas.openxmlformats.org/officeDocument/2006/math" xmlns:a14="http://schemas.microsoft.com/office/drawing/2010/main" xmlns:ma14="http://schemas.microsoft.com/office/mac/drawingml/2011/main" val="1"/>
             </a:ext>
           </a:extLst>
         </p:spPr>
@@ -10831,7 +10838,7 @@
           </a:ln>
           <a:extLst>
             <a:ext uri="{C572A759-6A51-4108-AA02-DFA0A04FC94B}">
-              <ma14:wrappingTextBoxFlag xmlns:ma14="http://schemas.microsoft.com/office/mac/drawingml/2011/main" xmlns:a14="http://schemas.microsoft.com/office/drawing/2010/main" xmlns:m="http://schemas.openxmlformats.org/officeDocument/2006/math" xmlns="" val="1"/>
+              <ma14:wrappingTextBoxFlag xmlns="" xmlns:m="http://schemas.openxmlformats.org/officeDocument/2006/math" xmlns:a14="http://schemas.microsoft.com/office/drawing/2010/main" xmlns:ma14="http://schemas.microsoft.com/office/mac/drawingml/2011/main" val="1"/>
             </a:ext>
           </a:extLst>
         </p:spPr>
@@ -10876,7 +10883,7 @@
           </a:ln>
           <a:extLst>
             <a:ext uri="{C572A759-6A51-4108-AA02-DFA0A04FC94B}">
-              <ma14:wrappingTextBoxFlag xmlns:ma14="http://schemas.microsoft.com/office/mac/drawingml/2011/main" xmlns:a14="http://schemas.microsoft.com/office/drawing/2010/main" xmlns:m="http://schemas.openxmlformats.org/officeDocument/2006/math" xmlns="" val="1"/>
+              <ma14:wrappingTextBoxFlag xmlns="" xmlns:m="http://schemas.openxmlformats.org/officeDocument/2006/math" xmlns:a14="http://schemas.microsoft.com/office/drawing/2010/main" xmlns:ma14="http://schemas.microsoft.com/office/mac/drawingml/2011/main" val="1"/>
             </a:ext>
           </a:extLst>
         </p:spPr>
@@ -10915,7 +10922,7 @@
           </a:ln>
           <a:extLst>
             <a:ext uri="{C572A759-6A51-4108-AA02-DFA0A04FC94B}">
-              <ma14:wrappingTextBoxFlag xmlns:ma14="http://schemas.microsoft.com/office/mac/drawingml/2011/main" xmlns:a14="http://schemas.microsoft.com/office/drawing/2010/main" xmlns:m="http://schemas.openxmlformats.org/officeDocument/2006/math" xmlns="" val="1"/>
+              <ma14:wrappingTextBoxFlag xmlns="" xmlns:m="http://schemas.openxmlformats.org/officeDocument/2006/math" xmlns:a14="http://schemas.microsoft.com/office/drawing/2010/main" xmlns:ma14="http://schemas.microsoft.com/office/mac/drawingml/2011/main" val="1"/>
             </a:ext>
           </a:extLst>
         </p:spPr>
@@ -10981,7 +10988,7 @@
           </a:ln>
           <a:extLst>
             <a:ext uri="{C572A759-6A51-4108-AA02-DFA0A04FC94B}">
-              <ma14:wrappingTextBoxFlag xmlns:ma14="http://schemas.microsoft.com/office/mac/drawingml/2011/main" xmlns:a14="http://schemas.microsoft.com/office/drawing/2010/main" xmlns:m="http://schemas.openxmlformats.org/officeDocument/2006/math" xmlns="" val="1"/>
+              <ma14:wrappingTextBoxFlag xmlns="" xmlns:m="http://schemas.openxmlformats.org/officeDocument/2006/math" xmlns:a14="http://schemas.microsoft.com/office/drawing/2010/main" xmlns:ma14="http://schemas.microsoft.com/office/mac/drawingml/2011/main" val="1"/>
             </a:ext>
           </a:extLst>
         </p:spPr>
@@ -11199,7 +11206,7 @@
           </a:ln>
           <a:extLst>
             <a:ext uri="{C572A759-6A51-4108-AA02-DFA0A04FC94B}">
-              <ma14:wrappingTextBoxFlag xmlns:ma14="http://schemas.microsoft.com/office/mac/drawingml/2011/main" xmlns:a14="http://schemas.microsoft.com/office/drawing/2010/main" xmlns:m="http://schemas.openxmlformats.org/officeDocument/2006/math" xmlns="" val="1"/>
+              <ma14:wrappingTextBoxFlag xmlns="" xmlns:m="http://schemas.openxmlformats.org/officeDocument/2006/math" xmlns:a14="http://schemas.microsoft.com/office/drawing/2010/main" xmlns:ma14="http://schemas.microsoft.com/office/mac/drawingml/2011/main" val="1"/>
             </a:ext>
           </a:extLst>
         </p:spPr>
@@ -11238,7 +11245,7 @@
           </a:ln>
           <a:extLst>
             <a:ext uri="{C572A759-6A51-4108-AA02-DFA0A04FC94B}">
-              <ma14:wrappingTextBoxFlag xmlns:ma14="http://schemas.microsoft.com/office/mac/drawingml/2011/main" xmlns:a14="http://schemas.microsoft.com/office/drawing/2010/main" xmlns:m="http://schemas.openxmlformats.org/officeDocument/2006/math" xmlns="" val="1"/>
+              <ma14:wrappingTextBoxFlag xmlns="" xmlns:m="http://schemas.openxmlformats.org/officeDocument/2006/math" xmlns:a14="http://schemas.microsoft.com/office/drawing/2010/main" xmlns:ma14="http://schemas.microsoft.com/office/mac/drawingml/2011/main" val="1"/>
             </a:ext>
           </a:extLst>
         </p:spPr>
@@ -11277,7 +11284,7 @@
           </a:ln>
           <a:extLst>
             <a:ext uri="{C572A759-6A51-4108-AA02-DFA0A04FC94B}">
-              <ma14:wrappingTextBoxFlag xmlns:ma14="http://schemas.microsoft.com/office/mac/drawingml/2011/main" xmlns:a14="http://schemas.microsoft.com/office/drawing/2010/main" xmlns:m="http://schemas.openxmlformats.org/officeDocument/2006/math" xmlns="" val="1"/>
+              <ma14:wrappingTextBoxFlag xmlns="" xmlns:m="http://schemas.openxmlformats.org/officeDocument/2006/math" xmlns:a14="http://schemas.microsoft.com/office/drawing/2010/main" xmlns:ma14="http://schemas.microsoft.com/office/mac/drawingml/2011/main" val="1"/>
             </a:ext>
           </a:extLst>
         </p:spPr>
@@ -11316,7 +11323,7 @@
           </a:ln>
           <a:extLst>
             <a:ext uri="{C572A759-6A51-4108-AA02-DFA0A04FC94B}">
-              <ma14:wrappingTextBoxFlag xmlns:ma14="http://schemas.microsoft.com/office/mac/drawingml/2011/main" xmlns:a14="http://schemas.microsoft.com/office/drawing/2010/main" xmlns:m="http://schemas.openxmlformats.org/officeDocument/2006/math" xmlns="" val="1"/>
+              <ma14:wrappingTextBoxFlag xmlns="" xmlns:m="http://schemas.openxmlformats.org/officeDocument/2006/math" xmlns:a14="http://schemas.microsoft.com/office/drawing/2010/main" xmlns:ma14="http://schemas.microsoft.com/office/mac/drawingml/2011/main" val="1"/>
             </a:ext>
           </a:extLst>
         </p:spPr>
@@ -11598,7 +11605,7 @@
           </a:ln>
           <a:extLst>
             <a:ext uri="{C572A759-6A51-4108-AA02-DFA0A04FC94B}">
-              <ma14:wrappingTextBoxFlag xmlns:ma14="http://schemas.microsoft.com/office/mac/drawingml/2011/main" xmlns:a14="http://schemas.microsoft.com/office/drawing/2010/main" xmlns:m="http://schemas.openxmlformats.org/officeDocument/2006/math" xmlns="" val="1"/>
+              <ma14:wrappingTextBoxFlag xmlns="" xmlns:m="http://schemas.openxmlformats.org/officeDocument/2006/math" xmlns:a14="http://schemas.microsoft.com/office/drawing/2010/main" xmlns:ma14="http://schemas.microsoft.com/office/mac/drawingml/2011/main" val="1"/>
             </a:ext>
           </a:extLst>
         </p:spPr>
@@ -11633,7 +11640,7 @@
           </a:ln>
           <a:extLst>
             <a:ext uri="{C572A759-6A51-4108-AA02-DFA0A04FC94B}">
-              <ma14:wrappingTextBoxFlag xmlns:ma14="http://schemas.microsoft.com/office/mac/drawingml/2011/main" xmlns:a14="http://schemas.microsoft.com/office/drawing/2010/main" xmlns:m="http://schemas.openxmlformats.org/officeDocument/2006/math" xmlns="" val="1"/>
+              <ma14:wrappingTextBoxFlag xmlns="" xmlns:m="http://schemas.openxmlformats.org/officeDocument/2006/math" xmlns:a14="http://schemas.microsoft.com/office/drawing/2010/main" xmlns:ma14="http://schemas.microsoft.com/office/mac/drawingml/2011/main" val="1"/>
             </a:ext>
           </a:extLst>
         </p:spPr>
@@ -11668,7 +11675,7 @@
           </a:ln>
           <a:extLst>
             <a:ext uri="{C572A759-6A51-4108-AA02-DFA0A04FC94B}">
-              <ma14:wrappingTextBoxFlag xmlns:ma14="http://schemas.microsoft.com/office/mac/drawingml/2011/main" xmlns:a14="http://schemas.microsoft.com/office/drawing/2010/main" xmlns:m="http://schemas.openxmlformats.org/officeDocument/2006/math" xmlns="" val="1"/>
+              <ma14:wrappingTextBoxFlag xmlns="" xmlns:m="http://schemas.openxmlformats.org/officeDocument/2006/math" xmlns:a14="http://schemas.microsoft.com/office/drawing/2010/main" xmlns:ma14="http://schemas.microsoft.com/office/mac/drawingml/2011/main" val="1"/>
             </a:ext>
           </a:extLst>
         </p:spPr>
@@ -11715,7 +11722,7 @@
           </a:ln>
           <a:extLst>
             <a:ext uri="{C572A759-6A51-4108-AA02-DFA0A04FC94B}">
-              <ma14:wrappingTextBoxFlag xmlns:ma14="http://schemas.microsoft.com/office/mac/drawingml/2011/main" xmlns:a14="http://schemas.microsoft.com/office/drawing/2010/main" xmlns:m="http://schemas.openxmlformats.org/officeDocument/2006/math" xmlns="" val="1"/>
+              <ma14:wrappingTextBoxFlag xmlns="" xmlns:m="http://schemas.openxmlformats.org/officeDocument/2006/math" xmlns:a14="http://schemas.microsoft.com/office/drawing/2010/main" xmlns:ma14="http://schemas.microsoft.com/office/mac/drawingml/2011/main" val="1"/>
             </a:ext>
           </a:extLst>
         </p:spPr>
@@ -11799,7 +11806,7 @@
           </a:ln>
           <a:extLst>
             <a:ext uri="{C572A759-6A51-4108-AA02-DFA0A04FC94B}">
-              <ma14:wrappingTextBoxFlag xmlns:ma14="http://schemas.microsoft.com/office/mac/drawingml/2011/main" xmlns:a14="http://schemas.microsoft.com/office/drawing/2010/main" xmlns:m="http://schemas.openxmlformats.org/officeDocument/2006/math" xmlns="" val="1"/>
+              <ma14:wrappingTextBoxFlag xmlns="" xmlns:m="http://schemas.openxmlformats.org/officeDocument/2006/math" xmlns:a14="http://schemas.microsoft.com/office/drawing/2010/main" xmlns:ma14="http://schemas.microsoft.com/office/mac/drawingml/2011/main" val="1"/>
             </a:ext>
           </a:extLst>
         </p:spPr>
@@ -11844,7 +11851,7 @@
           </a:ln>
           <a:extLst>
             <a:ext uri="{C572A759-6A51-4108-AA02-DFA0A04FC94B}">
-              <ma14:wrappingTextBoxFlag xmlns:ma14="http://schemas.microsoft.com/office/mac/drawingml/2011/main" xmlns:a14="http://schemas.microsoft.com/office/drawing/2010/main" xmlns:m="http://schemas.openxmlformats.org/officeDocument/2006/math" xmlns="" val="1"/>
+              <ma14:wrappingTextBoxFlag xmlns="" xmlns:m="http://schemas.openxmlformats.org/officeDocument/2006/math" xmlns:a14="http://schemas.microsoft.com/office/drawing/2010/main" xmlns:ma14="http://schemas.microsoft.com/office/mac/drawingml/2011/main" val="1"/>
             </a:ext>
           </a:extLst>
         </p:spPr>
@@ -11883,7 +11890,7 @@
           </a:ln>
           <a:extLst>
             <a:ext uri="{C572A759-6A51-4108-AA02-DFA0A04FC94B}">
-              <ma14:wrappingTextBoxFlag xmlns:ma14="http://schemas.microsoft.com/office/mac/drawingml/2011/main" xmlns:a14="http://schemas.microsoft.com/office/drawing/2010/main" xmlns:m="http://schemas.openxmlformats.org/officeDocument/2006/math" xmlns="" val="1"/>
+              <ma14:wrappingTextBoxFlag xmlns="" xmlns:m="http://schemas.openxmlformats.org/officeDocument/2006/math" xmlns:a14="http://schemas.microsoft.com/office/drawing/2010/main" xmlns:ma14="http://schemas.microsoft.com/office/mac/drawingml/2011/main" val="1"/>
             </a:ext>
           </a:extLst>
         </p:spPr>
@@ -11925,7 +11932,7 @@
           </a:ln>
           <a:extLst>
             <a:ext uri="{C572A759-6A51-4108-AA02-DFA0A04FC94B}">
-              <ma14:wrappingTextBoxFlag xmlns:ma14="http://schemas.microsoft.com/office/mac/drawingml/2011/main" xmlns:a14="http://schemas.microsoft.com/office/drawing/2010/main" xmlns:m="http://schemas.openxmlformats.org/officeDocument/2006/math" xmlns="" val="1"/>
+              <ma14:wrappingTextBoxFlag xmlns="" xmlns:m="http://schemas.openxmlformats.org/officeDocument/2006/math" xmlns:a14="http://schemas.microsoft.com/office/drawing/2010/main" xmlns:ma14="http://schemas.microsoft.com/office/mac/drawingml/2011/main" val="1"/>
             </a:ext>
           </a:extLst>
         </p:spPr>
@@ -11970,7 +11977,7 @@
           </a:ln>
           <a:extLst>
             <a:ext uri="{C572A759-6A51-4108-AA02-DFA0A04FC94B}">
-              <ma14:wrappingTextBoxFlag xmlns:ma14="http://schemas.microsoft.com/office/mac/drawingml/2011/main" xmlns:a14="http://schemas.microsoft.com/office/drawing/2010/main" xmlns:m="http://schemas.openxmlformats.org/officeDocument/2006/math" xmlns="" val="1"/>
+              <ma14:wrappingTextBoxFlag xmlns="" xmlns:m="http://schemas.openxmlformats.org/officeDocument/2006/math" xmlns:a14="http://schemas.microsoft.com/office/drawing/2010/main" xmlns:ma14="http://schemas.microsoft.com/office/mac/drawingml/2011/main" val="1"/>
             </a:ext>
           </a:extLst>
         </p:spPr>
@@ -12012,7 +12019,7 @@
           </a:ln>
           <a:extLst>
             <a:ext uri="{C572A759-6A51-4108-AA02-DFA0A04FC94B}">
-              <ma14:wrappingTextBoxFlag xmlns:ma14="http://schemas.microsoft.com/office/mac/drawingml/2011/main" xmlns:a14="http://schemas.microsoft.com/office/drawing/2010/main" xmlns:m="http://schemas.openxmlformats.org/officeDocument/2006/math" xmlns="" val="1"/>
+              <ma14:wrappingTextBoxFlag xmlns="" xmlns:m="http://schemas.openxmlformats.org/officeDocument/2006/math" xmlns:a14="http://schemas.microsoft.com/office/drawing/2010/main" xmlns:ma14="http://schemas.microsoft.com/office/mac/drawingml/2011/main" val="1"/>
             </a:ext>
           </a:extLst>
         </p:spPr>
@@ -12057,7 +12064,7 @@
           </a:ln>
           <a:extLst>
             <a:ext uri="{C572A759-6A51-4108-AA02-DFA0A04FC94B}">
-              <ma14:wrappingTextBoxFlag xmlns:ma14="http://schemas.microsoft.com/office/mac/drawingml/2011/main" xmlns:a14="http://schemas.microsoft.com/office/drawing/2010/main" xmlns:m="http://schemas.openxmlformats.org/officeDocument/2006/math" xmlns="" val="1"/>
+              <ma14:wrappingTextBoxFlag xmlns="" xmlns:m="http://schemas.openxmlformats.org/officeDocument/2006/math" xmlns:a14="http://schemas.microsoft.com/office/drawing/2010/main" xmlns:ma14="http://schemas.microsoft.com/office/mac/drawingml/2011/main" val="1"/>
             </a:ext>
           </a:extLst>
         </p:spPr>
@@ -12096,7 +12103,7 @@
           </a:ln>
           <a:extLst>
             <a:ext uri="{C572A759-6A51-4108-AA02-DFA0A04FC94B}">
-              <ma14:wrappingTextBoxFlag xmlns:ma14="http://schemas.microsoft.com/office/mac/drawingml/2011/main" xmlns:a14="http://schemas.microsoft.com/office/drawing/2010/main" xmlns:m="http://schemas.openxmlformats.org/officeDocument/2006/math" xmlns="" val="1"/>
+              <ma14:wrappingTextBoxFlag xmlns="" xmlns:m="http://schemas.openxmlformats.org/officeDocument/2006/math" xmlns:a14="http://schemas.microsoft.com/office/drawing/2010/main" xmlns:ma14="http://schemas.microsoft.com/office/mac/drawingml/2011/main" val="1"/>
             </a:ext>
           </a:extLst>
         </p:spPr>
@@ -12162,7 +12169,7 @@
           </a:ln>
           <a:extLst>
             <a:ext uri="{C572A759-6A51-4108-AA02-DFA0A04FC94B}">
-              <ma14:wrappingTextBoxFlag xmlns:ma14="http://schemas.microsoft.com/office/mac/drawingml/2011/main" xmlns:a14="http://schemas.microsoft.com/office/drawing/2010/main" xmlns:m="http://schemas.openxmlformats.org/officeDocument/2006/math" xmlns="" val="1"/>
+              <ma14:wrappingTextBoxFlag xmlns="" xmlns:m="http://schemas.openxmlformats.org/officeDocument/2006/math" xmlns:a14="http://schemas.microsoft.com/office/drawing/2010/main" xmlns:ma14="http://schemas.microsoft.com/office/mac/drawingml/2011/main" val="1"/>
             </a:ext>
           </a:extLst>
         </p:spPr>
@@ -12267,7 +12274,7 @@
           </a:ln>
           <a:extLst>
             <a:ext uri="{C572A759-6A51-4108-AA02-DFA0A04FC94B}">
-              <ma14:wrappingTextBoxFlag xmlns:ma14="http://schemas.microsoft.com/office/mac/drawingml/2011/main" xmlns:a14="http://schemas.microsoft.com/office/drawing/2010/main" xmlns:m="http://schemas.openxmlformats.org/officeDocument/2006/math" xmlns="" val="1"/>
+              <ma14:wrappingTextBoxFlag xmlns="" xmlns:m="http://schemas.openxmlformats.org/officeDocument/2006/math" xmlns:a14="http://schemas.microsoft.com/office/drawing/2010/main" xmlns:ma14="http://schemas.microsoft.com/office/mac/drawingml/2011/main" val="1"/>
             </a:ext>
           </a:extLst>
         </p:spPr>
@@ -12314,7 +12321,7 @@
           </a:ln>
           <a:extLst>
             <a:ext uri="{C572A759-6A51-4108-AA02-DFA0A04FC94B}">
-              <ma14:wrappingTextBoxFlag xmlns:ma14="http://schemas.microsoft.com/office/mac/drawingml/2011/main" xmlns:a14="http://schemas.microsoft.com/office/drawing/2010/main" xmlns:m="http://schemas.openxmlformats.org/officeDocument/2006/math" xmlns="" val="1"/>
+              <ma14:wrappingTextBoxFlag xmlns="" xmlns:m="http://schemas.openxmlformats.org/officeDocument/2006/math" xmlns:a14="http://schemas.microsoft.com/office/drawing/2010/main" xmlns:ma14="http://schemas.microsoft.com/office/mac/drawingml/2011/main" val="1"/>
             </a:ext>
           </a:extLst>
         </p:spPr>
@@ -12353,7 +12360,7 @@
           </a:ln>
           <a:extLst>
             <a:ext uri="{C572A759-6A51-4108-AA02-DFA0A04FC94B}">
-              <ma14:wrappingTextBoxFlag xmlns:ma14="http://schemas.microsoft.com/office/mac/drawingml/2011/main" xmlns:a14="http://schemas.microsoft.com/office/drawing/2010/main" xmlns:m="http://schemas.openxmlformats.org/officeDocument/2006/math" xmlns="" val="1"/>
+              <ma14:wrappingTextBoxFlag xmlns="" xmlns:m="http://schemas.openxmlformats.org/officeDocument/2006/math" xmlns:a14="http://schemas.microsoft.com/office/drawing/2010/main" xmlns:ma14="http://schemas.microsoft.com/office/mac/drawingml/2011/main" val="1"/>
             </a:ext>
           </a:extLst>
         </p:spPr>
@@ -12635,7 +12642,7 @@
           </a:ln>
           <a:extLst>
             <a:ext uri="{C572A759-6A51-4108-AA02-DFA0A04FC94B}">
-              <ma14:wrappingTextBoxFlag xmlns:ma14="http://schemas.microsoft.com/office/mac/drawingml/2011/main" xmlns:a14="http://schemas.microsoft.com/office/drawing/2010/main" xmlns:m="http://schemas.openxmlformats.org/officeDocument/2006/math" xmlns="" val="1"/>
+              <ma14:wrappingTextBoxFlag xmlns="" xmlns:m="http://schemas.openxmlformats.org/officeDocument/2006/math" xmlns:a14="http://schemas.microsoft.com/office/drawing/2010/main" xmlns:ma14="http://schemas.microsoft.com/office/mac/drawingml/2011/main" val="1"/>
             </a:ext>
           </a:extLst>
         </p:spPr>
@@ -12670,7 +12677,7 @@
           </a:ln>
           <a:extLst>
             <a:ext uri="{C572A759-6A51-4108-AA02-DFA0A04FC94B}">
-              <ma14:wrappingTextBoxFlag xmlns:ma14="http://schemas.microsoft.com/office/mac/drawingml/2011/main" xmlns:a14="http://schemas.microsoft.com/office/drawing/2010/main" xmlns:m="http://schemas.openxmlformats.org/officeDocument/2006/math" xmlns="" val="1"/>
+              <ma14:wrappingTextBoxFlag xmlns="" xmlns:m="http://schemas.openxmlformats.org/officeDocument/2006/math" xmlns:a14="http://schemas.microsoft.com/office/drawing/2010/main" xmlns:ma14="http://schemas.microsoft.com/office/mac/drawingml/2011/main" val="1"/>
             </a:ext>
           </a:extLst>
         </p:spPr>
@@ -12705,7 +12712,7 @@
           </a:ln>
           <a:extLst>
             <a:ext uri="{C572A759-6A51-4108-AA02-DFA0A04FC94B}">
-              <ma14:wrappingTextBoxFlag xmlns:ma14="http://schemas.microsoft.com/office/mac/drawingml/2011/main" xmlns:a14="http://schemas.microsoft.com/office/drawing/2010/main" xmlns:m="http://schemas.openxmlformats.org/officeDocument/2006/math" xmlns="" val="1"/>
+              <ma14:wrappingTextBoxFlag xmlns="" xmlns:m="http://schemas.openxmlformats.org/officeDocument/2006/math" xmlns:a14="http://schemas.microsoft.com/office/drawing/2010/main" xmlns:ma14="http://schemas.microsoft.com/office/mac/drawingml/2011/main" val="1"/>
             </a:ext>
           </a:extLst>
         </p:spPr>
@@ -12752,7 +12759,7 @@
           </a:ln>
           <a:extLst>
             <a:ext uri="{C572A759-6A51-4108-AA02-DFA0A04FC94B}">
-              <ma14:wrappingTextBoxFlag xmlns:ma14="http://schemas.microsoft.com/office/mac/drawingml/2011/main" xmlns:a14="http://schemas.microsoft.com/office/drawing/2010/main" xmlns:m="http://schemas.openxmlformats.org/officeDocument/2006/math" xmlns="" val="1"/>
+              <ma14:wrappingTextBoxFlag xmlns="" xmlns:m="http://schemas.openxmlformats.org/officeDocument/2006/math" xmlns:a14="http://schemas.microsoft.com/office/drawing/2010/main" xmlns:ma14="http://schemas.microsoft.com/office/mac/drawingml/2011/main" val="1"/>
             </a:ext>
           </a:extLst>
         </p:spPr>
@@ -12836,7 +12843,7 @@
           </a:ln>
           <a:extLst>
             <a:ext uri="{C572A759-6A51-4108-AA02-DFA0A04FC94B}">
-              <ma14:wrappingTextBoxFlag xmlns:ma14="http://schemas.microsoft.com/office/mac/drawingml/2011/main" xmlns:a14="http://schemas.microsoft.com/office/drawing/2010/main" xmlns:m="http://schemas.openxmlformats.org/officeDocument/2006/math" xmlns="" val="1"/>
+              <ma14:wrappingTextBoxFlag xmlns="" xmlns:m="http://schemas.openxmlformats.org/officeDocument/2006/math" xmlns:a14="http://schemas.microsoft.com/office/drawing/2010/main" xmlns:ma14="http://schemas.microsoft.com/office/mac/drawingml/2011/main" val="1"/>
             </a:ext>
           </a:extLst>
         </p:spPr>
@@ -12881,7 +12888,7 @@
           </a:ln>
           <a:extLst>
             <a:ext uri="{C572A759-6A51-4108-AA02-DFA0A04FC94B}">
-              <ma14:wrappingTextBoxFlag xmlns:ma14="http://schemas.microsoft.com/office/mac/drawingml/2011/main" xmlns:a14="http://schemas.microsoft.com/office/drawing/2010/main" xmlns:m="http://schemas.openxmlformats.org/officeDocument/2006/math" xmlns="" val="1"/>
+              <ma14:wrappingTextBoxFlag xmlns="" xmlns:m="http://schemas.openxmlformats.org/officeDocument/2006/math" xmlns:a14="http://schemas.microsoft.com/office/drawing/2010/main" xmlns:ma14="http://schemas.microsoft.com/office/mac/drawingml/2011/main" val="1"/>
             </a:ext>
           </a:extLst>
         </p:spPr>
@@ -12920,7 +12927,7 @@
           </a:ln>
           <a:extLst>
             <a:ext uri="{C572A759-6A51-4108-AA02-DFA0A04FC94B}">
-              <ma14:wrappingTextBoxFlag xmlns:ma14="http://schemas.microsoft.com/office/mac/drawingml/2011/main" xmlns:a14="http://schemas.microsoft.com/office/drawing/2010/main" xmlns:m="http://schemas.openxmlformats.org/officeDocument/2006/math" xmlns="" val="1"/>
+              <ma14:wrappingTextBoxFlag xmlns="" xmlns:m="http://schemas.openxmlformats.org/officeDocument/2006/math" xmlns:a14="http://schemas.microsoft.com/office/drawing/2010/main" xmlns:ma14="http://schemas.microsoft.com/office/mac/drawingml/2011/main" val="1"/>
             </a:ext>
           </a:extLst>
         </p:spPr>
@@ -12962,7 +12969,7 @@
           </a:ln>
           <a:extLst>
             <a:ext uri="{C572A759-6A51-4108-AA02-DFA0A04FC94B}">
-              <ma14:wrappingTextBoxFlag xmlns:ma14="http://schemas.microsoft.com/office/mac/drawingml/2011/main" xmlns:a14="http://schemas.microsoft.com/office/drawing/2010/main" xmlns:m="http://schemas.openxmlformats.org/officeDocument/2006/math" xmlns="" val="1"/>
+              <ma14:wrappingTextBoxFlag xmlns="" xmlns:m="http://schemas.openxmlformats.org/officeDocument/2006/math" xmlns:a14="http://schemas.microsoft.com/office/drawing/2010/main" xmlns:ma14="http://schemas.microsoft.com/office/mac/drawingml/2011/main" val="1"/>
             </a:ext>
           </a:extLst>
         </p:spPr>
@@ -13007,7 +13014,7 @@
           </a:ln>
           <a:extLst>
             <a:ext uri="{C572A759-6A51-4108-AA02-DFA0A04FC94B}">
-              <ma14:wrappingTextBoxFlag xmlns:ma14="http://schemas.microsoft.com/office/mac/drawingml/2011/main" xmlns:a14="http://schemas.microsoft.com/office/drawing/2010/main" xmlns:m="http://schemas.openxmlformats.org/officeDocument/2006/math" xmlns="" val="1"/>
+              <ma14:wrappingTextBoxFlag xmlns="" xmlns:m="http://schemas.openxmlformats.org/officeDocument/2006/math" xmlns:a14="http://schemas.microsoft.com/office/drawing/2010/main" xmlns:ma14="http://schemas.microsoft.com/office/mac/drawingml/2011/main" val="1"/>
             </a:ext>
           </a:extLst>
         </p:spPr>
@@ -13049,7 +13056,7 @@
           </a:ln>
           <a:extLst>
             <a:ext uri="{C572A759-6A51-4108-AA02-DFA0A04FC94B}">
-              <ma14:wrappingTextBoxFlag xmlns:ma14="http://schemas.microsoft.com/office/mac/drawingml/2011/main" xmlns:a14="http://schemas.microsoft.com/office/drawing/2010/main" xmlns:m="http://schemas.openxmlformats.org/officeDocument/2006/math" xmlns="" val="1"/>
+              <ma14:wrappingTextBoxFlag xmlns="" xmlns:m="http://schemas.openxmlformats.org/officeDocument/2006/math" xmlns:a14="http://schemas.microsoft.com/office/drawing/2010/main" xmlns:ma14="http://schemas.microsoft.com/office/mac/drawingml/2011/main" val="1"/>
             </a:ext>
           </a:extLst>
         </p:spPr>
@@ -13094,7 +13101,7 @@
           </a:ln>
           <a:extLst>
             <a:ext uri="{C572A759-6A51-4108-AA02-DFA0A04FC94B}">
-              <ma14:wrappingTextBoxFlag xmlns:ma14="http://schemas.microsoft.com/office/mac/drawingml/2011/main" xmlns:a14="http://schemas.microsoft.com/office/drawing/2010/main" xmlns:m="http://schemas.openxmlformats.org/officeDocument/2006/math" xmlns="" val="1"/>
+              <ma14:wrappingTextBoxFlag xmlns="" xmlns:m="http://schemas.openxmlformats.org/officeDocument/2006/math" xmlns:a14="http://schemas.microsoft.com/office/drawing/2010/main" xmlns:ma14="http://schemas.microsoft.com/office/mac/drawingml/2011/main" val="1"/>
             </a:ext>
           </a:extLst>
         </p:spPr>
@@ -13133,7 +13140,7 @@
           </a:ln>
           <a:extLst>
             <a:ext uri="{C572A759-6A51-4108-AA02-DFA0A04FC94B}">
-              <ma14:wrappingTextBoxFlag xmlns:ma14="http://schemas.microsoft.com/office/mac/drawingml/2011/main" xmlns:a14="http://schemas.microsoft.com/office/drawing/2010/main" xmlns:m="http://schemas.openxmlformats.org/officeDocument/2006/math" xmlns="" val="1"/>
+              <ma14:wrappingTextBoxFlag xmlns="" xmlns:m="http://schemas.openxmlformats.org/officeDocument/2006/math" xmlns:a14="http://schemas.microsoft.com/office/drawing/2010/main" xmlns:ma14="http://schemas.microsoft.com/office/mac/drawingml/2011/main" val="1"/>
             </a:ext>
           </a:extLst>
         </p:spPr>
@@ -13199,7 +13206,7 @@
           </a:ln>
           <a:extLst>
             <a:ext uri="{C572A759-6A51-4108-AA02-DFA0A04FC94B}">
-              <ma14:wrappingTextBoxFlag xmlns:ma14="http://schemas.microsoft.com/office/mac/drawingml/2011/main" xmlns:a14="http://schemas.microsoft.com/office/drawing/2010/main" xmlns:m="http://schemas.openxmlformats.org/officeDocument/2006/math" xmlns="" val="1"/>
+              <ma14:wrappingTextBoxFlag xmlns="" xmlns:m="http://schemas.openxmlformats.org/officeDocument/2006/math" xmlns:a14="http://schemas.microsoft.com/office/drawing/2010/main" xmlns:ma14="http://schemas.microsoft.com/office/mac/drawingml/2011/main" val="1"/>
             </a:ext>
           </a:extLst>
         </p:spPr>
@@ -13304,7 +13311,7 @@
           </a:ln>
           <a:extLst>
             <a:ext uri="{C572A759-6A51-4108-AA02-DFA0A04FC94B}">
-              <ma14:wrappingTextBoxFlag xmlns:ma14="http://schemas.microsoft.com/office/mac/drawingml/2011/main" xmlns:a14="http://schemas.microsoft.com/office/drawing/2010/main" xmlns:m="http://schemas.openxmlformats.org/officeDocument/2006/math" xmlns="" val="1"/>
+              <ma14:wrappingTextBoxFlag xmlns="" xmlns:m="http://schemas.openxmlformats.org/officeDocument/2006/math" xmlns:a14="http://schemas.microsoft.com/office/drawing/2010/main" xmlns:ma14="http://schemas.microsoft.com/office/mac/drawingml/2011/main" val="1"/>
             </a:ext>
           </a:extLst>
         </p:spPr>
@@ -13351,7 +13358,7 @@
           </a:ln>
           <a:extLst>
             <a:ext uri="{C572A759-6A51-4108-AA02-DFA0A04FC94B}">
-              <ma14:wrappingTextBoxFlag xmlns:ma14="http://schemas.microsoft.com/office/mac/drawingml/2011/main" xmlns:a14="http://schemas.microsoft.com/office/drawing/2010/main" xmlns:m="http://schemas.openxmlformats.org/officeDocument/2006/math" xmlns="" val="1"/>
+              <ma14:wrappingTextBoxFlag xmlns="" xmlns:m="http://schemas.openxmlformats.org/officeDocument/2006/math" xmlns:a14="http://schemas.microsoft.com/office/drawing/2010/main" xmlns:ma14="http://schemas.microsoft.com/office/mac/drawingml/2011/main" val="1"/>
             </a:ext>
           </a:extLst>
         </p:spPr>
@@ -13390,7 +13397,7 @@
           </a:ln>
           <a:extLst>
             <a:ext uri="{C572A759-6A51-4108-AA02-DFA0A04FC94B}">
-              <ma14:wrappingTextBoxFlag xmlns:ma14="http://schemas.microsoft.com/office/mac/drawingml/2011/main" xmlns:a14="http://schemas.microsoft.com/office/drawing/2010/main" xmlns:m="http://schemas.openxmlformats.org/officeDocument/2006/math" xmlns="" val="1"/>
+              <ma14:wrappingTextBoxFlag xmlns="" xmlns:m="http://schemas.openxmlformats.org/officeDocument/2006/math" xmlns:a14="http://schemas.microsoft.com/office/drawing/2010/main" xmlns:ma14="http://schemas.microsoft.com/office/mac/drawingml/2011/main" val="1"/>
             </a:ext>
           </a:extLst>
         </p:spPr>
@@ -13488,7 +13495,7 @@
           </a:ln>
           <a:extLst>
             <a:ext uri="{C572A759-6A51-4108-AA02-DFA0A04FC94B}">
-              <ma14:wrappingTextBoxFlag xmlns:ma14="http://schemas.microsoft.com/office/mac/drawingml/2011/main" xmlns:a14="http://schemas.microsoft.com/office/drawing/2010/main" xmlns:m="http://schemas.openxmlformats.org/officeDocument/2006/math" xmlns="" val="1"/>
+              <ma14:wrappingTextBoxFlag xmlns="" xmlns:m="http://schemas.openxmlformats.org/officeDocument/2006/math" xmlns:a14="http://schemas.microsoft.com/office/drawing/2010/main" xmlns:ma14="http://schemas.microsoft.com/office/mac/drawingml/2011/main" val="1"/>
             </a:ext>
           </a:extLst>
         </p:spPr>
@@ -13752,7 +13759,7 @@
           </a:ln>
           <a:extLst>
             <a:ext uri="{C572A759-6A51-4108-AA02-DFA0A04FC94B}">
-              <ma14:wrappingTextBoxFlag xmlns:ma14="http://schemas.microsoft.com/office/mac/drawingml/2011/main" xmlns:a14="http://schemas.microsoft.com/office/drawing/2010/main" xmlns:m="http://schemas.openxmlformats.org/officeDocument/2006/math" xmlns="" val="1"/>
+              <ma14:wrappingTextBoxFlag xmlns="" xmlns:m="http://schemas.openxmlformats.org/officeDocument/2006/math" xmlns:a14="http://schemas.microsoft.com/office/drawing/2010/main" xmlns:ma14="http://schemas.microsoft.com/office/mac/drawingml/2011/main" val="1"/>
             </a:ext>
           </a:extLst>
         </p:spPr>
@@ -13787,7 +13794,7 @@
           </a:ln>
           <a:extLst>
             <a:ext uri="{C572A759-6A51-4108-AA02-DFA0A04FC94B}">
-              <ma14:wrappingTextBoxFlag xmlns:ma14="http://schemas.microsoft.com/office/mac/drawingml/2011/main" xmlns:a14="http://schemas.microsoft.com/office/drawing/2010/main" xmlns:m="http://schemas.openxmlformats.org/officeDocument/2006/math" xmlns="" val="1"/>
+              <ma14:wrappingTextBoxFlag xmlns="" xmlns:m="http://schemas.openxmlformats.org/officeDocument/2006/math" xmlns:a14="http://schemas.microsoft.com/office/drawing/2010/main" xmlns:ma14="http://schemas.microsoft.com/office/mac/drawingml/2011/main" val="1"/>
             </a:ext>
           </a:extLst>
         </p:spPr>
@@ -13822,7 +13829,7 @@
           </a:ln>
           <a:extLst>
             <a:ext uri="{C572A759-6A51-4108-AA02-DFA0A04FC94B}">
-              <ma14:wrappingTextBoxFlag xmlns:ma14="http://schemas.microsoft.com/office/mac/drawingml/2011/main" xmlns:a14="http://schemas.microsoft.com/office/drawing/2010/main" xmlns:m="http://schemas.openxmlformats.org/officeDocument/2006/math" xmlns="" val="1"/>
+              <ma14:wrappingTextBoxFlag xmlns="" xmlns:m="http://schemas.openxmlformats.org/officeDocument/2006/math" xmlns:a14="http://schemas.microsoft.com/office/drawing/2010/main" xmlns:ma14="http://schemas.microsoft.com/office/mac/drawingml/2011/main" val="1"/>
             </a:ext>
           </a:extLst>
         </p:spPr>
@@ -13972,7 +13979,7 @@
           </a:ln>
           <a:extLst>
             <a:ext uri="{C572A759-6A51-4108-AA02-DFA0A04FC94B}">
-              <ma14:wrappingTextBoxFlag xmlns:ma14="http://schemas.microsoft.com/office/mac/drawingml/2011/main" xmlns:a14="http://schemas.microsoft.com/office/drawing/2010/main" xmlns:m="http://schemas.openxmlformats.org/officeDocument/2006/math" xmlns="" val="1"/>
+              <ma14:wrappingTextBoxFlag xmlns="" xmlns:m="http://schemas.openxmlformats.org/officeDocument/2006/math" xmlns:a14="http://schemas.microsoft.com/office/drawing/2010/main" xmlns:ma14="http://schemas.microsoft.com/office/mac/drawingml/2011/main" val="1"/>
             </a:ext>
           </a:extLst>
         </p:spPr>
@@ -14011,7 +14018,7 @@
           </a:ln>
           <a:extLst>
             <a:ext uri="{C572A759-6A51-4108-AA02-DFA0A04FC94B}">
-              <ma14:wrappingTextBoxFlag xmlns:ma14="http://schemas.microsoft.com/office/mac/drawingml/2011/main" xmlns:a14="http://schemas.microsoft.com/office/drawing/2010/main" xmlns:m="http://schemas.openxmlformats.org/officeDocument/2006/math" xmlns="" val="1"/>
+              <ma14:wrappingTextBoxFlag xmlns="" xmlns:m="http://schemas.openxmlformats.org/officeDocument/2006/math" xmlns:a14="http://schemas.microsoft.com/office/drawing/2010/main" xmlns:ma14="http://schemas.microsoft.com/office/mac/drawingml/2011/main" val="1"/>
             </a:ext>
           </a:extLst>
         </p:spPr>
@@ -14161,7 +14168,7 @@
           </a:ln>
           <a:extLst>
             <a:ext uri="{C572A759-6A51-4108-AA02-DFA0A04FC94B}">
-              <ma14:wrappingTextBoxFlag xmlns:ma14="http://schemas.microsoft.com/office/mac/drawingml/2011/main" xmlns:a14="http://schemas.microsoft.com/office/drawing/2010/main" xmlns:m="http://schemas.openxmlformats.org/officeDocument/2006/math" xmlns="" val="1"/>
+              <ma14:wrappingTextBoxFlag xmlns="" xmlns:m="http://schemas.openxmlformats.org/officeDocument/2006/math" xmlns:a14="http://schemas.microsoft.com/office/drawing/2010/main" xmlns:ma14="http://schemas.microsoft.com/office/mac/drawingml/2011/main" val="1"/>
             </a:ext>
           </a:extLst>
         </p:spPr>
@@ -14410,7 +14417,7 @@
           </a:ln>
           <a:extLst>
             <a:ext uri="{C572A759-6A51-4108-AA02-DFA0A04FC94B}">
-              <ma14:wrappingTextBoxFlag xmlns:ma14="http://schemas.microsoft.com/office/mac/drawingml/2011/main" xmlns:a14="http://schemas.microsoft.com/office/drawing/2010/main" xmlns:m="http://schemas.openxmlformats.org/officeDocument/2006/math" xmlns="" val="1"/>
+              <ma14:wrappingTextBoxFlag xmlns="" xmlns:m="http://schemas.openxmlformats.org/officeDocument/2006/math" xmlns:a14="http://schemas.microsoft.com/office/drawing/2010/main" xmlns:ma14="http://schemas.microsoft.com/office/mac/drawingml/2011/main" val="1"/>
             </a:ext>
           </a:extLst>
         </p:spPr>
@@ -14445,7 +14452,7 @@
           </a:ln>
           <a:extLst>
             <a:ext uri="{C572A759-6A51-4108-AA02-DFA0A04FC94B}">
-              <ma14:wrappingTextBoxFlag xmlns:ma14="http://schemas.microsoft.com/office/mac/drawingml/2011/main" xmlns:a14="http://schemas.microsoft.com/office/drawing/2010/main" xmlns:m="http://schemas.openxmlformats.org/officeDocument/2006/math" xmlns="" val="1"/>
+              <ma14:wrappingTextBoxFlag xmlns="" xmlns:m="http://schemas.openxmlformats.org/officeDocument/2006/math" xmlns:a14="http://schemas.microsoft.com/office/drawing/2010/main" xmlns:ma14="http://schemas.microsoft.com/office/mac/drawingml/2011/main" val="1"/>
             </a:ext>
           </a:extLst>
         </p:spPr>
@@ -14480,7 +14487,7 @@
           </a:ln>
           <a:extLst>
             <a:ext uri="{C572A759-6A51-4108-AA02-DFA0A04FC94B}">
-              <ma14:wrappingTextBoxFlag xmlns:ma14="http://schemas.microsoft.com/office/mac/drawingml/2011/main" xmlns:a14="http://schemas.microsoft.com/office/drawing/2010/main" xmlns:m="http://schemas.openxmlformats.org/officeDocument/2006/math" xmlns="" val="1"/>
+              <ma14:wrappingTextBoxFlag xmlns="" xmlns:m="http://schemas.openxmlformats.org/officeDocument/2006/math" xmlns:a14="http://schemas.microsoft.com/office/drawing/2010/main" xmlns:ma14="http://schemas.microsoft.com/office/mac/drawingml/2011/main" val="1"/>
             </a:ext>
           </a:extLst>
         </p:spPr>
@@ -14519,7 +14526,7 @@
           </a:ln>
           <a:extLst>
             <a:ext uri="{C572A759-6A51-4108-AA02-DFA0A04FC94B}">
-              <ma14:wrappingTextBoxFlag xmlns:ma14="http://schemas.microsoft.com/office/mac/drawingml/2011/main" xmlns:a14="http://schemas.microsoft.com/office/drawing/2010/main" xmlns:m="http://schemas.openxmlformats.org/officeDocument/2006/math" xmlns="" val="1"/>
+              <ma14:wrappingTextBoxFlag xmlns="" xmlns:m="http://schemas.openxmlformats.org/officeDocument/2006/math" xmlns:a14="http://schemas.microsoft.com/office/drawing/2010/main" xmlns:ma14="http://schemas.microsoft.com/office/mac/drawingml/2011/main" val="1"/>
             </a:ext>
           </a:extLst>
         </p:spPr>
@@ -14572,7 +14579,7 @@
           </a:ln>
           <a:extLst>
             <a:ext uri="{C572A759-6A51-4108-AA02-DFA0A04FC94B}">
-              <ma14:wrappingTextBoxFlag xmlns:ma14="http://schemas.microsoft.com/office/mac/drawingml/2011/main" xmlns:a14="http://schemas.microsoft.com/office/drawing/2010/main" xmlns:m="http://schemas.openxmlformats.org/officeDocument/2006/math" xmlns="" val="1"/>
+              <ma14:wrappingTextBoxFlag xmlns="" xmlns:m="http://schemas.openxmlformats.org/officeDocument/2006/math" xmlns:a14="http://schemas.microsoft.com/office/drawing/2010/main" xmlns:ma14="http://schemas.microsoft.com/office/mac/drawingml/2011/main" val="1"/>
             </a:ext>
           </a:extLst>
         </p:spPr>
@@ -14722,7 +14729,7 @@
           </a:ln>
           <a:extLst>
             <a:ext uri="{C572A759-6A51-4108-AA02-DFA0A04FC94B}">
-              <ma14:wrappingTextBoxFlag xmlns:ma14="http://schemas.microsoft.com/office/mac/drawingml/2011/main" xmlns:a14="http://schemas.microsoft.com/office/drawing/2010/main" xmlns:m="http://schemas.openxmlformats.org/officeDocument/2006/math" xmlns="" val="1"/>
+              <ma14:wrappingTextBoxFlag xmlns="" xmlns:m="http://schemas.openxmlformats.org/officeDocument/2006/math" xmlns:a14="http://schemas.microsoft.com/office/drawing/2010/main" xmlns:ma14="http://schemas.microsoft.com/office/mac/drawingml/2011/main" val="1"/>
             </a:ext>
           </a:extLst>
         </p:spPr>
@@ -14761,7 +14768,7 @@
           </a:ln>
           <a:extLst>
             <a:ext uri="{C572A759-6A51-4108-AA02-DFA0A04FC94B}">
-              <ma14:wrappingTextBoxFlag xmlns:ma14="http://schemas.microsoft.com/office/mac/drawingml/2011/main" xmlns:a14="http://schemas.microsoft.com/office/drawing/2010/main" xmlns:m="http://schemas.openxmlformats.org/officeDocument/2006/math" xmlns="" val="1"/>
+              <ma14:wrappingTextBoxFlag xmlns="" xmlns:m="http://schemas.openxmlformats.org/officeDocument/2006/math" xmlns:a14="http://schemas.microsoft.com/office/drawing/2010/main" xmlns:ma14="http://schemas.microsoft.com/office/mac/drawingml/2011/main" val="1"/>
             </a:ext>
           </a:extLst>
         </p:spPr>
@@ -14911,7 +14918,7 @@
           </a:ln>
           <a:extLst>
             <a:ext uri="{C572A759-6A51-4108-AA02-DFA0A04FC94B}">
-              <ma14:wrappingTextBoxFlag xmlns:ma14="http://schemas.microsoft.com/office/mac/drawingml/2011/main" xmlns:a14="http://schemas.microsoft.com/office/drawing/2010/main" xmlns:m="http://schemas.openxmlformats.org/officeDocument/2006/math" xmlns="" val="1"/>
+              <ma14:wrappingTextBoxFlag xmlns="" xmlns:m="http://schemas.openxmlformats.org/officeDocument/2006/math" xmlns:a14="http://schemas.microsoft.com/office/drawing/2010/main" xmlns:ma14="http://schemas.microsoft.com/office/mac/drawingml/2011/main" val="1"/>
             </a:ext>
           </a:extLst>
         </p:spPr>
@@ -15365,7 +15372,7 @@
           </a:ln>
           <a:extLst>
             <a:ext uri="{C572A759-6A51-4108-AA02-DFA0A04FC94B}">
-              <ma14:wrappingTextBoxFlag xmlns:ma14="http://schemas.microsoft.com/office/mac/drawingml/2011/main" xmlns:a14="http://schemas.microsoft.com/office/drawing/2010/main" xmlns:m="http://schemas.openxmlformats.org/officeDocument/2006/math" xmlns="" val="1"/>
+              <ma14:wrappingTextBoxFlag xmlns="" xmlns:m="http://schemas.openxmlformats.org/officeDocument/2006/math" xmlns:a14="http://schemas.microsoft.com/office/drawing/2010/main" xmlns:ma14="http://schemas.microsoft.com/office/mac/drawingml/2011/main" val="1"/>
             </a:ext>
           </a:extLst>
         </p:spPr>
@@ -15400,7 +15407,7 @@
           </a:ln>
           <a:extLst>
             <a:ext uri="{C572A759-6A51-4108-AA02-DFA0A04FC94B}">
-              <ma14:wrappingTextBoxFlag xmlns:ma14="http://schemas.microsoft.com/office/mac/drawingml/2011/main" xmlns:a14="http://schemas.microsoft.com/office/drawing/2010/main" xmlns:m="http://schemas.openxmlformats.org/officeDocument/2006/math" xmlns="" val="1"/>
+              <ma14:wrappingTextBoxFlag xmlns="" xmlns:m="http://schemas.openxmlformats.org/officeDocument/2006/math" xmlns:a14="http://schemas.microsoft.com/office/drawing/2010/main" xmlns:ma14="http://schemas.microsoft.com/office/mac/drawingml/2011/main" val="1"/>
             </a:ext>
           </a:extLst>
         </p:spPr>
@@ -15438,7 +15445,7 @@
           </a:ln>
           <a:extLst>
             <a:ext uri="{C572A759-6A51-4108-AA02-DFA0A04FC94B}">
-              <ma14:wrappingTextBoxFlag xmlns:ma14="http://schemas.microsoft.com/office/mac/drawingml/2011/main" xmlns:a14="http://schemas.microsoft.com/office/drawing/2010/main" xmlns:m="http://schemas.openxmlformats.org/officeDocument/2006/math" xmlns="" val="1"/>
+              <ma14:wrappingTextBoxFlag xmlns="" xmlns:m="http://schemas.openxmlformats.org/officeDocument/2006/math" xmlns:a14="http://schemas.microsoft.com/office/drawing/2010/main" xmlns:ma14="http://schemas.microsoft.com/office/mac/drawingml/2011/main" val="1"/>
             </a:ext>
           </a:extLst>
         </p:spPr>
@@ -15483,7 +15490,7 @@
           </a:ln>
           <a:extLst>
             <a:ext uri="{C572A759-6A51-4108-AA02-DFA0A04FC94B}">
-              <ma14:wrappingTextBoxFlag xmlns:ma14="http://schemas.microsoft.com/office/mac/drawingml/2011/main" xmlns:a14="http://schemas.microsoft.com/office/drawing/2010/main" xmlns:m="http://schemas.openxmlformats.org/officeDocument/2006/math" xmlns="" val="1"/>
+              <ma14:wrappingTextBoxFlag xmlns="" xmlns:m="http://schemas.openxmlformats.org/officeDocument/2006/math" xmlns:a14="http://schemas.microsoft.com/office/drawing/2010/main" xmlns:ma14="http://schemas.microsoft.com/office/mac/drawingml/2011/main" val="1"/>
             </a:ext>
           </a:extLst>
         </p:spPr>
@@ -15525,7 +15532,7 @@
           </a:ln>
           <a:extLst>
             <a:ext uri="{C572A759-6A51-4108-AA02-DFA0A04FC94B}">
-              <ma14:wrappingTextBoxFlag xmlns:ma14="http://schemas.microsoft.com/office/mac/drawingml/2011/main" xmlns:a14="http://schemas.microsoft.com/office/drawing/2010/main" xmlns:m="http://schemas.openxmlformats.org/officeDocument/2006/math" xmlns="" val="1"/>
+              <ma14:wrappingTextBoxFlag xmlns="" xmlns:m="http://schemas.openxmlformats.org/officeDocument/2006/math" xmlns:a14="http://schemas.microsoft.com/office/drawing/2010/main" xmlns:ma14="http://schemas.microsoft.com/office/mac/drawingml/2011/main" val="1"/>
             </a:ext>
           </a:extLst>
         </p:spPr>
@@ -15570,7 +15577,7 @@
           </a:ln>
           <a:extLst>
             <a:ext uri="{C572A759-6A51-4108-AA02-DFA0A04FC94B}">
-              <ma14:wrappingTextBoxFlag xmlns:ma14="http://schemas.microsoft.com/office/mac/drawingml/2011/main" xmlns:a14="http://schemas.microsoft.com/office/drawing/2010/main" xmlns:m="http://schemas.openxmlformats.org/officeDocument/2006/math" xmlns="" val="1"/>
+              <ma14:wrappingTextBoxFlag xmlns="" xmlns:m="http://schemas.openxmlformats.org/officeDocument/2006/math" xmlns:a14="http://schemas.microsoft.com/office/drawing/2010/main" xmlns:ma14="http://schemas.microsoft.com/office/mac/drawingml/2011/main" val="1"/>
             </a:ext>
           </a:extLst>
         </p:spPr>
@@ -15609,7 +15616,7 @@
           </a:ln>
           <a:extLst>
             <a:ext uri="{C572A759-6A51-4108-AA02-DFA0A04FC94B}">
-              <ma14:wrappingTextBoxFlag xmlns:ma14="http://schemas.microsoft.com/office/mac/drawingml/2011/main" xmlns:a14="http://schemas.microsoft.com/office/drawing/2010/main" xmlns:m="http://schemas.openxmlformats.org/officeDocument/2006/math" xmlns="" val="1"/>
+              <ma14:wrappingTextBoxFlag xmlns="" xmlns:m="http://schemas.openxmlformats.org/officeDocument/2006/math" xmlns:a14="http://schemas.microsoft.com/office/drawing/2010/main" xmlns:ma14="http://schemas.microsoft.com/office/mac/drawingml/2011/main" val="1"/>
             </a:ext>
           </a:extLst>
         </p:spPr>
@@ -15648,7 +15655,7 @@
           </a:ln>
           <a:extLst>
             <a:ext uri="{C572A759-6A51-4108-AA02-DFA0A04FC94B}">
-              <ma14:wrappingTextBoxFlag xmlns:ma14="http://schemas.microsoft.com/office/mac/drawingml/2011/main" xmlns:a14="http://schemas.microsoft.com/office/drawing/2010/main" xmlns:m="http://schemas.openxmlformats.org/officeDocument/2006/math" xmlns="" val="1"/>
+              <ma14:wrappingTextBoxFlag xmlns="" xmlns:m="http://schemas.openxmlformats.org/officeDocument/2006/math" xmlns:a14="http://schemas.microsoft.com/office/drawing/2010/main" xmlns:ma14="http://schemas.microsoft.com/office/mac/drawingml/2011/main" val="1"/>
             </a:ext>
           </a:extLst>
         </p:spPr>
@@ -15695,7 +15702,7 @@
           </a:ln>
           <a:extLst>
             <a:ext uri="{C572A759-6A51-4108-AA02-DFA0A04FC94B}">
-              <ma14:wrappingTextBoxFlag xmlns:ma14="http://schemas.microsoft.com/office/mac/drawingml/2011/main" xmlns:a14="http://schemas.microsoft.com/office/drawing/2010/main" xmlns:m="http://schemas.openxmlformats.org/officeDocument/2006/math" xmlns="" val="1"/>
+              <ma14:wrappingTextBoxFlag xmlns="" xmlns:m="http://schemas.openxmlformats.org/officeDocument/2006/math" xmlns:a14="http://schemas.microsoft.com/office/drawing/2010/main" xmlns:ma14="http://schemas.microsoft.com/office/mac/drawingml/2011/main" val="1"/>
             </a:ext>
           </a:extLst>
         </p:spPr>
@@ -15739,7 +15746,7 @@
           </a:ln>
           <a:extLst>
             <a:ext uri="{C572A759-6A51-4108-AA02-DFA0A04FC94B}">
-              <ma14:wrappingTextBoxFlag xmlns:ma14="http://schemas.microsoft.com/office/mac/drawingml/2011/main" xmlns:a14="http://schemas.microsoft.com/office/drawing/2010/main" xmlns:m="http://schemas.openxmlformats.org/officeDocument/2006/math" xmlns="" val="1"/>
+              <ma14:wrappingTextBoxFlag xmlns="" xmlns:m="http://schemas.openxmlformats.org/officeDocument/2006/math" xmlns:a14="http://schemas.microsoft.com/office/drawing/2010/main" xmlns:ma14="http://schemas.microsoft.com/office/mac/drawingml/2011/main" val="1"/>
             </a:ext>
           </a:extLst>
         </p:spPr>
@@ -16076,7 +16083,7 @@
           </a:ln>
           <a:extLst>
             <a:ext uri="{C572A759-6A51-4108-AA02-DFA0A04FC94B}">
-              <ma14:wrappingTextBoxFlag xmlns:ma14="http://schemas.microsoft.com/office/mac/drawingml/2011/main" xmlns:a14="http://schemas.microsoft.com/office/drawing/2010/main" xmlns:m="http://schemas.openxmlformats.org/officeDocument/2006/math" xmlns="" val="1"/>
+              <ma14:wrappingTextBoxFlag xmlns="" xmlns:m="http://schemas.openxmlformats.org/officeDocument/2006/math" xmlns:a14="http://schemas.microsoft.com/office/drawing/2010/main" xmlns:ma14="http://schemas.microsoft.com/office/mac/drawingml/2011/main" val="1"/>
             </a:ext>
           </a:extLst>
         </p:spPr>
@@ -16111,7 +16118,7 @@
           </a:ln>
           <a:extLst>
             <a:ext uri="{C572A759-6A51-4108-AA02-DFA0A04FC94B}">
-              <ma14:wrappingTextBoxFlag xmlns:ma14="http://schemas.microsoft.com/office/mac/drawingml/2011/main" xmlns:a14="http://schemas.microsoft.com/office/drawing/2010/main" xmlns:m="http://schemas.openxmlformats.org/officeDocument/2006/math" xmlns="" val="1"/>
+              <ma14:wrappingTextBoxFlag xmlns="" xmlns:m="http://schemas.openxmlformats.org/officeDocument/2006/math" xmlns:a14="http://schemas.microsoft.com/office/drawing/2010/main" xmlns:ma14="http://schemas.microsoft.com/office/mac/drawingml/2011/main" val="1"/>
             </a:ext>
           </a:extLst>
         </p:spPr>
@@ -16146,7 +16153,7 @@
           </a:ln>
           <a:extLst>
             <a:ext uri="{C572A759-6A51-4108-AA02-DFA0A04FC94B}">
-              <ma14:wrappingTextBoxFlag xmlns:ma14="http://schemas.microsoft.com/office/mac/drawingml/2011/main" xmlns:a14="http://schemas.microsoft.com/office/drawing/2010/main" xmlns:m="http://schemas.openxmlformats.org/officeDocument/2006/math" xmlns="" val="1"/>
+              <ma14:wrappingTextBoxFlag xmlns="" xmlns:m="http://schemas.openxmlformats.org/officeDocument/2006/math" xmlns:a14="http://schemas.microsoft.com/office/drawing/2010/main" xmlns:ma14="http://schemas.microsoft.com/office/mac/drawingml/2011/main" val="1"/>
             </a:ext>
           </a:extLst>
         </p:spPr>
@@ -16232,7 +16239,7 @@
           </a:ln>
           <a:extLst>
             <a:ext uri="{C572A759-6A51-4108-AA02-DFA0A04FC94B}">
-              <ma14:wrappingTextBoxFlag xmlns:ma14="http://schemas.microsoft.com/office/mac/drawingml/2011/main" xmlns:a14="http://schemas.microsoft.com/office/drawing/2010/main" xmlns:m="http://schemas.openxmlformats.org/officeDocument/2006/math" xmlns="" val="1"/>
+              <ma14:wrappingTextBoxFlag xmlns="" xmlns:m="http://schemas.openxmlformats.org/officeDocument/2006/math" xmlns:a14="http://schemas.microsoft.com/office/drawing/2010/main" xmlns:ma14="http://schemas.microsoft.com/office/mac/drawingml/2011/main" val="1"/>
             </a:ext>
           </a:extLst>
         </p:spPr>
@@ -16277,7 +16284,7 @@
           </a:ln>
           <a:extLst>
             <a:ext uri="{C572A759-6A51-4108-AA02-DFA0A04FC94B}">
-              <ma14:wrappingTextBoxFlag xmlns:ma14="http://schemas.microsoft.com/office/mac/drawingml/2011/main" xmlns:a14="http://schemas.microsoft.com/office/drawing/2010/main" xmlns:m="http://schemas.openxmlformats.org/officeDocument/2006/math" xmlns="" val="1"/>
+              <ma14:wrappingTextBoxFlag xmlns="" xmlns:m="http://schemas.openxmlformats.org/officeDocument/2006/math" xmlns:a14="http://schemas.microsoft.com/office/drawing/2010/main" xmlns:ma14="http://schemas.microsoft.com/office/mac/drawingml/2011/main" val="1"/>
             </a:ext>
           </a:extLst>
         </p:spPr>
@@ -16319,7 +16326,7 @@
           </a:ln>
           <a:extLst>
             <a:ext uri="{C572A759-6A51-4108-AA02-DFA0A04FC94B}">
-              <ma14:wrappingTextBoxFlag xmlns:ma14="http://schemas.microsoft.com/office/mac/drawingml/2011/main" xmlns:a14="http://schemas.microsoft.com/office/drawing/2010/main" xmlns:m="http://schemas.openxmlformats.org/officeDocument/2006/math" xmlns="" val="1"/>
+              <ma14:wrappingTextBoxFlag xmlns="" xmlns:m="http://schemas.openxmlformats.org/officeDocument/2006/math" xmlns:a14="http://schemas.microsoft.com/office/drawing/2010/main" xmlns:ma14="http://schemas.microsoft.com/office/mac/drawingml/2011/main" val="1"/>
             </a:ext>
           </a:extLst>
         </p:spPr>
@@ -16364,7 +16371,7 @@
           </a:ln>
           <a:extLst>
             <a:ext uri="{C572A759-6A51-4108-AA02-DFA0A04FC94B}">
-              <ma14:wrappingTextBoxFlag xmlns:ma14="http://schemas.microsoft.com/office/mac/drawingml/2011/main" xmlns:a14="http://schemas.microsoft.com/office/drawing/2010/main" xmlns:m="http://schemas.openxmlformats.org/officeDocument/2006/math" xmlns="" val="1"/>
+              <ma14:wrappingTextBoxFlag xmlns="" xmlns:m="http://schemas.openxmlformats.org/officeDocument/2006/math" xmlns:a14="http://schemas.microsoft.com/office/drawing/2010/main" xmlns:ma14="http://schemas.microsoft.com/office/mac/drawingml/2011/main" val="1"/>
             </a:ext>
           </a:extLst>
         </p:spPr>
@@ -16403,7 +16410,7 @@
           </a:ln>
           <a:extLst>
             <a:ext uri="{C572A759-6A51-4108-AA02-DFA0A04FC94B}">
-              <ma14:wrappingTextBoxFlag xmlns:ma14="http://schemas.microsoft.com/office/mac/drawingml/2011/main" xmlns:a14="http://schemas.microsoft.com/office/drawing/2010/main" xmlns:m="http://schemas.openxmlformats.org/officeDocument/2006/math" xmlns="" val="1"/>
+              <ma14:wrappingTextBoxFlag xmlns="" xmlns:m="http://schemas.openxmlformats.org/officeDocument/2006/math" xmlns:a14="http://schemas.microsoft.com/office/drawing/2010/main" xmlns:ma14="http://schemas.microsoft.com/office/mac/drawingml/2011/main" val="1"/>
             </a:ext>
           </a:extLst>
         </p:spPr>
@@ -16442,7 +16449,7 @@
           </a:ln>
           <a:extLst>
             <a:ext uri="{C572A759-6A51-4108-AA02-DFA0A04FC94B}">
-              <ma14:wrappingTextBoxFlag xmlns:ma14="http://schemas.microsoft.com/office/mac/drawingml/2011/main" xmlns:a14="http://schemas.microsoft.com/office/drawing/2010/main" xmlns:m="http://schemas.openxmlformats.org/officeDocument/2006/math" xmlns="" val="1"/>
+              <ma14:wrappingTextBoxFlag xmlns="" xmlns:m="http://schemas.openxmlformats.org/officeDocument/2006/math" xmlns:a14="http://schemas.microsoft.com/office/drawing/2010/main" xmlns:ma14="http://schemas.microsoft.com/office/mac/drawingml/2011/main" val="1"/>
             </a:ext>
           </a:extLst>
         </p:spPr>
@@ -16489,7 +16496,7 @@
           </a:ln>
           <a:extLst>
             <a:ext uri="{C572A759-6A51-4108-AA02-DFA0A04FC94B}">
-              <ma14:wrappingTextBoxFlag xmlns:ma14="http://schemas.microsoft.com/office/mac/drawingml/2011/main" xmlns:a14="http://schemas.microsoft.com/office/drawing/2010/main" xmlns:m="http://schemas.openxmlformats.org/officeDocument/2006/math" xmlns="" val="1"/>
+              <ma14:wrappingTextBoxFlag xmlns="" xmlns:m="http://schemas.openxmlformats.org/officeDocument/2006/math" xmlns:a14="http://schemas.microsoft.com/office/drawing/2010/main" xmlns:ma14="http://schemas.microsoft.com/office/mac/drawingml/2011/main" val="1"/>
             </a:ext>
           </a:extLst>
         </p:spPr>
@@ -16948,7 +16955,7 @@
           </a:ln>
           <a:extLst>
             <a:ext uri="{C572A759-6A51-4108-AA02-DFA0A04FC94B}">
-              <ma14:wrappingTextBoxFlag xmlns:ma14="http://schemas.microsoft.com/office/mac/drawingml/2011/main" xmlns:a14="http://schemas.microsoft.com/office/drawing/2010/main" xmlns:m="http://schemas.openxmlformats.org/officeDocument/2006/math" xmlns="" val="1"/>
+              <ma14:wrappingTextBoxFlag xmlns="" xmlns:m="http://schemas.openxmlformats.org/officeDocument/2006/math" xmlns:a14="http://schemas.microsoft.com/office/drawing/2010/main" xmlns:ma14="http://schemas.microsoft.com/office/mac/drawingml/2011/main" val="1"/>
             </a:ext>
           </a:extLst>
         </p:spPr>
@@ -16983,7 +16990,7 @@
           </a:ln>
           <a:extLst>
             <a:ext uri="{C572A759-6A51-4108-AA02-DFA0A04FC94B}">
-              <ma14:wrappingTextBoxFlag xmlns:ma14="http://schemas.microsoft.com/office/mac/drawingml/2011/main" xmlns:a14="http://schemas.microsoft.com/office/drawing/2010/main" xmlns:m="http://schemas.openxmlformats.org/officeDocument/2006/math" xmlns="" val="1"/>
+              <ma14:wrappingTextBoxFlag xmlns="" xmlns:m="http://schemas.openxmlformats.org/officeDocument/2006/math" xmlns:a14="http://schemas.microsoft.com/office/drawing/2010/main" xmlns:ma14="http://schemas.microsoft.com/office/mac/drawingml/2011/main" val="1"/>
             </a:ext>
           </a:extLst>
         </p:spPr>
@@ -17018,7 +17025,7 @@
           </a:ln>
           <a:extLst>
             <a:ext uri="{C572A759-6A51-4108-AA02-DFA0A04FC94B}">
-              <ma14:wrappingTextBoxFlag xmlns:ma14="http://schemas.microsoft.com/office/mac/drawingml/2011/main" xmlns:a14="http://schemas.microsoft.com/office/drawing/2010/main" xmlns:m="http://schemas.openxmlformats.org/officeDocument/2006/math" xmlns="" val="1"/>
+              <ma14:wrappingTextBoxFlag xmlns="" xmlns:m="http://schemas.openxmlformats.org/officeDocument/2006/math" xmlns:a14="http://schemas.microsoft.com/office/drawing/2010/main" xmlns:ma14="http://schemas.microsoft.com/office/mac/drawingml/2011/main" val="1"/>
             </a:ext>
           </a:extLst>
         </p:spPr>
@@ -17104,7 +17111,7 @@
           </a:ln>
           <a:extLst>
             <a:ext uri="{C572A759-6A51-4108-AA02-DFA0A04FC94B}">
-              <ma14:wrappingTextBoxFlag xmlns:ma14="http://schemas.microsoft.com/office/mac/drawingml/2011/main" xmlns:a14="http://schemas.microsoft.com/office/drawing/2010/main" xmlns:m="http://schemas.openxmlformats.org/officeDocument/2006/math" xmlns="" val="1"/>
+              <ma14:wrappingTextBoxFlag xmlns="" xmlns:m="http://schemas.openxmlformats.org/officeDocument/2006/math" xmlns:a14="http://schemas.microsoft.com/office/drawing/2010/main" xmlns:ma14="http://schemas.microsoft.com/office/mac/drawingml/2011/main" val="1"/>
             </a:ext>
           </a:extLst>
         </p:spPr>
@@ -17149,7 +17156,7 @@
           </a:ln>
           <a:extLst>
             <a:ext uri="{C572A759-6A51-4108-AA02-DFA0A04FC94B}">
-              <ma14:wrappingTextBoxFlag xmlns:ma14="http://schemas.microsoft.com/office/mac/drawingml/2011/main" xmlns:a14="http://schemas.microsoft.com/office/drawing/2010/main" xmlns:m="http://schemas.openxmlformats.org/officeDocument/2006/math" xmlns="" val="1"/>
+              <ma14:wrappingTextBoxFlag xmlns="" xmlns:m="http://schemas.openxmlformats.org/officeDocument/2006/math" xmlns:a14="http://schemas.microsoft.com/office/drawing/2010/main" xmlns:ma14="http://schemas.microsoft.com/office/mac/drawingml/2011/main" val="1"/>
             </a:ext>
           </a:extLst>
         </p:spPr>
@@ -17191,7 +17198,7 @@
           </a:ln>
           <a:extLst>
             <a:ext uri="{C572A759-6A51-4108-AA02-DFA0A04FC94B}">
-              <ma14:wrappingTextBoxFlag xmlns:ma14="http://schemas.microsoft.com/office/mac/drawingml/2011/main" xmlns:a14="http://schemas.microsoft.com/office/drawing/2010/main" xmlns:m="http://schemas.openxmlformats.org/officeDocument/2006/math" xmlns="" val="1"/>
+              <ma14:wrappingTextBoxFlag xmlns="" xmlns:m="http://schemas.openxmlformats.org/officeDocument/2006/math" xmlns:a14="http://schemas.microsoft.com/office/drawing/2010/main" xmlns:ma14="http://schemas.microsoft.com/office/mac/drawingml/2011/main" val="1"/>
             </a:ext>
           </a:extLst>
         </p:spPr>
@@ -17236,7 +17243,7 @@
           </a:ln>
           <a:extLst>
             <a:ext uri="{C572A759-6A51-4108-AA02-DFA0A04FC94B}">
-              <ma14:wrappingTextBoxFlag xmlns:ma14="http://schemas.microsoft.com/office/mac/drawingml/2011/main" xmlns:a14="http://schemas.microsoft.com/office/drawing/2010/main" xmlns:m="http://schemas.openxmlformats.org/officeDocument/2006/math" xmlns="" val="1"/>
+              <ma14:wrappingTextBoxFlag xmlns="" xmlns:m="http://schemas.openxmlformats.org/officeDocument/2006/math" xmlns:a14="http://schemas.microsoft.com/office/drawing/2010/main" xmlns:ma14="http://schemas.microsoft.com/office/mac/drawingml/2011/main" val="1"/>
             </a:ext>
           </a:extLst>
         </p:spPr>
@@ -17275,7 +17282,7 @@
           </a:ln>
           <a:extLst>
             <a:ext uri="{C572A759-6A51-4108-AA02-DFA0A04FC94B}">
-              <ma14:wrappingTextBoxFlag xmlns:ma14="http://schemas.microsoft.com/office/mac/drawingml/2011/main" xmlns:a14="http://schemas.microsoft.com/office/drawing/2010/main" xmlns:m="http://schemas.openxmlformats.org/officeDocument/2006/math" xmlns="" val="1"/>
+              <ma14:wrappingTextBoxFlag xmlns="" xmlns:m="http://schemas.openxmlformats.org/officeDocument/2006/math" xmlns:a14="http://schemas.microsoft.com/office/drawing/2010/main" xmlns:ma14="http://schemas.microsoft.com/office/mac/drawingml/2011/main" val="1"/>
             </a:ext>
           </a:extLst>
         </p:spPr>
@@ -17314,7 +17321,7 @@
           </a:ln>
           <a:extLst>
             <a:ext uri="{C572A759-6A51-4108-AA02-DFA0A04FC94B}">
-              <ma14:wrappingTextBoxFlag xmlns:ma14="http://schemas.microsoft.com/office/mac/drawingml/2011/main" xmlns:a14="http://schemas.microsoft.com/office/drawing/2010/main" xmlns:m="http://schemas.openxmlformats.org/officeDocument/2006/math" xmlns="" val="1"/>
+              <ma14:wrappingTextBoxFlag xmlns="" xmlns:m="http://schemas.openxmlformats.org/officeDocument/2006/math" xmlns:a14="http://schemas.microsoft.com/office/drawing/2010/main" xmlns:ma14="http://schemas.microsoft.com/office/mac/drawingml/2011/main" val="1"/>
             </a:ext>
           </a:extLst>
         </p:spPr>
@@ -17361,7 +17368,7 @@
           </a:ln>
           <a:extLst>
             <a:ext uri="{C572A759-6A51-4108-AA02-DFA0A04FC94B}">
-              <ma14:wrappingTextBoxFlag xmlns:ma14="http://schemas.microsoft.com/office/mac/drawingml/2011/main" xmlns:a14="http://schemas.microsoft.com/office/drawing/2010/main" xmlns:m="http://schemas.openxmlformats.org/officeDocument/2006/math" xmlns="" val="1"/>
+              <ma14:wrappingTextBoxFlag xmlns="" xmlns:m="http://schemas.openxmlformats.org/officeDocument/2006/math" xmlns:a14="http://schemas.microsoft.com/office/drawing/2010/main" xmlns:ma14="http://schemas.microsoft.com/office/mac/drawingml/2011/main" val="1"/>
             </a:ext>
           </a:extLst>
         </p:spPr>
@@ -17692,7 +17699,7 @@
           </a:ln>
           <a:extLst>
             <a:ext uri="{C572A759-6A51-4108-AA02-DFA0A04FC94B}">
-              <ma14:wrappingTextBoxFlag xmlns:ma14="http://schemas.microsoft.com/office/mac/drawingml/2011/main" xmlns:a14="http://schemas.microsoft.com/office/drawing/2010/main" xmlns:m="http://schemas.openxmlformats.org/officeDocument/2006/math" xmlns="" val="1"/>
+              <ma14:wrappingTextBoxFlag xmlns="" xmlns:m="http://schemas.openxmlformats.org/officeDocument/2006/math" xmlns:a14="http://schemas.microsoft.com/office/drawing/2010/main" xmlns:ma14="http://schemas.microsoft.com/office/mac/drawingml/2011/main" val="1"/>
             </a:ext>
           </a:extLst>
         </p:spPr>
@@ -17727,7 +17734,7 @@
           </a:ln>
           <a:extLst>
             <a:ext uri="{C572A759-6A51-4108-AA02-DFA0A04FC94B}">
-              <ma14:wrappingTextBoxFlag xmlns:ma14="http://schemas.microsoft.com/office/mac/drawingml/2011/main" xmlns:a14="http://schemas.microsoft.com/office/drawing/2010/main" xmlns:m="http://schemas.openxmlformats.org/officeDocument/2006/math" xmlns="" val="1"/>
+              <ma14:wrappingTextBoxFlag xmlns="" xmlns:m="http://schemas.openxmlformats.org/officeDocument/2006/math" xmlns:a14="http://schemas.microsoft.com/office/drawing/2010/main" xmlns:ma14="http://schemas.microsoft.com/office/mac/drawingml/2011/main" val="1"/>
             </a:ext>
           </a:extLst>
         </p:spPr>
@@ -17762,7 +17769,7 @@
           </a:ln>
           <a:extLst>
             <a:ext uri="{C572A759-6A51-4108-AA02-DFA0A04FC94B}">
-              <ma14:wrappingTextBoxFlag xmlns:ma14="http://schemas.microsoft.com/office/mac/drawingml/2011/main" xmlns:a14="http://schemas.microsoft.com/office/drawing/2010/main" xmlns:m="http://schemas.openxmlformats.org/officeDocument/2006/math" xmlns="" val="1"/>
+              <ma14:wrappingTextBoxFlag xmlns="" xmlns:m="http://schemas.openxmlformats.org/officeDocument/2006/math" xmlns:a14="http://schemas.microsoft.com/office/drawing/2010/main" xmlns:ma14="http://schemas.microsoft.com/office/mac/drawingml/2011/main" val="1"/>
             </a:ext>
           </a:extLst>
         </p:spPr>
@@ -17848,7 +17855,7 @@
           </a:ln>
           <a:extLst>
             <a:ext uri="{C572A759-6A51-4108-AA02-DFA0A04FC94B}">
-              <ma14:wrappingTextBoxFlag xmlns:ma14="http://schemas.microsoft.com/office/mac/drawingml/2011/main" xmlns:a14="http://schemas.microsoft.com/office/drawing/2010/main" xmlns:m="http://schemas.openxmlformats.org/officeDocument/2006/math" xmlns="" val="1"/>
+              <ma14:wrappingTextBoxFlag xmlns="" xmlns:m="http://schemas.openxmlformats.org/officeDocument/2006/math" xmlns:a14="http://schemas.microsoft.com/office/drawing/2010/main" xmlns:ma14="http://schemas.microsoft.com/office/mac/drawingml/2011/main" val="1"/>
             </a:ext>
           </a:extLst>
         </p:spPr>
@@ -17893,7 +17900,7 @@
           </a:ln>
           <a:extLst>
             <a:ext uri="{C572A759-6A51-4108-AA02-DFA0A04FC94B}">
-              <ma14:wrappingTextBoxFlag xmlns:ma14="http://schemas.microsoft.com/office/mac/drawingml/2011/main" xmlns:a14="http://schemas.microsoft.com/office/drawing/2010/main" xmlns:m="http://schemas.openxmlformats.org/officeDocument/2006/math" xmlns="" val="1"/>
+              <ma14:wrappingTextBoxFlag xmlns="" xmlns:m="http://schemas.openxmlformats.org/officeDocument/2006/math" xmlns:a14="http://schemas.microsoft.com/office/drawing/2010/main" xmlns:ma14="http://schemas.microsoft.com/office/mac/drawingml/2011/main" val="1"/>
             </a:ext>
           </a:extLst>
         </p:spPr>
@@ -17935,7 +17942,7 @@
           </a:ln>
           <a:extLst>
             <a:ext uri="{C572A759-6A51-4108-AA02-DFA0A04FC94B}">
-              <ma14:wrappingTextBoxFlag xmlns:ma14="http://schemas.microsoft.com/office/mac/drawingml/2011/main" xmlns:a14="http://schemas.microsoft.com/office/drawing/2010/main" xmlns:m="http://schemas.openxmlformats.org/officeDocument/2006/math" xmlns="" val="1"/>
+              <ma14:wrappingTextBoxFlag xmlns="" xmlns:m="http://schemas.openxmlformats.org/officeDocument/2006/math" xmlns:a14="http://schemas.microsoft.com/office/drawing/2010/main" xmlns:ma14="http://schemas.microsoft.com/office/mac/drawingml/2011/main" val="1"/>
             </a:ext>
           </a:extLst>
         </p:spPr>
@@ -17980,7 +17987,7 @@
           </a:ln>
           <a:extLst>
             <a:ext uri="{C572A759-6A51-4108-AA02-DFA0A04FC94B}">
-              <ma14:wrappingTextBoxFlag xmlns:ma14="http://schemas.microsoft.com/office/mac/drawingml/2011/main" xmlns:a14="http://schemas.microsoft.com/office/drawing/2010/main" xmlns:m="http://schemas.openxmlformats.org/officeDocument/2006/math" xmlns="" val="1"/>
+              <ma14:wrappingTextBoxFlag xmlns="" xmlns:m="http://schemas.openxmlformats.org/officeDocument/2006/math" xmlns:a14="http://schemas.microsoft.com/office/drawing/2010/main" xmlns:ma14="http://schemas.microsoft.com/office/mac/drawingml/2011/main" val="1"/>
             </a:ext>
           </a:extLst>
         </p:spPr>
@@ -18019,7 +18026,7 @@
           </a:ln>
           <a:extLst>
             <a:ext uri="{C572A759-6A51-4108-AA02-DFA0A04FC94B}">
-              <ma14:wrappingTextBoxFlag xmlns:ma14="http://schemas.microsoft.com/office/mac/drawingml/2011/main" xmlns:a14="http://schemas.microsoft.com/office/drawing/2010/main" xmlns:m="http://schemas.openxmlformats.org/officeDocument/2006/math" xmlns="" val="1"/>
+              <ma14:wrappingTextBoxFlag xmlns="" xmlns:m="http://schemas.openxmlformats.org/officeDocument/2006/math" xmlns:a14="http://schemas.microsoft.com/office/drawing/2010/main" xmlns:ma14="http://schemas.microsoft.com/office/mac/drawingml/2011/main" val="1"/>
             </a:ext>
           </a:extLst>
         </p:spPr>
@@ -18058,7 +18065,7 @@
           </a:ln>
           <a:extLst>
             <a:ext uri="{C572A759-6A51-4108-AA02-DFA0A04FC94B}">
-              <ma14:wrappingTextBoxFlag xmlns:ma14="http://schemas.microsoft.com/office/mac/drawingml/2011/main" xmlns:a14="http://schemas.microsoft.com/office/drawing/2010/main" xmlns:m="http://schemas.openxmlformats.org/officeDocument/2006/math" xmlns="" val="1"/>
+              <ma14:wrappingTextBoxFlag xmlns="" xmlns:m="http://schemas.openxmlformats.org/officeDocument/2006/math" xmlns:a14="http://schemas.microsoft.com/office/drawing/2010/main" xmlns:ma14="http://schemas.microsoft.com/office/mac/drawingml/2011/main" val="1"/>
             </a:ext>
           </a:extLst>
         </p:spPr>
@@ -18105,7 +18112,7 @@
           </a:ln>
           <a:extLst>
             <a:ext uri="{C572A759-6A51-4108-AA02-DFA0A04FC94B}">
-              <ma14:wrappingTextBoxFlag xmlns:ma14="http://schemas.microsoft.com/office/mac/drawingml/2011/main" xmlns:a14="http://schemas.microsoft.com/office/drawing/2010/main" xmlns:m="http://schemas.openxmlformats.org/officeDocument/2006/math" xmlns="" val="1"/>
+              <ma14:wrappingTextBoxFlag xmlns="" xmlns:m="http://schemas.openxmlformats.org/officeDocument/2006/math" xmlns:a14="http://schemas.microsoft.com/office/drawing/2010/main" xmlns:ma14="http://schemas.microsoft.com/office/mac/drawingml/2011/main" val="1"/>
             </a:ext>
           </a:extLst>
         </p:spPr>
@@ -18436,7 +18443,7 @@
           </a:ln>
           <a:extLst>
             <a:ext uri="{C572A759-6A51-4108-AA02-DFA0A04FC94B}">
-              <ma14:wrappingTextBoxFlag xmlns:ma14="http://schemas.microsoft.com/office/mac/drawingml/2011/main" xmlns:a14="http://schemas.microsoft.com/office/drawing/2010/main" xmlns:m="http://schemas.openxmlformats.org/officeDocument/2006/math" xmlns="" val="1"/>
+              <ma14:wrappingTextBoxFlag xmlns="" xmlns:m="http://schemas.openxmlformats.org/officeDocument/2006/math" xmlns:a14="http://schemas.microsoft.com/office/drawing/2010/main" xmlns:ma14="http://schemas.microsoft.com/office/mac/drawingml/2011/main" val="1"/>
             </a:ext>
           </a:extLst>
         </p:spPr>
@@ -18471,7 +18478,7 @@
           </a:ln>
           <a:extLst>
             <a:ext uri="{C572A759-6A51-4108-AA02-DFA0A04FC94B}">
-              <ma14:wrappingTextBoxFlag xmlns:ma14="http://schemas.microsoft.com/office/mac/drawingml/2011/main" xmlns:a14="http://schemas.microsoft.com/office/drawing/2010/main" xmlns:m="http://schemas.openxmlformats.org/officeDocument/2006/math" xmlns="" val="1"/>
+              <ma14:wrappingTextBoxFlag xmlns="" xmlns:m="http://schemas.openxmlformats.org/officeDocument/2006/math" xmlns:a14="http://schemas.microsoft.com/office/drawing/2010/main" xmlns:ma14="http://schemas.microsoft.com/office/mac/drawingml/2011/main" val="1"/>
             </a:ext>
           </a:extLst>
         </p:spPr>
@@ -18506,7 +18513,7 @@
           </a:ln>
           <a:extLst>
             <a:ext uri="{C572A759-6A51-4108-AA02-DFA0A04FC94B}">
-              <ma14:wrappingTextBoxFlag xmlns:ma14="http://schemas.microsoft.com/office/mac/drawingml/2011/main" xmlns:a14="http://schemas.microsoft.com/office/drawing/2010/main" xmlns:m="http://schemas.openxmlformats.org/officeDocument/2006/math" xmlns="" val="1"/>
+              <ma14:wrappingTextBoxFlag xmlns="" xmlns:m="http://schemas.openxmlformats.org/officeDocument/2006/math" xmlns:a14="http://schemas.microsoft.com/office/drawing/2010/main" xmlns:ma14="http://schemas.microsoft.com/office/mac/drawingml/2011/main" val="1"/>
             </a:ext>
           </a:extLst>
         </p:spPr>
@@ -18592,7 +18599,7 @@
           </a:ln>
           <a:extLst>
             <a:ext uri="{C572A759-6A51-4108-AA02-DFA0A04FC94B}">
-              <ma14:wrappingTextBoxFlag xmlns:ma14="http://schemas.microsoft.com/office/mac/drawingml/2011/main" xmlns:a14="http://schemas.microsoft.com/office/drawing/2010/main" xmlns:m="http://schemas.openxmlformats.org/officeDocument/2006/math" xmlns="" val="1"/>
+              <ma14:wrappingTextBoxFlag xmlns="" xmlns:m="http://schemas.openxmlformats.org/officeDocument/2006/math" xmlns:a14="http://schemas.microsoft.com/office/drawing/2010/main" xmlns:ma14="http://schemas.microsoft.com/office/mac/drawingml/2011/main" val="1"/>
             </a:ext>
           </a:extLst>
         </p:spPr>
@@ -18637,7 +18644,7 @@
           </a:ln>
           <a:extLst>
             <a:ext uri="{C572A759-6A51-4108-AA02-DFA0A04FC94B}">
-              <ma14:wrappingTextBoxFlag xmlns:ma14="http://schemas.microsoft.com/office/mac/drawingml/2011/main" xmlns:a14="http://schemas.microsoft.com/office/drawing/2010/main" xmlns:m="http://schemas.openxmlformats.org/officeDocument/2006/math" xmlns="" val="1"/>
+              <ma14:wrappingTextBoxFlag xmlns="" xmlns:m="http://schemas.openxmlformats.org/officeDocument/2006/math" xmlns:a14="http://schemas.microsoft.com/office/drawing/2010/main" xmlns:ma14="http://schemas.microsoft.com/office/mac/drawingml/2011/main" val="1"/>
             </a:ext>
           </a:extLst>
         </p:spPr>
@@ -18679,7 +18686,7 @@
           </a:ln>
           <a:extLst>
             <a:ext uri="{C572A759-6A51-4108-AA02-DFA0A04FC94B}">
-              <ma14:wrappingTextBoxFlag xmlns:ma14="http://schemas.microsoft.com/office/mac/drawingml/2011/main" xmlns:a14="http://schemas.microsoft.com/office/drawing/2010/main" xmlns:m="http://schemas.openxmlformats.org/officeDocument/2006/math" xmlns="" val="1"/>
+              <ma14:wrappingTextBoxFlag xmlns="" xmlns:m="http://schemas.openxmlformats.org/officeDocument/2006/math" xmlns:a14="http://schemas.microsoft.com/office/drawing/2010/main" xmlns:ma14="http://schemas.microsoft.com/office/mac/drawingml/2011/main" val="1"/>
             </a:ext>
           </a:extLst>
         </p:spPr>
@@ -18724,7 +18731,7 @@
           </a:ln>
           <a:extLst>
             <a:ext uri="{C572A759-6A51-4108-AA02-DFA0A04FC94B}">
-              <ma14:wrappingTextBoxFlag xmlns:ma14="http://schemas.microsoft.com/office/mac/drawingml/2011/main" xmlns:a14="http://schemas.microsoft.com/office/drawing/2010/main" xmlns:m="http://schemas.openxmlformats.org/officeDocument/2006/math" xmlns="" val="1"/>
+              <ma14:wrappingTextBoxFlag xmlns="" xmlns:m="http://schemas.openxmlformats.org/officeDocument/2006/math" xmlns:a14="http://schemas.microsoft.com/office/drawing/2010/main" xmlns:ma14="http://schemas.microsoft.com/office/mac/drawingml/2011/main" val="1"/>
             </a:ext>
           </a:extLst>
         </p:spPr>
@@ -18763,7 +18770,7 @@
           </a:ln>
           <a:extLst>
             <a:ext uri="{C572A759-6A51-4108-AA02-DFA0A04FC94B}">
-              <ma14:wrappingTextBoxFlag xmlns:ma14="http://schemas.microsoft.com/office/mac/drawingml/2011/main" xmlns:a14="http://schemas.microsoft.com/office/drawing/2010/main" xmlns:m="http://schemas.openxmlformats.org/officeDocument/2006/math" xmlns="" val="1"/>
+              <ma14:wrappingTextBoxFlag xmlns="" xmlns:m="http://schemas.openxmlformats.org/officeDocument/2006/math" xmlns:a14="http://schemas.microsoft.com/office/drawing/2010/main" xmlns:ma14="http://schemas.microsoft.com/office/mac/drawingml/2011/main" val="1"/>
             </a:ext>
           </a:extLst>
         </p:spPr>
@@ -18802,7 +18809,7 @@
           </a:ln>
           <a:extLst>
             <a:ext uri="{C572A759-6A51-4108-AA02-DFA0A04FC94B}">
-              <ma14:wrappingTextBoxFlag xmlns:ma14="http://schemas.microsoft.com/office/mac/drawingml/2011/main" xmlns:a14="http://schemas.microsoft.com/office/drawing/2010/main" xmlns:m="http://schemas.openxmlformats.org/officeDocument/2006/math" xmlns="" val="1"/>
+              <ma14:wrappingTextBoxFlag xmlns="" xmlns:m="http://schemas.openxmlformats.org/officeDocument/2006/math" xmlns:a14="http://schemas.microsoft.com/office/drawing/2010/main" xmlns:ma14="http://schemas.microsoft.com/office/mac/drawingml/2011/main" val="1"/>
             </a:ext>
           </a:extLst>
         </p:spPr>
@@ -18849,7 +18856,7 @@
           </a:ln>
           <a:extLst>
             <a:ext uri="{C572A759-6A51-4108-AA02-DFA0A04FC94B}">
-              <ma14:wrappingTextBoxFlag xmlns:ma14="http://schemas.microsoft.com/office/mac/drawingml/2011/main" xmlns:a14="http://schemas.microsoft.com/office/drawing/2010/main" xmlns:m="http://schemas.openxmlformats.org/officeDocument/2006/math" xmlns="" val="1"/>
+              <ma14:wrappingTextBoxFlag xmlns="" xmlns:m="http://schemas.openxmlformats.org/officeDocument/2006/math" xmlns:a14="http://schemas.microsoft.com/office/drawing/2010/main" xmlns:ma14="http://schemas.microsoft.com/office/mac/drawingml/2011/main" val="1"/>
             </a:ext>
           </a:extLst>
         </p:spPr>
@@ -19180,7 +19187,7 @@
           </a:ln>
           <a:extLst>
             <a:ext uri="{C572A759-6A51-4108-AA02-DFA0A04FC94B}">
-              <ma14:wrappingTextBoxFlag xmlns:ma14="http://schemas.microsoft.com/office/mac/drawingml/2011/main" xmlns:a14="http://schemas.microsoft.com/office/drawing/2010/main" xmlns:m="http://schemas.openxmlformats.org/officeDocument/2006/math" xmlns="" val="1"/>
+              <ma14:wrappingTextBoxFlag xmlns="" xmlns:m="http://schemas.openxmlformats.org/officeDocument/2006/math" xmlns:a14="http://schemas.microsoft.com/office/drawing/2010/main" xmlns:ma14="http://schemas.microsoft.com/office/mac/drawingml/2011/main" val="1"/>
             </a:ext>
           </a:extLst>
         </p:spPr>
@@ -19215,7 +19222,7 @@
           </a:ln>
           <a:extLst>
             <a:ext uri="{C572A759-6A51-4108-AA02-DFA0A04FC94B}">
-              <ma14:wrappingTextBoxFlag xmlns:ma14="http://schemas.microsoft.com/office/mac/drawingml/2011/main" xmlns:a14="http://schemas.microsoft.com/office/drawing/2010/main" xmlns:m="http://schemas.openxmlformats.org/officeDocument/2006/math" xmlns="" val="1"/>
+              <ma14:wrappingTextBoxFlag xmlns="" xmlns:m="http://schemas.openxmlformats.org/officeDocument/2006/math" xmlns:a14="http://schemas.microsoft.com/office/drawing/2010/main" xmlns:ma14="http://schemas.microsoft.com/office/mac/drawingml/2011/main" val="1"/>
             </a:ext>
           </a:extLst>
         </p:spPr>
@@ -19250,7 +19257,7 @@
           </a:ln>
           <a:extLst>
             <a:ext uri="{C572A759-6A51-4108-AA02-DFA0A04FC94B}">
-              <ma14:wrappingTextBoxFlag xmlns:ma14="http://schemas.microsoft.com/office/mac/drawingml/2011/main" xmlns:a14="http://schemas.microsoft.com/office/drawing/2010/main" xmlns:m="http://schemas.openxmlformats.org/officeDocument/2006/math" xmlns="" val="1"/>
+              <ma14:wrappingTextBoxFlag xmlns="" xmlns:m="http://schemas.openxmlformats.org/officeDocument/2006/math" xmlns:a14="http://schemas.microsoft.com/office/drawing/2010/main" xmlns:ma14="http://schemas.microsoft.com/office/mac/drawingml/2011/main" val="1"/>
             </a:ext>
           </a:extLst>
         </p:spPr>
@@ -19336,7 +19343,7 @@
           </a:ln>
           <a:extLst>
             <a:ext uri="{C572A759-6A51-4108-AA02-DFA0A04FC94B}">
-              <ma14:wrappingTextBoxFlag xmlns:ma14="http://schemas.microsoft.com/office/mac/drawingml/2011/main" xmlns:a14="http://schemas.microsoft.com/office/drawing/2010/main" xmlns:m="http://schemas.openxmlformats.org/officeDocument/2006/math" xmlns="" val="1"/>
+              <ma14:wrappingTextBoxFlag xmlns="" xmlns:m="http://schemas.openxmlformats.org/officeDocument/2006/math" xmlns:a14="http://schemas.microsoft.com/office/drawing/2010/main" xmlns:ma14="http://schemas.microsoft.com/office/mac/drawingml/2011/main" val="1"/>
             </a:ext>
           </a:extLst>
         </p:spPr>
@@ -19381,7 +19388,7 @@
           </a:ln>
           <a:extLst>
             <a:ext uri="{C572A759-6A51-4108-AA02-DFA0A04FC94B}">
-              <ma14:wrappingTextBoxFlag xmlns:ma14="http://schemas.microsoft.com/office/mac/drawingml/2011/main" xmlns:a14="http://schemas.microsoft.com/office/drawing/2010/main" xmlns:m="http://schemas.openxmlformats.org/officeDocument/2006/math" xmlns="" val="1"/>
+              <ma14:wrappingTextBoxFlag xmlns="" xmlns:m="http://schemas.openxmlformats.org/officeDocument/2006/math" xmlns:a14="http://schemas.microsoft.com/office/drawing/2010/main" xmlns:ma14="http://schemas.microsoft.com/office/mac/drawingml/2011/main" val="1"/>
             </a:ext>
           </a:extLst>
         </p:spPr>
@@ -19423,7 +19430,7 @@
           </a:ln>
           <a:extLst>
             <a:ext uri="{C572A759-6A51-4108-AA02-DFA0A04FC94B}">
-              <ma14:wrappingTextBoxFlag xmlns:ma14="http://schemas.microsoft.com/office/mac/drawingml/2011/main" xmlns:a14="http://schemas.microsoft.com/office/drawing/2010/main" xmlns:m="http://schemas.openxmlformats.org/officeDocument/2006/math" xmlns="" val="1"/>
+              <ma14:wrappingTextBoxFlag xmlns="" xmlns:m="http://schemas.openxmlformats.org/officeDocument/2006/math" xmlns:a14="http://schemas.microsoft.com/office/drawing/2010/main" xmlns:ma14="http://schemas.microsoft.com/office/mac/drawingml/2011/main" val="1"/>
             </a:ext>
           </a:extLst>
         </p:spPr>
@@ -19468,7 +19475,7 @@
           </a:ln>
           <a:extLst>
             <a:ext uri="{C572A759-6A51-4108-AA02-DFA0A04FC94B}">
-              <ma14:wrappingTextBoxFlag xmlns:ma14="http://schemas.microsoft.com/office/mac/drawingml/2011/main" xmlns:a14="http://schemas.microsoft.com/office/drawing/2010/main" xmlns:m="http://schemas.openxmlformats.org/officeDocument/2006/math" xmlns="" val="1"/>
+              <ma14:wrappingTextBoxFlag xmlns="" xmlns:m="http://schemas.openxmlformats.org/officeDocument/2006/math" xmlns:a14="http://schemas.microsoft.com/office/drawing/2010/main" xmlns:ma14="http://schemas.microsoft.com/office/mac/drawingml/2011/main" val="1"/>
             </a:ext>
           </a:extLst>
         </p:spPr>
@@ -19507,7 +19514,7 @@
           </a:ln>
           <a:extLst>
             <a:ext uri="{C572A759-6A51-4108-AA02-DFA0A04FC94B}">
-              <ma14:wrappingTextBoxFlag xmlns:ma14="http://schemas.microsoft.com/office/mac/drawingml/2011/main" xmlns:a14="http://schemas.microsoft.com/office/drawing/2010/main" xmlns:m="http://schemas.openxmlformats.org/officeDocument/2006/math" xmlns="" val="1"/>
+              <ma14:wrappingTextBoxFlag xmlns="" xmlns:m="http://schemas.openxmlformats.org/officeDocument/2006/math" xmlns:a14="http://schemas.microsoft.com/office/drawing/2010/main" xmlns:ma14="http://schemas.microsoft.com/office/mac/drawingml/2011/main" val="1"/>
             </a:ext>
           </a:extLst>
         </p:spPr>
@@ -19546,7 +19553,7 @@
           </a:ln>
           <a:extLst>
             <a:ext uri="{C572A759-6A51-4108-AA02-DFA0A04FC94B}">
-              <ma14:wrappingTextBoxFlag xmlns:ma14="http://schemas.microsoft.com/office/mac/drawingml/2011/main" xmlns:a14="http://schemas.microsoft.com/office/drawing/2010/main" xmlns:m="http://schemas.openxmlformats.org/officeDocument/2006/math" xmlns="" val="1"/>
+              <ma14:wrappingTextBoxFlag xmlns="" xmlns:m="http://schemas.openxmlformats.org/officeDocument/2006/math" xmlns:a14="http://schemas.microsoft.com/office/drawing/2010/main" xmlns:ma14="http://schemas.microsoft.com/office/mac/drawingml/2011/main" val="1"/>
             </a:ext>
           </a:extLst>
         </p:spPr>
@@ -19593,7 +19600,7 @@
           </a:ln>
           <a:extLst>
             <a:ext uri="{C572A759-6A51-4108-AA02-DFA0A04FC94B}">
-              <ma14:wrappingTextBoxFlag xmlns:ma14="http://schemas.microsoft.com/office/mac/drawingml/2011/main" xmlns:a14="http://schemas.microsoft.com/office/drawing/2010/main" xmlns:m="http://schemas.openxmlformats.org/officeDocument/2006/math" xmlns="" val="1"/>
+              <ma14:wrappingTextBoxFlag xmlns="" xmlns:m="http://schemas.openxmlformats.org/officeDocument/2006/math" xmlns:a14="http://schemas.microsoft.com/office/drawing/2010/main" xmlns:ma14="http://schemas.microsoft.com/office/mac/drawingml/2011/main" val="1"/>
             </a:ext>
           </a:extLst>
         </p:spPr>
@@ -19637,7 +19644,7 @@
           </a:ln>
           <a:extLst>
             <a:ext uri="{C572A759-6A51-4108-AA02-DFA0A04FC94B}">
-              <ma14:wrappingTextBoxFlag xmlns:ma14="http://schemas.microsoft.com/office/mac/drawingml/2011/main" xmlns:a14="http://schemas.microsoft.com/office/drawing/2010/main" xmlns:m="http://schemas.openxmlformats.org/officeDocument/2006/math" xmlns="" val="1"/>
+              <ma14:wrappingTextBoxFlag xmlns="" xmlns:m="http://schemas.openxmlformats.org/officeDocument/2006/math" xmlns:a14="http://schemas.microsoft.com/office/drawing/2010/main" xmlns:ma14="http://schemas.microsoft.com/office/mac/drawingml/2011/main" val="1"/>
             </a:ext>
           </a:extLst>
         </p:spPr>
@@ -19814,7 +19821,7 @@
           </a:ln>
           <a:extLst>
             <a:ext uri="{C572A759-6A51-4108-AA02-DFA0A04FC94B}">
-              <ma14:wrappingTextBoxFlag xmlns:ma14="http://schemas.microsoft.com/office/mac/drawingml/2011/main" xmlns:a14="http://schemas.microsoft.com/office/drawing/2010/main" xmlns:m="http://schemas.openxmlformats.org/officeDocument/2006/math" xmlns="" val="1"/>
+              <ma14:wrappingTextBoxFlag xmlns="" xmlns:m="http://schemas.openxmlformats.org/officeDocument/2006/math" xmlns:a14="http://schemas.microsoft.com/office/drawing/2010/main" xmlns:ma14="http://schemas.microsoft.com/office/mac/drawingml/2011/main" val="1"/>
             </a:ext>
           </a:extLst>
         </p:spPr>
@@ -19861,7 +19868,7 @@
           </a:ln>
           <a:extLst>
             <a:ext uri="{C572A759-6A51-4108-AA02-DFA0A04FC94B}">
-              <ma14:wrappingTextBoxFlag xmlns:ma14="http://schemas.microsoft.com/office/mac/drawingml/2011/main" xmlns:a14="http://schemas.microsoft.com/office/drawing/2010/main" xmlns:m="http://schemas.openxmlformats.org/officeDocument/2006/math" xmlns="" val="1"/>
+              <ma14:wrappingTextBoxFlag xmlns="" xmlns:m="http://schemas.openxmlformats.org/officeDocument/2006/math" xmlns:a14="http://schemas.microsoft.com/office/drawing/2010/main" xmlns:ma14="http://schemas.microsoft.com/office/mac/drawingml/2011/main" val="1"/>
             </a:ext>
           </a:extLst>
         </p:spPr>
@@ -19923,7 +19930,7 @@
           </a:ln>
           <a:extLst>
             <a:ext uri="{C572A759-6A51-4108-AA02-DFA0A04FC94B}">
-              <ma14:wrappingTextBoxFlag xmlns:ma14="http://schemas.microsoft.com/office/mac/drawingml/2011/main" xmlns:a14="http://schemas.microsoft.com/office/drawing/2010/main" xmlns:m="http://schemas.openxmlformats.org/officeDocument/2006/math" xmlns="" val="1"/>
+              <ma14:wrappingTextBoxFlag xmlns="" xmlns:m="http://schemas.openxmlformats.org/officeDocument/2006/math" xmlns:a14="http://schemas.microsoft.com/office/drawing/2010/main" xmlns:ma14="http://schemas.microsoft.com/office/mac/drawingml/2011/main" val="1"/>
             </a:ext>
           </a:extLst>
         </p:spPr>
@@ -20026,7 +20033,7 @@
           </a:ln>
           <a:extLst>
             <a:ext uri="{C572A759-6A51-4108-AA02-DFA0A04FC94B}">
-              <ma14:wrappingTextBoxFlag xmlns:ma14="http://schemas.microsoft.com/office/mac/drawingml/2011/main" xmlns:a14="http://schemas.microsoft.com/office/drawing/2010/main" xmlns:m="http://schemas.openxmlformats.org/officeDocument/2006/math" xmlns="" val="1"/>
+              <ma14:wrappingTextBoxFlag xmlns="" xmlns:m="http://schemas.openxmlformats.org/officeDocument/2006/math" xmlns:a14="http://schemas.microsoft.com/office/drawing/2010/main" xmlns:ma14="http://schemas.microsoft.com/office/mac/drawingml/2011/main" val="1"/>
             </a:ext>
           </a:extLst>
         </p:spPr>
@@ -20066,7 +20073,7 @@
           </a:ln>
           <a:extLst>
             <a:ext uri="{C572A759-6A51-4108-AA02-DFA0A04FC94B}">
-              <ma14:wrappingTextBoxFlag xmlns:ma14="http://schemas.microsoft.com/office/mac/drawingml/2011/main" xmlns:a14="http://schemas.microsoft.com/office/drawing/2010/main" xmlns:m="http://schemas.openxmlformats.org/officeDocument/2006/math" xmlns="" val="1"/>
+              <ma14:wrappingTextBoxFlag xmlns="" xmlns:m="http://schemas.openxmlformats.org/officeDocument/2006/math" xmlns:a14="http://schemas.microsoft.com/office/drawing/2010/main" xmlns:ma14="http://schemas.microsoft.com/office/mac/drawingml/2011/main" val="1"/>
             </a:ext>
           </a:extLst>
         </p:spPr>
@@ -20273,7 +20280,7 @@
           </a:ln>
           <a:extLst>
             <a:ext uri="{C572A759-6A51-4108-AA02-DFA0A04FC94B}">
-              <ma14:wrappingTextBoxFlag xmlns:ma14="http://schemas.microsoft.com/office/mac/drawingml/2011/main" xmlns:a14="http://schemas.microsoft.com/office/drawing/2010/main" xmlns:m="http://schemas.openxmlformats.org/officeDocument/2006/math" xmlns="" val="1"/>
+              <ma14:wrappingTextBoxFlag xmlns="" xmlns:m="http://schemas.openxmlformats.org/officeDocument/2006/math" xmlns:a14="http://schemas.microsoft.com/office/drawing/2010/main" xmlns:ma14="http://schemas.microsoft.com/office/mac/drawingml/2011/main" val="1"/>
             </a:ext>
           </a:extLst>
         </p:spPr>
@@ -20400,7 +20407,7 @@
           </a:ln>
           <a:extLst>
             <a:ext uri="{C572A759-6A51-4108-AA02-DFA0A04FC94B}">
-              <ma14:wrappingTextBoxFlag xmlns:ma14="http://schemas.microsoft.com/office/mac/drawingml/2011/main" xmlns:a14="http://schemas.microsoft.com/office/drawing/2010/main" xmlns:m="http://schemas.openxmlformats.org/officeDocument/2006/math" xmlns="" val="1"/>
+              <ma14:wrappingTextBoxFlag xmlns="" xmlns:m="http://schemas.openxmlformats.org/officeDocument/2006/math" xmlns:a14="http://schemas.microsoft.com/office/drawing/2010/main" xmlns:ma14="http://schemas.microsoft.com/office/mac/drawingml/2011/main" val="1"/>
             </a:ext>
           </a:extLst>
         </p:spPr>
@@ -20447,7 +20454,7 @@
           </a:ln>
           <a:extLst>
             <a:ext uri="{C572A759-6A51-4108-AA02-DFA0A04FC94B}">
-              <ma14:wrappingTextBoxFlag xmlns:ma14="http://schemas.microsoft.com/office/mac/drawingml/2011/main" xmlns:a14="http://schemas.microsoft.com/office/drawing/2010/main" xmlns:m="http://schemas.openxmlformats.org/officeDocument/2006/math" xmlns="" val="1"/>
+              <ma14:wrappingTextBoxFlag xmlns="" xmlns:m="http://schemas.openxmlformats.org/officeDocument/2006/math" xmlns:a14="http://schemas.microsoft.com/office/drawing/2010/main" xmlns:ma14="http://schemas.microsoft.com/office/mac/drawingml/2011/main" val="1"/>
             </a:ext>
           </a:extLst>
         </p:spPr>
@@ -20509,7 +20516,7 @@
           </a:ln>
           <a:extLst>
             <a:ext uri="{C572A759-6A51-4108-AA02-DFA0A04FC94B}">
-              <ma14:wrappingTextBoxFlag xmlns:ma14="http://schemas.microsoft.com/office/mac/drawingml/2011/main" xmlns:a14="http://schemas.microsoft.com/office/drawing/2010/main" xmlns:m="http://schemas.openxmlformats.org/officeDocument/2006/math" xmlns="" val="1"/>
+              <ma14:wrappingTextBoxFlag xmlns="" xmlns:m="http://schemas.openxmlformats.org/officeDocument/2006/math" xmlns:a14="http://schemas.microsoft.com/office/drawing/2010/main" xmlns:ma14="http://schemas.microsoft.com/office/mac/drawingml/2011/main" val="1"/>
             </a:ext>
           </a:extLst>
         </p:spPr>
@@ -20612,7 +20619,7 @@
           </a:ln>
           <a:extLst>
             <a:ext uri="{C572A759-6A51-4108-AA02-DFA0A04FC94B}">
-              <ma14:wrappingTextBoxFlag xmlns:ma14="http://schemas.microsoft.com/office/mac/drawingml/2011/main" xmlns:a14="http://schemas.microsoft.com/office/drawing/2010/main" xmlns:m="http://schemas.openxmlformats.org/officeDocument/2006/math" xmlns="" val="1"/>
+              <ma14:wrappingTextBoxFlag xmlns="" xmlns:m="http://schemas.openxmlformats.org/officeDocument/2006/math" xmlns:a14="http://schemas.microsoft.com/office/drawing/2010/main" xmlns:ma14="http://schemas.microsoft.com/office/mac/drawingml/2011/main" val="1"/>
             </a:ext>
           </a:extLst>
         </p:spPr>
@@ -20652,7 +20659,7 @@
           </a:ln>
           <a:extLst>
             <a:ext uri="{C572A759-6A51-4108-AA02-DFA0A04FC94B}">
-              <ma14:wrappingTextBoxFlag xmlns:ma14="http://schemas.microsoft.com/office/mac/drawingml/2011/main" xmlns:a14="http://schemas.microsoft.com/office/drawing/2010/main" xmlns:m="http://schemas.openxmlformats.org/officeDocument/2006/math" xmlns="" val="1"/>
+              <ma14:wrappingTextBoxFlag xmlns="" xmlns:m="http://schemas.openxmlformats.org/officeDocument/2006/math" xmlns:a14="http://schemas.microsoft.com/office/drawing/2010/main" xmlns:ma14="http://schemas.microsoft.com/office/mac/drawingml/2011/main" val="1"/>
             </a:ext>
           </a:extLst>
         </p:spPr>
@@ -20892,7 +20899,7 @@
           </a:ln>
           <a:extLst>
             <a:ext uri="{C572A759-6A51-4108-AA02-DFA0A04FC94B}">
-              <ma14:wrappingTextBoxFlag xmlns:ma14="http://schemas.microsoft.com/office/mac/drawingml/2011/main" xmlns:a14="http://schemas.microsoft.com/office/drawing/2010/main" xmlns:m="http://schemas.openxmlformats.org/officeDocument/2006/math" xmlns="" val="1"/>
+              <ma14:wrappingTextBoxFlag xmlns="" xmlns:m="http://schemas.openxmlformats.org/officeDocument/2006/math" xmlns:a14="http://schemas.microsoft.com/office/drawing/2010/main" xmlns:ma14="http://schemas.microsoft.com/office/mac/drawingml/2011/main" val="1"/>
             </a:ext>
           </a:extLst>
         </p:spPr>
@@ -20966,7 +20973,7 @@
           </a:ln>
           <a:extLst>
             <a:ext uri="{C572A759-6A51-4108-AA02-DFA0A04FC94B}">
-              <ma14:wrappingTextBoxFlag xmlns:ma14="http://schemas.microsoft.com/office/mac/drawingml/2011/main" xmlns:a14="http://schemas.microsoft.com/office/drawing/2010/main" xmlns:m="http://schemas.openxmlformats.org/officeDocument/2006/math" xmlns="" val="1"/>
+              <ma14:wrappingTextBoxFlag xmlns="" xmlns:m="http://schemas.openxmlformats.org/officeDocument/2006/math" xmlns:a14="http://schemas.microsoft.com/office/drawing/2010/main" xmlns:ma14="http://schemas.microsoft.com/office/mac/drawingml/2011/main" val="1"/>
             </a:ext>
           </a:extLst>
         </p:spPr>
@@ -21010,7 +21017,7 @@
           </a:ln>
           <a:extLst>
             <a:ext uri="{C572A759-6A51-4108-AA02-DFA0A04FC94B}">
-              <ma14:wrappingTextBoxFlag xmlns:ma14="http://schemas.microsoft.com/office/mac/drawingml/2011/main" xmlns:a14="http://schemas.microsoft.com/office/drawing/2010/main" xmlns:m="http://schemas.openxmlformats.org/officeDocument/2006/math" xmlns="" val="1"/>
+              <ma14:wrappingTextBoxFlag xmlns="" xmlns:m="http://schemas.openxmlformats.org/officeDocument/2006/math" xmlns:a14="http://schemas.microsoft.com/office/drawing/2010/main" xmlns:ma14="http://schemas.microsoft.com/office/mac/drawingml/2011/main" val="1"/>
             </a:ext>
           </a:extLst>
         </p:spPr>
@@ -21250,7 +21257,7 @@
           </a:ln>
           <a:extLst>
             <a:ext uri="{C572A759-6A51-4108-AA02-DFA0A04FC94B}">
-              <ma14:wrappingTextBoxFlag xmlns:ma14="http://schemas.microsoft.com/office/mac/drawingml/2011/main" xmlns:a14="http://schemas.microsoft.com/office/drawing/2010/main" xmlns:m="http://schemas.openxmlformats.org/officeDocument/2006/math" xmlns="" val="1"/>
+              <ma14:wrappingTextBoxFlag xmlns="" xmlns:m="http://schemas.openxmlformats.org/officeDocument/2006/math" xmlns:a14="http://schemas.microsoft.com/office/drawing/2010/main" xmlns:ma14="http://schemas.microsoft.com/office/mac/drawingml/2011/main" val="1"/>
             </a:ext>
           </a:extLst>
         </p:spPr>
@@ -21324,7 +21331,7 @@
           </a:ln>
           <a:extLst>
             <a:ext uri="{C572A759-6A51-4108-AA02-DFA0A04FC94B}">
-              <ma14:wrappingTextBoxFlag xmlns:ma14="http://schemas.microsoft.com/office/mac/drawingml/2011/main" xmlns:a14="http://schemas.microsoft.com/office/drawing/2010/main" xmlns:m="http://schemas.openxmlformats.org/officeDocument/2006/math" xmlns="" val="1"/>
+              <ma14:wrappingTextBoxFlag xmlns="" xmlns:m="http://schemas.openxmlformats.org/officeDocument/2006/math" xmlns:a14="http://schemas.microsoft.com/office/drawing/2010/main" xmlns:ma14="http://schemas.microsoft.com/office/mac/drawingml/2011/main" val="1"/>
             </a:ext>
           </a:extLst>
         </p:spPr>
@@ -21408,7 +21415,7 @@
           </a:ln>
           <a:extLst>
             <a:ext uri="{C572A759-6A51-4108-AA02-DFA0A04FC94B}">
-              <ma14:wrappingTextBoxFlag xmlns:ma14="http://schemas.microsoft.com/office/mac/drawingml/2011/main" xmlns:a14="http://schemas.microsoft.com/office/drawing/2010/main" xmlns:m="http://schemas.openxmlformats.org/officeDocument/2006/math" xmlns="" val="1"/>
+              <ma14:wrappingTextBoxFlag xmlns="" xmlns:m="http://schemas.openxmlformats.org/officeDocument/2006/math" xmlns:a14="http://schemas.microsoft.com/office/drawing/2010/main" xmlns:ma14="http://schemas.microsoft.com/office/mac/drawingml/2011/main" val="1"/>
             </a:ext>
           </a:extLst>
         </p:spPr>
@@ -21495,7 +21502,7 @@
           </a:ln>
           <a:extLst>
             <a:ext uri="{C572A759-6A51-4108-AA02-DFA0A04FC94B}">
-              <ma14:wrappingTextBoxFlag xmlns:ma14="http://schemas.microsoft.com/office/mac/drawingml/2011/main" xmlns:a14="http://schemas.microsoft.com/office/drawing/2010/main" xmlns:m="http://schemas.openxmlformats.org/officeDocument/2006/math" xmlns="" val="1"/>
+              <ma14:wrappingTextBoxFlag xmlns="" xmlns:m="http://schemas.openxmlformats.org/officeDocument/2006/math" xmlns:a14="http://schemas.microsoft.com/office/drawing/2010/main" xmlns:ma14="http://schemas.microsoft.com/office/mac/drawingml/2011/main" val="1"/>
             </a:ext>
           </a:extLst>
         </p:spPr>
@@ -21582,7 +21589,7 @@
           </a:ln>
           <a:extLst>
             <a:ext uri="{C572A759-6A51-4108-AA02-DFA0A04FC94B}">
-              <ma14:wrappingTextBoxFlag xmlns:ma14="http://schemas.microsoft.com/office/mac/drawingml/2011/main" xmlns:a14="http://schemas.microsoft.com/office/drawing/2010/main" xmlns:m="http://schemas.openxmlformats.org/officeDocument/2006/math" xmlns="" val="1"/>
+              <ma14:wrappingTextBoxFlag xmlns="" xmlns:m="http://schemas.openxmlformats.org/officeDocument/2006/math" xmlns:a14="http://schemas.microsoft.com/office/drawing/2010/main" xmlns:ma14="http://schemas.microsoft.com/office/mac/drawingml/2011/main" val="1"/>
             </a:ext>
           </a:extLst>
         </p:spPr>
@@ -21629,7 +21636,7 @@
           </a:ln>
           <a:extLst>
             <a:ext uri="{C572A759-6A51-4108-AA02-DFA0A04FC94B}">
-              <ma14:wrappingTextBoxFlag xmlns:ma14="http://schemas.microsoft.com/office/mac/drawingml/2011/main" xmlns:a14="http://schemas.microsoft.com/office/drawing/2010/main" xmlns:m="http://schemas.openxmlformats.org/officeDocument/2006/math" xmlns="" val="1"/>
+              <ma14:wrappingTextBoxFlag xmlns="" xmlns:m="http://schemas.openxmlformats.org/officeDocument/2006/math" xmlns:a14="http://schemas.microsoft.com/office/drawing/2010/main" xmlns:ma14="http://schemas.microsoft.com/office/mac/drawingml/2011/main" val="1"/>
             </a:ext>
           </a:extLst>
         </p:spPr>
@@ -21869,7 +21876,7 @@
           </a:ln>
           <a:extLst>
             <a:ext uri="{C572A759-6A51-4108-AA02-DFA0A04FC94B}">
-              <ma14:wrappingTextBoxFlag xmlns:ma14="http://schemas.microsoft.com/office/mac/drawingml/2011/main" xmlns:a14="http://schemas.microsoft.com/office/drawing/2010/main" xmlns:m="http://schemas.openxmlformats.org/officeDocument/2006/math" xmlns="" val="1"/>
+              <ma14:wrappingTextBoxFlag xmlns="" xmlns:m="http://schemas.openxmlformats.org/officeDocument/2006/math" xmlns:a14="http://schemas.microsoft.com/office/drawing/2010/main" xmlns:ma14="http://schemas.microsoft.com/office/mac/drawingml/2011/main" val="1"/>
             </a:ext>
           </a:extLst>
         </p:spPr>
@@ -21943,7 +21950,7 @@
           </a:ln>
           <a:extLst>
             <a:ext uri="{C572A759-6A51-4108-AA02-DFA0A04FC94B}">
-              <ma14:wrappingTextBoxFlag xmlns:ma14="http://schemas.microsoft.com/office/mac/drawingml/2011/main" xmlns:a14="http://schemas.microsoft.com/office/drawing/2010/main" xmlns:m="http://schemas.openxmlformats.org/officeDocument/2006/math" xmlns="" val="1"/>
+              <ma14:wrappingTextBoxFlag xmlns="" xmlns:m="http://schemas.openxmlformats.org/officeDocument/2006/math" xmlns:a14="http://schemas.microsoft.com/office/drawing/2010/main" xmlns:ma14="http://schemas.microsoft.com/office/mac/drawingml/2011/main" val="1"/>
             </a:ext>
           </a:extLst>
         </p:spPr>
@@ -22027,7 +22034,7 @@
           </a:ln>
           <a:extLst>
             <a:ext uri="{C572A759-6A51-4108-AA02-DFA0A04FC94B}">
-              <ma14:wrappingTextBoxFlag xmlns:ma14="http://schemas.microsoft.com/office/mac/drawingml/2011/main" xmlns:a14="http://schemas.microsoft.com/office/drawing/2010/main" xmlns:m="http://schemas.openxmlformats.org/officeDocument/2006/math" xmlns="" val="1"/>
+              <ma14:wrappingTextBoxFlag xmlns="" xmlns:m="http://schemas.openxmlformats.org/officeDocument/2006/math" xmlns:a14="http://schemas.microsoft.com/office/drawing/2010/main" xmlns:ma14="http://schemas.microsoft.com/office/mac/drawingml/2011/main" val="1"/>
             </a:ext>
           </a:extLst>
         </p:spPr>
@@ -22074,7 +22081,7 @@
           </a:ln>
           <a:extLst>
             <a:ext uri="{C572A759-6A51-4108-AA02-DFA0A04FC94B}">
-              <ma14:wrappingTextBoxFlag xmlns:ma14="http://schemas.microsoft.com/office/mac/drawingml/2011/main" xmlns:a14="http://schemas.microsoft.com/office/drawing/2010/main" xmlns:m="http://schemas.openxmlformats.org/officeDocument/2006/math" xmlns="" val="1"/>
+              <ma14:wrappingTextBoxFlag xmlns="" xmlns:m="http://schemas.openxmlformats.org/officeDocument/2006/math" xmlns:a14="http://schemas.microsoft.com/office/drawing/2010/main" xmlns:ma14="http://schemas.microsoft.com/office/mac/drawingml/2011/main" val="1"/>
             </a:ext>
           </a:extLst>
         </p:spPr>
@@ -22161,7 +22168,7 @@
           </a:ln>
           <a:extLst>
             <a:ext uri="{C572A759-6A51-4108-AA02-DFA0A04FC94B}">
-              <ma14:wrappingTextBoxFlag xmlns:ma14="http://schemas.microsoft.com/office/mac/drawingml/2011/main" xmlns:a14="http://schemas.microsoft.com/office/drawing/2010/main" xmlns:m="http://schemas.openxmlformats.org/officeDocument/2006/math" xmlns="" val="1"/>
+              <ma14:wrappingTextBoxFlag xmlns="" xmlns:m="http://schemas.openxmlformats.org/officeDocument/2006/math" xmlns:a14="http://schemas.microsoft.com/office/drawing/2010/main" xmlns:ma14="http://schemas.microsoft.com/office/mac/drawingml/2011/main" val="1"/>
             </a:ext>
           </a:extLst>
         </p:spPr>
@@ -22208,7 +22215,7 @@
           </a:ln>
           <a:extLst>
             <a:ext uri="{C572A759-6A51-4108-AA02-DFA0A04FC94B}">
-              <ma14:wrappingTextBoxFlag xmlns:ma14="http://schemas.microsoft.com/office/mac/drawingml/2011/main" xmlns:a14="http://schemas.microsoft.com/office/drawing/2010/main" xmlns:m="http://schemas.openxmlformats.org/officeDocument/2006/math" xmlns="" val="1"/>
+              <ma14:wrappingTextBoxFlag xmlns="" xmlns:m="http://schemas.openxmlformats.org/officeDocument/2006/math" xmlns:a14="http://schemas.microsoft.com/office/drawing/2010/main" xmlns:ma14="http://schemas.microsoft.com/office/mac/drawingml/2011/main" val="1"/>
             </a:ext>
           </a:extLst>
         </p:spPr>
@@ -22566,7 +22573,7 @@
           </a:ln>
           <a:extLst>
             <a:ext uri="{C572A759-6A51-4108-AA02-DFA0A04FC94B}">
-              <ma14:wrappingTextBoxFlag xmlns:ma14="http://schemas.microsoft.com/office/mac/drawingml/2011/main" xmlns:a14="http://schemas.microsoft.com/office/drawing/2010/main" xmlns:m="http://schemas.openxmlformats.org/officeDocument/2006/math" xmlns="" val="1"/>
+              <ma14:wrappingTextBoxFlag xmlns="" xmlns:m="http://schemas.openxmlformats.org/officeDocument/2006/math" xmlns:a14="http://schemas.microsoft.com/office/drawing/2010/main" xmlns:ma14="http://schemas.microsoft.com/office/mac/drawingml/2011/main" val="1"/>
             </a:ext>
           </a:extLst>
         </p:spPr>
@@ -22601,7 +22608,7 @@
           </a:ln>
           <a:extLst>
             <a:ext uri="{C572A759-6A51-4108-AA02-DFA0A04FC94B}">
-              <ma14:wrappingTextBoxFlag xmlns:ma14="http://schemas.microsoft.com/office/mac/drawingml/2011/main" xmlns:a14="http://schemas.microsoft.com/office/drawing/2010/main" xmlns:m="http://schemas.openxmlformats.org/officeDocument/2006/math" xmlns="" val="1"/>
+              <ma14:wrappingTextBoxFlag xmlns="" xmlns:m="http://schemas.openxmlformats.org/officeDocument/2006/math" xmlns:a14="http://schemas.microsoft.com/office/drawing/2010/main" xmlns:ma14="http://schemas.microsoft.com/office/mac/drawingml/2011/main" val="1"/>
             </a:ext>
           </a:extLst>
         </p:spPr>
@@ -22636,7 +22643,7 @@
           </a:ln>
           <a:extLst>
             <a:ext uri="{C572A759-6A51-4108-AA02-DFA0A04FC94B}">
-              <ma14:wrappingTextBoxFlag xmlns:ma14="http://schemas.microsoft.com/office/mac/drawingml/2011/main" xmlns:a14="http://schemas.microsoft.com/office/drawing/2010/main" xmlns:m="http://schemas.openxmlformats.org/officeDocument/2006/math" xmlns="" val="1"/>
+              <ma14:wrappingTextBoxFlag xmlns="" xmlns:m="http://schemas.openxmlformats.org/officeDocument/2006/math" xmlns:a14="http://schemas.microsoft.com/office/drawing/2010/main" xmlns:ma14="http://schemas.microsoft.com/office/mac/drawingml/2011/main" val="1"/>
             </a:ext>
           </a:extLst>
         </p:spPr>
@@ -22719,7 +22726,7 @@
           </a:ln>
           <a:extLst>
             <a:ext uri="{C572A759-6A51-4108-AA02-DFA0A04FC94B}">
-              <ma14:wrappingTextBoxFlag xmlns:ma14="http://schemas.microsoft.com/office/mac/drawingml/2011/main" xmlns:a14="http://schemas.microsoft.com/office/drawing/2010/main" xmlns:m="http://schemas.openxmlformats.org/officeDocument/2006/math" xmlns="" val="1"/>
+              <ma14:wrappingTextBoxFlag xmlns="" xmlns:m="http://schemas.openxmlformats.org/officeDocument/2006/math" xmlns:a14="http://schemas.microsoft.com/office/drawing/2010/main" xmlns:ma14="http://schemas.microsoft.com/office/mac/drawingml/2011/main" val="1"/>
             </a:ext>
           </a:extLst>
         </p:spPr>
@@ -22764,7 +22771,7 @@
           </a:ln>
           <a:extLst>
             <a:ext uri="{C572A759-6A51-4108-AA02-DFA0A04FC94B}">
-              <ma14:wrappingTextBoxFlag xmlns:ma14="http://schemas.microsoft.com/office/mac/drawingml/2011/main" xmlns:a14="http://schemas.microsoft.com/office/drawing/2010/main" xmlns:m="http://schemas.openxmlformats.org/officeDocument/2006/math" xmlns="" val="1"/>
+              <ma14:wrappingTextBoxFlag xmlns="" xmlns:m="http://schemas.openxmlformats.org/officeDocument/2006/math" xmlns:a14="http://schemas.microsoft.com/office/drawing/2010/main" xmlns:ma14="http://schemas.microsoft.com/office/mac/drawingml/2011/main" val="1"/>
             </a:ext>
           </a:extLst>
         </p:spPr>
@@ -22806,7 +22813,7 @@
           </a:ln>
           <a:extLst>
             <a:ext uri="{C572A759-6A51-4108-AA02-DFA0A04FC94B}">
-              <ma14:wrappingTextBoxFlag xmlns:ma14="http://schemas.microsoft.com/office/mac/drawingml/2011/main" xmlns:a14="http://schemas.microsoft.com/office/drawing/2010/main" xmlns:m="http://schemas.openxmlformats.org/officeDocument/2006/math" xmlns="" val="1"/>
+              <ma14:wrappingTextBoxFlag xmlns="" xmlns:m="http://schemas.openxmlformats.org/officeDocument/2006/math" xmlns:a14="http://schemas.microsoft.com/office/drawing/2010/main" xmlns:ma14="http://schemas.microsoft.com/office/mac/drawingml/2011/main" val="1"/>
             </a:ext>
           </a:extLst>
         </p:spPr>
@@ -22851,7 +22858,7 @@
           </a:ln>
           <a:extLst>
             <a:ext uri="{C572A759-6A51-4108-AA02-DFA0A04FC94B}">
-              <ma14:wrappingTextBoxFlag xmlns:ma14="http://schemas.microsoft.com/office/mac/drawingml/2011/main" xmlns:a14="http://schemas.microsoft.com/office/drawing/2010/main" xmlns:m="http://schemas.openxmlformats.org/officeDocument/2006/math" xmlns="" val="1"/>
+              <ma14:wrappingTextBoxFlag xmlns="" xmlns:m="http://schemas.openxmlformats.org/officeDocument/2006/math" xmlns:a14="http://schemas.microsoft.com/office/drawing/2010/main" xmlns:ma14="http://schemas.microsoft.com/office/mac/drawingml/2011/main" val="1"/>
             </a:ext>
           </a:extLst>
         </p:spPr>
@@ -22890,7 +22897,7 @@
           </a:ln>
           <a:extLst>
             <a:ext uri="{C572A759-6A51-4108-AA02-DFA0A04FC94B}">
-              <ma14:wrappingTextBoxFlag xmlns:ma14="http://schemas.microsoft.com/office/mac/drawingml/2011/main" xmlns:a14="http://schemas.microsoft.com/office/drawing/2010/main" xmlns:m="http://schemas.openxmlformats.org/officeDocument/2006/math" xmlns="" val="1"/>
+              <ma14:wrappingTextBoxFlag xmlns="" xmlns:m="http://schemas.openxmlformats.org/officeDocument/2006/math" xmlns:a14="http://schemas.microsoft.com/office/drawing/2010/main" xmlns:ma14="http://schemas.microsoft.com/office/mac/drawingml/2011/main" val="1"/>
             </a:ext>
           </a:extLst>
         </p:spPr>
@@ -22929,7 +22936,7 @@
           </a:ln>
           <a:extLst>
             <a:ext uri="{C572A759-6A51-4108-AA02-DFA0A04FC94B}">
-              <ma14:wrappingTextBoxFlag xmlns:ma14="http://schemas.microsoft.com/office/mac/drawingml/2011/main" xmlns:a14="http://schemas.microsoft.com/office/drawing/2010/main" xmlns:m="http://schemas.openxmlformats.org/officeDocument/2006/math" xmlns="" val="1"/>
+              <ma14:wrappingTextBoxFlag xmlns="" xmlns:m="http://schemas.openxmlformats.org/officeDocument/2006/math" xmlns:a14="http://schemas.microsoft.com/office/drawing/2010/main" xmlns:ma14="http://schemas.microsoft.com/office/mac/drawingml/2011/main" val="1"/>
             </a:ext>
           </a:extLst>
         </p:spPr>
@@ -22976,7 +22983,7 @@
           </a:ln>
           <a:extLst>
             <a:ext uri="{C572A759-6A51-4108-AA02-DFA0A04FC94B}">
-              <ma14:wrappingTextBoxFlag xmlns:ma14="http://schemas.microsoft.com/office/mac/drawingml/2011/main" xmlns:a14="http://schemas.microsoft.com/office/drawing/2010/main" xmlns:m="http://schemas.openxmlformats.org/officeDocument/2006/math" xmlns="" val="1"/>
+              <ma14:wrappingTextBoxFlag xmlns="" xmlns:m="http://schemas.openxmlformats.org/officeDocument/2006/math" xmlns:a14="http://schemas.microsoft.com/office/drawing/2010/main" xmlns:ma14="http://schemas.microsoft.com/office/mac/drawingml/2011/main" val="1"/>
             </a:ext>
           </a:extLst>
         </p:spPr>
@@ -23130,7 +23137,7 @@
           </a:ln>
           <a:extLst>
             <a:ext uri="{C572A759-6A51-4108-AA02-DFA0A04FC94B}">
-              <ma14:wrappingTextBoxFlag xmlns:ma14="http://schemas.microsoft.com/office/mac/drawingml/2011/main" xmlns:a14="http://schemas.microsoft.com/office/drawing/2010/main" xmlns:m="http://schemas.openxmlformats.org/officeDocument/2006/math" xmlns="" val="1"/>
+              <ma14:wrappingTextBoxFlag xmlns="" xmlns:m="http://schemas.openxmlformats.org/officeDocument/2006/math" xmlns:a14="http://schemas.microsoft.com/office/drawing/2010/main" xmlns:ma14="http://schemas.microsoft.com/office/mac/drawingml/2011/main" val="1"/>
             </a:ext>
           </a:extLst>
         </p:spPr>
@@ -23177,7 +23184,7 @@
           </a:ln>
           <a:extLst>
             <a:ext uri="{C572A759-6A51-4108-AA02-DFA0A04FC94B}">
-              <ma14:wrappingTextBoxFlag xmlns:ma14="http://schemas.microsoft.com/office/mac/drawingml/2011/main" xmlns:a14="http://schemas.microsoft.com/office/drawing/2010/main" xmlns:m="http://schemas.openxmlformats.org/officeDocument/2006/math" xmlns="" val="1"/>
+              <ma14:wrappingTextBoxFlag xmlns="" xmlns:m="http://schemas.openxmlformats.org/officeDocument/2006/math" xmlns:a14="http://schemas.microsoft.com/office/drawing/2010/main" xmlns:ma14="http://schemas.microsoft.com/office/mac/drawingml/2011/main" val="1"/>
             </a:ext>
           </a:extLst>
         </p:spPr>
@@ -23224,7 +23231,7 @@
           </a:ln>
           <a:extLst>
             <a:ext uri="{C572A759-6A51-4108-AA02-DFA0A04FC94B}">
-              <ma14:wrappingTextBoxFlag xmlns:ma14="http://schemas.microsoft.com/office/mac/drawingml/2011/main" xmlns:a14="http://schemas.microsoft.com/office/drawing/2010/main" xmlns:m="http://schemas.openxmlformats.org/officeDocument/2006/math" xmlns="" val="1"/>
+              <ma14:wrappingTextBoxFlag xmlns="" xmlns:m="http://schemas.openxmlformats.org/officeDocument/2006/math" xmlns:a14="http://schemas.microsoft.com/office/drawing/2010/main" xmlns:ma14="http://schemas.microsoft.com/office/mac/drawingml/2011/main" val="1"/>
             </a:ext>
           </a:extLst>
         </p:spPr>
@@ -23901,7 +23908,7 @@
           </a:ln>
           <a:extLst>
             <a:ext uri="{C572A759-6A51-4108-AA02-DFA0A04FC94B}">
-              <ma14:wrappingTextBoxFlag xmlns:ma14="http://schemas.microsoft.com/office/mac/drawingml/2011/main" xmlns:a14="http://schemas.microsoft.com/office/drawing/2010/main" xmlns:m="http://schemas.openxmlformats.org/officeDocument/2006/math" xmlns="" val="1"/>
+              <ma14:wrappingTextBoxFlag xmlns="" xmlns:m="http://schemas.openxmlformats.org/officeDocument/2006/math" xmlns:a14="http://schemas.microsoft.com/office/drawing/2010/main" xmlns:ma14="http://schemas.microsoft.com/office/mac/drawingml/2011/main" val="1"/>
             </a:ext>
           </a:extLst>
         </p:spPr>
@@ -23936,7 +23943,7 @@
           </a:ln>
           <a:extLst>
             <a:ext uri="{C572A759-6A51-4108-AA02-DFA0A04FC94B}">
-              <ma14:wrappingTextBoxFlag xmlns:ma14="http://schemas.microsoft.com/office/mac/drawingml/2011/main" xmlns:a14="http://schemas.microsoft.com/office/drawing/2010/main" xmlns:m="http://schemas.openxmlformats.org/officeDocument/2006/math" xmlns="" val="1"/>
+              <ma14:wrappingTextBoxFlag xmlns="" xmlns:m="http://schemas.openxmlformats.org/officeDocument/2006/math" xmlns:a14="http://schemas.microsoft.com/office/drawing/2010/main" xmlns:ma14="http://schemas.microsoft.com/office/mac/drawingml/2011/main" val="1"/>
             </a:ext>
           </a:extLst>
         </p:spPr>
@@ -23971,7 +23978,7 @@
           </a:ln>
           <a:extLst>
             <a:ext uri="{C572A759-6A51-4108-AA02-DFA0A04FC94B}">
-              <ma14:wrappingTextBoxFlag xmlns:ma14="http://schemas.microsoft.com/office/mac/drawingml/2011/main" xmlns:a14="http://schemas.microsoft.com/office/drawing/2010/main" xmlns:m="http://schemas.openxmlformats.org/officeDocument/2006/math" xmlns="" val="1"/>
+              <ma14:wrappingTextBoxFlag xmlns="" xmlns:m="http://schemas.openxmlformats.org/officeDocument/2006/math" xmlns:a14="http://schemas.microsoft.com/office/drawing/2010/main" xmlns:ma14="http://schemas.microsoft.com/office/mac/drawingml/2011/main" val="1"/>
             </a:ext>
           </a:extLst>
         </p:spPr>
@@ -24054,7 +24061,7 @@
           </a:ln>
           <a:extLst>
             <a:ext uri="{C572A759-6A51-4108-AA02-DFA0A04FC94B}">
-              <ma14:wrappingTextBoxFlag xmlns:ma14="http://schemas.microsoft.com/office/mac/drawingml/2011/main" xmlns:a14="http://schemas.microsoft.com/office/drawing/2010/main" xmlns:m="http://schemas.openxmlformats.org/officeDocument/2006/math" xmlns="" val="1"/>
+              <ma14:wrappingTextBoxFlag xmlns="" xmlns:m="http://schemas.openxmlformats.org/officeDocument/2006/math" xmlns:a14="http://schemas.microsoft.com/office/drawing/2010/main" xmlns:ma14="http://schemas.microsoft.com/office/mac/drawingml/2011/main" val="1"/>
             </a:ext>
           </a:extLst>
         </p:spPr>
@@ -24099,7 +24106,7 @@
           </a:ln>
           <a:extLst>
             <a:ext uri="{C572A759-6A51-4108-AA02-DFA0A04FC94B}">
-              <ma14:wrappingTextBoxFlag xmlns:ma14="http://schemas.microsoft.com/office/mac/drawingml/2011/main" xmlns:a14="http://schemas.microsoft.com/office/drawing/2010/main" xmlns:m="http://schemas.openxmlformats.org/officeDocument/2006/math" xmlns="" val="1"/>
+              <ma14:wrappingTextBoxFlag xmlns="" xmlns:m="http://schemas.openxmlformats.org/officeDocument/2006/math" xmlns:a14="http://schemas.microsoft.com/office/drawing/2010/main" xmlns:ma14="http://schemas.microsoft.com/office/mac/drawingml/2011/main" val="1"/>
             </a:ext>
           </a:extLst>
         </p:spPr>
@@ -24141,7 +24148,7 @@
           </a:ln>
           <a:extLst>
             <a:ext uri="{C572A759-6A51-4108-AA02-DFA0A04FC94B}">
-              <ma14:wrappingTextBoxFlag xmlns:ma14="http://schemas.microsoft.com/office/mac/drawingml/2011/main" xmlns:a14="http://schemas.microsoft.com/office/drawing/2010/main" xmlns:m="http://schemas.openxmlformats.org/officeDocument/2006/math" xmlns="" val="1"/>
+              <ma14:wrappingTextBoxFlag xmlns="" xmlns:m="http://schemas.openxmlformats.org/officeDocument/2006/math" xmlns:a14="http://schemas.microsoft.com/office/drawing/2010/main" xmlns:ma14="http://schemas.microsoft.com/office/mac/drawingml/2011/main" val="1"/>
             </a:ext>
           </a:extLst>
         </p:spPr>
@@ -24186,7 +24193,7 @@
           </a:ln>
           <a:extLst>
             <a:ext uri="{C572A759-6A51-4108-AA02-DFA0A04FC94B}">
-              <ma14:wrappingTextBoxFlag xmlns:ma14="http://schemas.microsoft.com/office/mac/drawingml/2011/main" xmlns:a14="http://schemas.microsoft.com/office/drawing/2010/main" xmlns:m="http://schemas.openxmlformats.org/officeDocument/2006/math" xmlns="" val="1"/>
+              <ma14:wrappingTextBoxFlag xmlns="" xmlns:m="http://schemas.openxmlformats.org/officeDocument/2006/math" xmlns:a14="http://schemas.microsoft.com/office/drawing/2010/main" xmlns:ma14="http://schemas.microsoft.com/office/mac/drawingml/2011/main" val="1"/>
             </a:ext>
           </a:extLst>
         </p:spPr>
@@ -24225,7 +24232,7 @@
           </a:ln>
           <a:extLst>
             <a:ext uri="{C572A759-6A51-4108-AA02-DFA0A04FC94B}">
-              <ma14:wrappingTextBoxFlag xmlns:ma14="http://schemas.microsoft.com/office/mac/drawingml/2011/main" xmlns:a14="http://schemas.microsoft.com/office/drawing/2010/main" xmlns:m="http://schemas.openxmlformats.org/officeDocument/2006/math" xmlns="" val="1"/>
+              <ma14:wrappingTextBoxFlag xmlns="" xmlns:m="http://schemas.openxmlformats.org/officeDocument/2006/math" xmlns:a14="http://schemas.microsoft.com/office/drawing/2010/main" xmlns:ma14="http://schemas.microsoft.com/office/mac/drawingml/2011/main" val="1"/>
             </a:ext>
           </a:extLst>
         </p:spPr>
@@ -24264,7 +24271,7 @@
           </a:ln>
           <a:extLst>
             <a:ext uri="{C572A759-6A51-4108-AA02-DFA0A04FC94B}">
-              <ma14:wrappingTextBoxFlag xmlns:ma14="http://schemas.microsoft.com/office/mac/drawingml/2011/main" xmlns:a14="http://schemas.microsoft.com/office/drawing/2010/main" xmlns:m="http://schemas.openxmlformats.org/officeDocument/2006/math" xmlns="" val="1"/>
+              <ma14:wrappingTextBoxFlag xmlns="" xmlns:m="http://schemas.openxmlformats.org/officeDocument/2006/math" xmlns:a14="http://schemas.microsoft.com/office/drawing/2010/main" xmlns:ma14="http://schemas.microsoft.com/office/mac/drawingml/2011/main" val="1"/>
             </a:ext>
           </a:extLst>
         </p:spPr>
@@ -24311,7 +24318,7 @@
           </a:ln>
           <a:extLst>
             <a:ext uri="{C572A759-6A51-4108-AA02-DFA0A04FC94B}">
-              <ma14:wrappingTextBoxFlag xmlns:ma14="http://schemas.microsoft.com/office/mac/drawingml/2011/main" xmlns:a14="http://schemas.microsoft.com/office/drawing/2010/main" xmlns:m="http://schemas.openxmlformats.org/officeDocument/2006/math" xmlns="" val="1"/>
+              <ma14:wrappingTextBoxFlag xmlns="" xmlns:m="http://schemas.openxmlformats.org/officeDocument/2006/math" xmlns:a14="http://schemas.microsoft.com/office/drawing/2010/main" xmlns:ma14="http://schemas.microsoft.com/office/mac/drawingml/2011/main" val="1"/>
             </a:ext>
           </a:extLst>
         </p:spPr>
@@ -24358,7 +24365,7 @@
           </a:ln>
           <a:extLst>
             <a:ext uri="{C572A759-6A51-4108-AA02-DFA0A04FC94B}">
-              <ma14:wrappingTextBoxFlag xmlns:ma14="http://schemas.microsoft.com/office/mac/drawingml/2011/main" xmlns:a14="http://schemas.microsoft.com/office/drawing/2010/main" xmlns:m="http://schemas.openxmlformats.org/officeDocument/2006/math" xmlns="" val="1"/>
+              <ma14:wrappingTextBoxFlag xmlns="" xmlns:m="http://schemas.openxmlformats.org/officeDocument/2006/math" xmlns:a14="http://schemas.microsoft.com/office/drawing/2010/main" xmlns:ma14="http://schemas.microsoft.com/office/mac/drawingml/2011/main" val="1"/>
             </a:ext>
           </a:extLst>
         </p:spPr>
@@ -24511,7 +24518,7 @@
           </a:ln>
           <a:extLst>
             <a:ext uri="{C572A759-6A51-4108-AA02-DFA0A04FC94B}">
-              <ma14:wrappingTextBoxFlag xmlns:ma14="http://schemas.microsoft.com/office/mac/drawingml/2011/main" xmlns:a14="http://schemas.microsoft.com/office/drawing/2010/main" xmlns:m="http://schemas.openxmlformats.org/officeDocument/2006/math" xmlns="" val="1"/>
+              <ma14:wrappingTextBoxFlag xmlns="" xmlns:m="http://schemas.openxmlformats.org/officeDocument/2006/math" xmlns:a14="http://schemas.microsoft.com/office/drawing/2010/main" xmlns:ma14="http://schemas.microsoft.com/office/mac/drawingml/2011/main" val="1"/>
             </a:ext>
           </a:extLst>
         </p:spPr>
@@ -24833,7 +24840,7 @@
           </a:ln>
           <a:extLst>
             <a:ext uri="{C572A759-6A51-4108-AA02-DFA0A04FC94B}">
-              <ma14:wrappingTextBoxFlag xmlns:ma14="http://schemas.microsoft.com/office/mac/drawingml/2011/main" xmlns:a14="http://schemas.microsoft.com/office/drawing/2010/main" xmlns:m="http://schemas.openxmlformats.org/officeDocument/2006/math" xmlns="" val="1"/>
+              <ma14:wrappingTextBoxFlag xmlns="" xmlns:m="http://schemas.openxmlformats.org/officeDocument/2006/math" xmlns:a14="http://schemas.microsoft.com/office/drawing/2010/main" xmlns:ma14="http://schemas.microsoft.com/office/mac/drawingml/2011/main" val="1"/>
             </a:ext>
           </a:extLst>
         </p:spPr>
@@ -24868,7 +24875,7 @@
           </a:ln>
           <a:extLst>
             <a:ext uri="{C572A759-6A51-4108-AA02-DFA0A04FC94B}">
-              <ma14:wrappingTextBoxFlag xmlns:ma14="http://schemas.microsoft.com/office/mac/drawingml/2011/main" xmlns:a14="http://schemas.microsoft.com/office/drawing/2010/main" xmlns:m="http://schemas.openxmlformats.org/officeDocument/2006/math" xmlns="" val="1"/>
+              <ma14:wrappingTextBoxFlag xmlns="" xmlns:m="http://schemas.openxmlformats.org/officeDocument/2006/math" xmlns:a14="http://schemas.microsoft.com/office/drawing/2010/main" xmlns:ma14="http://schemas.microsoft.com/office/mac/drawingml/2011/main" val="1"/>
             </a:ext>
           </a:extLst>
         </p:spPr>
@@ -24903,7 +24910,7 @@
           </a:ln>
           <a:extLst>
             <a:ext uri="{C572A759-6A51-4108-AA02-DFA0A04FC94B}">
-              <ma14:wrappingTextBoxFlag xmlns:ma14="http://schemas.microsoft.com/office/mac/drawingml/2011/main" xmlns:a14="http://schemas.microsoft.com/office/drawing/2010/main" xmlns:m="http://schemas.openxmlformats.org/officeDocument/2006/math" xmlns="" val="1"/>
+              <ma14:wrappingTextBoxFlag xmlns="" xmlns:m="http://schemas.openxmlformats.org/officeDocument/2006/math" xmlns:a14="http://schemas.microsoft.com/office/drawing/2010/main" xmlns:ma14="http://schemas.microsoft.com/office/mac/drawingml/2011/main" val="1"/>
             </a:ext>
           </a:extLst>
         </p:spPr>
@@ -24986,7 +24993,7 @@
           </a:ln>
           <a:extLst>
             <a:ext uri="{C572A759-6A51-4108-AA02-DFA0A04FC94B}">
-              <ma14:wrappingTextBoxFlag xmlns:ma14="http://schemas.microsoft.com/office/mac/drawingml/2011/main" xmlns:a14="http://schemas.microsoft.com/office/drawing/2010/main" xmlns:m="http://schemas.openxmlformats.org/officeDocument/2006/math" xmlns="" val="1"/>
+              <ma14:wrappingTextBoxFlag xmlns="" xmlns:m="http://schemas.openxmlformats.org/officeDocument/2006/math" xmlns:a14="http://schemas.microsoft.com/office/drawing/2010/main" xmlns:ma14="http://schemas.microsoft.com/office/mac/drawingml/2011/main" val="1"/>
             </a:ext>
           </a:extLst>
         </p:spPr>
@@ -25031,7 +25038,7 @@
           </a:ln>
           <a:extLst>
             <a:ext uri="{C572A759-6A51-4108-AA02-DFA0A04FC94B}">
-              <ma14:wrappingTextBoxFlag xmlns:ma14="http://schemas.microsoft.com/office/mac/drawingml/2011/main" xmlns:a14="http://schemas.microsoft.com/office/drawing/2010/main" xmlns:m="http://schemas.openxmlformats.org/officeDocument/2006/math" xmlns="" val="1"/>
+              <ma14:wrappingTextBoxFlag xmlns="" xmlns:m="http://schemas.openxmlformats.org/officeDocument/2006/math" xmlns:a14="http://schemas.microsoft.com/office/drawing/2010/main" xmlns:ma14="http://schemas.microsoft.com/office/mac/drawingml/2011/main" val="1"/>
             </a:ext>
           </a:extLst>
         </p:spPr>
@@ -25073,7 +25080,7 @@
           </a:ln>
           <a:extLst>
             <a:ext uri="{C572A759-6A51-4108-AA02-DFA0A04FC94B}">
-              <ma14:wrappingTextBoxFlag xmlns:ma14="http://schemas.microsoft.com/office/mac/drawingml/2011/main" xmlns:a14="http://schemas.microsoft.com/office/drawing/2010/main" xmlns:m="http://schemas.openxmlformats.org/officeDocument/2006/math" xmlns="" val="1"/>
+              <ma14:wrappingTextBoxFlag xmlns="" xmlns:m="http://schemas.openxmlformats.org/officeDocument/2006/math" xmlns:a14="http://schemas.microsoft.com/office/drawing/2010/main" xmlns:ma14="http://schemas.microsoft.com/office/mac/drawingml/2011/main" val="1"/>
             </a:ext>
           </a:extLst>
         </p:spPr>
@@ -25118,7 +25125,7 @@
           </a:ln>
           <a:extLst>
             <a:ext uri="{C572A759-6A51-4108-AA02-DFA0A04FC94B}">
-              <ma14:wrappingTextBoxFlag xmlns:ma14="http://schemas.microsoft.com/office/mac/drawingml/2011/main" xmlns:a14="http://schemas.microsoft.com/office/drawing/2010/main" xmlns:m="http://schemas.openxmlformats.org/officeDocument/2006/math" xmlns="" val="1"/>
+              <ma14:wrappingTextBoxFlag xmlns="" xmlns:m="http://schemas.openxmlformats.org/officeDocument/2006/math" xmlns:a14="http://schemas.microsoft.com/office/drawing/2010/main" xmlns:ma14="http://schemas.microsoft.com/office/mac/drawingml/2011/main" val="1"/>
             </a:ext>
           </a:extLst>
         </p:spPr>
@@ -25157,7 +25164,7 @@
           </a:ln>
           <a:extLst>
             <a:ext uri="{C572A759-6A51-4108-AA02-DFA0A04FC94B}">
-              <ma14:wrappingTextBoxFlag xmlns:ma14="http://schemas.microsoft.com/office/mac/drawingml/2011/main" xmlns:a14="http://schemas.microsoft.com/office/drawing/2010/main" xmlns:m="http://schemas.openxmlformats.org/officeDocument/2006/math" xmlns="" val="1"/>
+              <ma14:wrappingTextBoxFlag xmlns="" xmlns:m="http://schemas.openxmlformats.org/officeDocument/2006/math" xmlns:a14="http://schemas.microsoft.com/office/drawing/2010/main" xmlns:ma14="http://schemas.microsoft.com/office/mac/drawingml/2011/main" val="1"/>
             </a:ext>
           </a:extLst>
         </p:spPr>
@@ -25196,7 +25203,7 @@
           </a:ln>
           <a:extLst>
             <a:ext uri="{C572A759-6A51-4108-AA02-DFA0A04FC94B}">
-              <ma14:wrappingTextBoxFlag xmlns:ma14="http://schemas.microsoft.com/office/mac/drawingml/2011/main" xmlns:a14="http://schemas.microsoft.com/office/drawing/2010/main" xmlns:m="http://schemas.openxmlformats.org/officeDocument/2006/math" xmlns="" val="1"/>
+              <ma14:wrappingTextBoxFlag xmlns="" xmlns:m="http://schemas.openxmlformats.org/officeDocument/2006/math" xmlns:a14="http://schemas.microsoft.com/office/drawing/2010/main" xmlns:ma14="http://schemas.microsoft.com/office/mac/drawingml/2011/main" val="1"/>
             </a:ext>
           </a:extLst>
         </p:spPr>
@@ -25243,7 +25250,7 @@
           </a:ln>
           <a:extLst>
             <a:ext uri="{C572A759-6A51-4108-AA02-DFA0A04FC94B}">
-              <ma14:wrappingTextBoxFlag xmlns:ma14="http://schemas.microsoft.com/office/mac/drawingml/2011/main" xmlns:a14="http://schemas.microsoft.com/office/drawing/2010/main" xmlns:m="http://schemas.openxmlformats.org/officeDocument/2006/math" xmlns="" val="1"/>
+              <ma14:wrappingTextBoxFlag xmlns="" xmlns:m="http://schemas.openxmlformats.org/officeDocument/2006/math" xmlns:a14="http://schemas.microsoft.com/office/drawing/2010/main" xmlns:ma14="http://schemas.microsoft.com/office/mac/drawingml/2011/main" val="1"/>
             </a:ext>
           </a:extLst>
         </p:spPr>
@@ -25290,7 +25297,7 @@
           </a:ln>
           <a:extLst>
             <a:ext uri="{C572A759-6A51-4108-AA02-DFA0A04FC94B}">
-              <ma14:wrappingTextBoxFlag xmlns:ma14="http://schemas.microsoft.com/office/mac/drawingml/2011/main" xmlns:a14="http://schemas.microsoft.com/office/drawing/2010/main" xmlns:m="http://schemas.openxmlformats.org/officeDocument/2006/math" xmlns="" val="1"/>
+              <ma14:wrappingTextBoxFlag xmlns="" xmlns:m="http://schemas.openxmlformats.org/officeDocument/2006/math" xmlns:a14="http://schemas.microsoft.com/office/drawing/2010/main" xmlns:ma14="http://schemas.microsoft.com/office/mac/drawingml/2011/main" val="1"/>
             </a:ext>
           </a:extLst>
         </p:spPr>
@@ -25514,7 +25521,7 @@
           </a:ln>
           <a:extLst>
             <a:ext uri="{C572A759-6A51-4108-AA02-DFA0A04FC94B}">
-              <ma14:wrappingTextBoxFlag xmlns:ma14="http://schemas.microsoft.com/office/mac/drawingml/2011/main" xmlns:a14="http://schemas.microsoft.com/office/drawing/2010/main" xmlns:m="http://schemas.openxmlformats.org/officeDocument/2006/math" xmlns="" val="1"/>
+              <ma14:wrappingTextBoxFlag xmlns="" xmlns:m="http://schemas.openxmlformats.org/officeDocument/2006/math" xmlns:a14="http://schemas.microsoft.com/office/drawing/2010/main" xmlns:ma14="http://schemas.microsoft.com/office/mac/drawingml/2011/main" val="1"/>
             </a:ext>
           </a:extLst>
         </p:spPr>
@@ -25611,7 +25618,7 @@
           </a:ln>
           <a:extLst>
             <a:ext uri="{C572A759-6A51-4108-AA02-DFA0A04FC94B}">
-              <ma14:wrappingTextBoxFlag xmlns:ma14="http://schemas.microsoft.com/office/mac/drawingml/2011/main" xmlns:a14="http://schemas.microsoft.com/office/drawing/2010/main" xmlns:m="http://schemas.openxmlformats.org/officeDocument/2006/math" xmlns="" val="1"/>
+              <ma14:wrappingTextBoxFlag xmlns="" xmlns:m="http://schemas.openxmlformats.org/officeDocument/2006/math" xmlns:a14="http://schemas.microsoft.com/office/drawing/2010/main" xmlns:ma14="http://schemas.microsoft.com/office/mac/drawingml/2011/main" val="1"/>
             </a:ext>
           </a:extLst>
         </p:spPr>
@@ -25828,7 +25835,7 @@
           </a:ln>
           <a:extLst>
             <a:ext uri="{C572A759-6A51-4108-AA02-DFA0A04FC94B}">
-              <ma14:wrappingTextBoxFlag xmlns:ma14="http://schemas.microsoft.com/office/mac/drawingml/2011/main" xmlns:a14="http://schemas.microsoft.com/office/drawing/2010/main" xmlns:m="http://schemas.openxmlformats.org/officeDocument/2006/math" xmlns="" val="1"/>
+              <ma14:wrappingTextBoxFlag xmlns="" xmlns:m="http://schemas.openxmlformats.org/officeDocument/2006/math" xmlns:a14="http://schemas.microsoft.com/office/drawing/2010/main" xmlns:ma14="http://schemas.microsoft.com/office/mac/drawingml/2011/main" val="1"/>
             </a:ext>
           </a:extLst>
         </p:spPr>
@@ -25866,7 +25873,7 @@
           </a:ln>
           <a:extLst>
             <a:ext uri="{C572A759-6A51-4108-AA02-DFA0A04FC94B}">
-              <ma14:wrappingTextBoxFlag xmlns:ma14="http://schemas.microsoft.com/office/mac/drawingml/2011/main" xmlns:a14="http://schemas.microsoft.com/office/drawing/2010/main" xmlns:m="http://schemas.openxmlformats.org/officeDocument/2006/math" xmlns="" val="1"/>
+              <ma14:wrappingTextBoxFlag xmlns="" xmlns:m="http://schemas.openxmlformats.org/officeDocument/2006/math" xmlns:a14="http://schemas.microsoft.com/office/drawing/2010/main" xmlns:ma14="http://schemas.microsoft.com/office/mac/drawingml/2011/main" val="1"/>
             </a:ext>
           </a:extLst>
         </p:spPr>
@@ -26004,7 +26011,7 @@
           </a:ln>
           <a:extLst>
             <a:ext uri="{C572A759-6A51-4108-AA02-DFA0A04FC94B}">
-              <ma14:wrappingTextBoxFlag xmlns:ma14="http://schemas.microsoft.com/office/mac/drawingml/2011/main" xmlns:a14="http://schemas.microsoft.com/office/drawing/2010/main" xmlns:m="http://schemas.openxmlformats.org/officeDocument/2006/math" xmlns="" val="1"/>
+              <ma14:wrappingTextBoxFlag xmlns="" xmlns:m="http://schemas.openxmlformats.org/officeDocument/2006/math" xmlns:a14="http://schemas.microsoft.com/office/drawing/2010/main" xmlns:ma14="http://schemas.microsoft.com/office/mac/drawingml/2011/main" val="1"/>
             </a:ext>
           </a:extLst>
         </p:spPr>
@@ -26039,7 +26046,7 @@
           </a:ln>
           <a:extLst>
             <a:ext uri="{C572A759-6A51-4108-AA02-DFA0A04FC94B}">
-              <ma14:wrappingTextBoxFlag xmlns:ma14="http://schemas.microsoft.com/office/mac/drawingml/2011/main" xmlns:a14="http://schemas.microsoft.com/office/drawing/2010/main" xmlns:m="http://schemas.openxmlformats.org/officeDocument/2006/math" xmlns="" val="1"/>
+              <ma14:wrappingTextBoxFlag xmlns="" xmlns:m="http://schemas.openxmlformats.org/officeDocument/2006/math" xmlns:a14="http://schemas.microsoft.com/office/drawing/2010/main" xmlns:ma14="http://schemas.microsoft.com/office/mac/drawingml/2011/main" val="1"/>
             </a:ext>
           </a:extLst>
         </p:spPr>
@@ -26146,7 +26153,7 @@
           </a:ln>
           <a:extLst>
             <a:ext uri="{C572A759-6A51-4108-AA02-DFA0A04FC94B}">
-              <ma14:wrappingTextBoxFlag xmlns:ma14="http://schemas.microsoft.com/office/mac/drawingml/2011/main" xmlns:a14="http://schemas.microsoft.com/office/drawing/2010/main" xmlns:m="http://schemas.openxmlformats.org/officeDocument/2006/math" xmlns="" val="1"/>
+              <ma14:wrappingTextBoxFlag xmlns="" xmlns:m="http://schemas.openxmlformats.org/officeDocument/2006/math" xmlns:a14="http://schemas.microsoft.com/office/drawing/2010/main" xmlns:ma14="http://schemas.microsoft.com/office/mac/drawingml/2011/main" val="1"/>
             </a:ext>
           </a:extLst>
         </p:spPr>
@@ -26363,7 +26370,7 @@
           </a:ln>
           <a:extLst>
             <a:ext uri="{C572A759-6A51-4108-AA02-DFA0A04FC94B}">
-              <ma14:wrappingTextBoxFlag xmlns:ma14="http://schemas.microsoft.com/office/mac/drawingml/2011/main" xmlns:a14="http://schemas.microsoft.com/office/drawing/2010/main" xmlns:m="http://schemas.openxmlformats.org/officeDocument/2006/math" xmlns="" val="1"/>
+              <ma14:wrappingTextBoxFlag xmlns="" xmlns:m="http://schemas.openxmlformats.org/officeDocument/2006/math" xmlns:a14="http://schemas.microsoft.com/office/drawing/2010/main" xmlns:ma14="http://schemas.microsoft.com/office/mac/drawingml/2011/main" val="1"/>
             </a:ext>
           </a:extLst>
         </p:spPr>
@@ -26401,7 +26408,7 @@
           </a:ln>
           <a:extLst>
             <a:ext uri="{C572A759-6A51-4108-AA02-DFA0A04FC94B}">
-              <ma14:wrappingTextBoxFlag xmlns:ma14="http://schemas.microsoft.com/office/mac/drawingml/2011/main" xmlns:a14="http://schemas.microsoft.com/office/drawing/2010/main" xmlns:m="http://schemas.openxmlformats.org/officeDocument/2006/math" xmlns="" val="1"/>
+              <ma14:wrappingTextBoxFlag xmlns="" xmlns:m="http://schemas.openxmlformats.org/officeDocument/2006/math" xmlns:a14="http://schemas.microsoft.com/office/drawing/2010/main" xmlns:ma14="http://schemas.microsoft.com/office/mac/drawingml/2011/main" val="1"/>
             </a:ext>
           </a:extLst>
         </p:spPr>
@@ -26539,7 +26546,7 @@
           </a:ln>
           <a:extLst>
             <a:ext uri="{C572A759-6A51-4108-AA02-DFA0A04FC94B}">
-              <ma14:wrappingTextBoxFlag xmlns:ma14="http://schemas.microsoft.com/office/mac/drawingml/2011/main" xmlns:a14="http://schemas.microsoft.com/office/drawing/2010/main" xmlns:m="http://schemas.openxmlformats.org/officeDocument/2006/math" xmlns="" val="1"/>
+              <ma14:wrappingTextBoxFlag xmlns="" xmlns:m="http://schemas.openxmlformats.org/officeDocument/2006/math" xmlns:a14="http://schemas.microsoft.com/office/drawing/2010/main" xmlns:ma14="http://schemas.microsoft.com/office/mac/drawingml/2011/main" val="1"/>
             </a:ext>
           </a:extLst>
         </p:spPr>
@@ -26574,7 +26581,7 @@
           </a:ln>
           <a:extLst>
             <a:ext uri="{C572A759-6A51-4108-AA02-DFA0A04FC94B}">
-              <ma14:wrappingTextBoxFlag xmlns:ma14="http://schemas.microsoft.com/office/mac/drawingml/2011/main" xmlns:a14="http://schemas.microsoft.com/office/drawing/2010/main" xmlns:m="http://schemas.openxmlformats.org/officeDocument/2006/math" xmlns="" val="1"/>
+              <ma14:wrappingTextBoxFlag xmlns="" xmlns:m="http://schemas.openxmlformats.org/officeDocument/2006/math" xmlns:a14="http://schemas.microsoft.com/office/drawing/2010/main" xmlns:ma14="http://schemas.microsoft.com/office/mac/drawingml/2011/main" val="1"/>
             </a:ext>
           </a:extLst>
         </p:spPr>
@@ -26725,7 +26732,7 @@
           </a:ln>
           <a:extLst>
             <a:ext uri="{C572A759-6A51-4108-AA02-DFA0A04FC94B}">
-              <ma14:wrappingTextBoxFlag xmlns:ma14="http://schemas.microsoft.com/office/mac/drawingml/2011/main" xmlns:a14="http://schemas.microsoft.com/office/drawing/2010/main" xmlns:m="http://schemas.openxmlformats.org/officeDocument/2006/math" xmlns="" val="1"/>
+              <ma14:wrappingTextBoxFlag xmlns="" xmlns:m="http://schemas.openxmlformats.org/officeDocument/2006/math" xmlns:a14="http://schemas.microsoft.com/office/drawing/2010/main" xmlns:ma14="http://schemas.microsoft.com/office/mac/drawingml/2011/main" val="1"/>
             </a:ext>
           </a:extLst>
         </p:spPr>
@@ -26878,7 +26885,7 @@
           </a:ln>
           <a:extLst>
             <a:ext uri="{C572A759-6A51-4108-AA02-DFA0A04FC94B}">
-              <ma14:wrappingTextBoxFlag xmlns:ma14="http://schemas.microsoft.com/office/mac/drawingml/2011/main" xmlns:a14="http://schemas.microsoft.com/office/drawing/2010/main" xmlns:m="http://schemas.openxmlformats.org/officeDocument/2006/math" xmlns="" val="1"/>
+              <ma14:wrappingTextBoxFlag xmlns="" xmlns:m="http://schemas.openxmlformats.org/officeDocument/2006/math" xmlns:a14="http://schemas.microsoft.com/office/drawing/2010/main" xmlns:ma14="http://schemas.microsoft.com/office/mac/drawingml/2011/main" val="1"/>
             </a:ext>
           </a:extLst>
         </p:spPr>
@@ -26987,7 +26994,7 @@
           </a:ln>
           <a:extLst>
             <a:ext uri="{C572A759-6A51-4108-AA02-DFA0A04FC94B}">
-              <ma14:wrappingTextBoxFlag xmlns:ma14="http://schemas.microsoft.com/office/mac/drawingml/2011/main" xmlns:a14="http://schemas.microsoft.com/office/drawing/2010/main" xmlns:m="http://schemas.openxmlformats.org/officeDocument/2006/math" xmlns="" val="1"/>
+              <ma14:wrappingTextBoxFlag xmlns="" xmlns:m="http://schemas.openxmlformats.org/officeDocument/2006/math" xmlns:a14="http://schemas.microsoft.com/office/drawing/2010/main" xmlns:ma14="http://schemas.microsoft.com/office/mac/drawingml/2011/main" val="1"/>
             </a:ext>
           </a:extLst>
         </p:spPr>
@@ -27204,7 +27211,7 @@
           </a:ln>
           <a:extLst>
             <a:ext uri="{C572A759-6A51-4108-AA02-DFA0A04FC94B}">
-              <ma14:wrappingTextBoxFlag xmlns:ma14="http://schemas.microsoft.com/office/mac/drawingml/2011/main" xmlns:a14="http://schemas.microsoft.com/office/drawing/2010/main" xmlns:m="http://schemas.openxmlformats.org/officeDocument/2006/math" xmlns="" val="1"/>
+              <ma14:wrappingTextBoxFlag xmlns="" xmlns:m="http://schemas.openxmlformats.org/officeDocument/2006/math" xmlns:a14="http://schemas.microsoft.com/office/drawing/2010/main" xmlns:ma14="http://schemas.microsoft.com/office/mac/drawingml/2011/main" val="1"/>
             </a:ext>
           </a:extLst>
         </p:spPr>
@@ -27242,7 +27249,7 @@
           </a:ln>
           <a:extLst>
             <a:ext uri="{C572A759-6A51-4108-AA02-DFA0A04FC94B}">
-              <ma14:wrappingTextBoxFlag xmlns:ma14="http://schemas.microsoft.com/office/mac/drawingml/2011/main" xmlns:a14="http://schemas.microsoft.com/office/drawing/2010/main" xmlns:m="http://schemas.openxmlformats.org/officeDocument/2006/math" xmlns="" val="1"/>
+              <ma14:wrappingTextBoxFlag xmlns="" xmlns:m="http://schemas.openxmlformats.org/officeDocument/2006/math" xmlns:a14="http://schemas.microsoft.com/office/drawing/2010/main" xmlns:ma14="http://schemas.microsoft.com/office/mac/drawingml/2011/main" val="1"/>
             </a:ext>
           </a:extLst>
         </p:spPr>
@@ -27380,7 +27387,7 @@
           </a:ln>
           <a:extLst>
             <a:ext uri="{C572A759-6A51-4108-AA02-DFA0A04FC94B}">
-              <ma14:wrappingTextBoxFlag xmlns:ma14="http://schemas.microsoft.com/office/mac/drawingml/2011/main" xmlns:a14="http://schemas.microsoft.com/office/drawing/2010/main" xmlns:m="http://schemas.openxmlformats.org/officeDocument/2006/math" xmlns="" val="1"/>
+              <ma14:wrappingTextBoxFlag xmlns="" xmlns:m="http://schemas.openxmlformats.org/officeDocument/2006/math" xmlns:a14="http://schemas.microsoft.com/office/drawing/2010/main" xmlns:ma14="http://schemas.microsoft.com/office/mac/drawingml/2011/main" val="1"/>
             </a:ext>
           </a:extLst>
         </p:spPr>
@@ -27415,7 +27422,7 @@
           </a:ln>
           <a:extLst>
             <a:ext uri="{C572A759-6A51-4108-AA02-DFA0A04FC94B}">
-              <ma14:wrappingTextBoxFlag xmlns:ma14="http://schemas.microsoft.com/office/mac/drawingml/2011/main" xmlns:a14="http://schemas.microsoft.com/office/drawing/2010/main" xmlns:m="http://schemas.openxmlformats.org/officeDocument/2006/math" xmlns="" val="1"/>
+              <ma14:wrappingTextBoxFlag xmlns="" xmlns:m="http://schemas.openxmlformats.org/officeDocument/2006/math" xmlns:a14="http://schemas.microsoft.com/office/drawing/2010/main" xmlns:ma14="http://schemas.microsoft.com/office/mac/drawingml/2011/main" val="1"/>
             </a:ext>
           </a:extLst>
         </p:spPr>
@@ -27566,7 +27573,7 @@
           </a:ln>
           <a:extLst>
             <a:ext uri="{C572A759-6A51-4108-AA02-DFA0A04FC94B}">
-              <ma14:wrappingTextBoxFlag xmlns:ma14="http://schemas.microsoft.com/office/mac/drawingml/2011/main" xmlns:a14="http://schemas.microsoft.com/office/drawing/2010/main" xmlns:m="http://schemas.openxmlformats.org/officeDocument/2006/math" xmlns="" val="1"/>
+              <ma14:wrappingTextBoxFlag xmlns="" xmlns:m="http://schemas.openxmlformats.org/officeDocument/2006/math" xmlns:a14="http://schemas.microsoft.com/office/drawing/2010/main" xmlns:ma14="http://schemas.microsoft.com/office/mac/drawingml/2011/main" val="1"/>
             </a:ext>
           </a:extLst>
         </p:spPr>
@@ -27715,7 +27722,7 @@
           </a:ln>
           <a:extLst>
             <a:ext uri="{C572A759-6A51-4108-AA02-DFA0A04FC94B}">
-              <ma14:wrappingTextBoxFlag xmlns:ma14="http://schemas.microsoft.com/office/mac/drawingml/2011/main" xmlns:a14="http://schemas.microsoft.com/office/drawing/2010/main" xmlns:m="http://schemas.openxmlformats.org/officeDocument/2006/math" xmlns="" val="1"/>
+              <ma14:wrappingTextBoxFlag xmlns="" xmlns:m="http://schemas.openxmlformats.org/officeDocument/2006/math" xmlns:a14="http://schemas.microsoft.com/office/drawing/2010/main" xmlns:ma14="http://schemas.microsoft.com/office/mac/drawingml/2011/main" val="1"/>
             </a:ext>
           </a:extLst>
         </p:spPr>
@@ -27864,7 +27871,7 @@
           </a:ln>
           <a:extLst>
             <a:ext uri="{C572A759-6A51-4108-AA02-DFA0A04FC94B}">
-              <ma14:wrappingTextBoxFlag xmlns:ma14="http://schemas.microsoft.com/office/mac/drawingml/2011/main" xmlns:a14="http://schemas.microsoft.com/office/drawing/2010/main" xmlns:m="http://schemas.openxmlformats.org/officeDocument/2006/math" xmlns="" val="1"/>
+              <ma14:wrappingTextBoxFlag xmlns="" xmlns:m="http://schemas.openxmlformats.org/officeDocument/2006/math" xmlns:a14="http://schemas.microsoft.com/office/drawing/2010/main" xmlns:ma14="http://schemas.microsoft.com/office/mac/drawingml/2011/main" val="1"/>
             </a:ext>
           </a:extLst>
         </p:spPr>
@@ -27959,7 +27966,7 @@
           </a:ln>
           <a:extLst>
             <a:ext uri="{C572A759-6A51-4108-AA02-DFA0A04FC94B}">
-              <ma14:wrappingTextBoxFlag xmlns:ma14="http://schemas.microsoft.com/office/mac/drawingml/2011/main" xmlns:a14="http://schemas.microsoft.com/office/drawing/2010/main" xmlns:m="http://schemas.openxmlformats.org/officeDocument/2006/math" xmlns="" val="1"/>
+              <ma14:wrappingTextBoxFlag xmlns="" xmlns:m="http://schemas.openxmlformats.org/officeDocument/2006/math" xmlns:a14="http://schemas.microsoft.com/office/drawing/2010/main" xmlns:ma14="http://schemas.microsoft.com/office/mac/drawingml/2011/main" val="1"/>
             </a:ext>
           </a:extLst>
         </p:spPr>
@@ -28176,7 +28183,7 @@
           </a:ln>
           <a:extLst>
             <a:ext uri="{C572A759-6A51-4108-AA02-DFA0A04FC94B}">
-              <ma14:wrappingTextBoxFlag xmlns:ma14="http://schemas.microsoft.com/office/mac/drawingml/2011/main" xmlns:a14="http://schemas.microsoft.com/office/drawing/2010/main" xmlns:m="http://schemas.openxmlformats.org/officeDocument/2006/math" xmlns="" val="1"/>
+              <ma14:wrappingTextBoxFlag xmlns="" xmlns:m="http://schemas.openxmlformats.org/officeDocument/2006/math" xmlns:a14="http://schemas.microsoft.com/office/drawing/2010/main" xmlns:ma14="http://schemas.microsoft.com/office/mac/drawingml/2011/main" val="1"/>
             </a:ext>
           </a:extLst>
         </p:spPr>
@@ -28214,7 +28221,7 @@
           </a:ln>
           <a:extLst>
             <a:ext uri="{C572A759-6A51-4108-AA02-DFA0A04FC94B}">
-              <ma14:wrappingTextBoxFlag xmlns:ma14="http://schemas.microsoft.com/office/mac/drawingml/2011/main" xmlns:a14="http://schemas.microsoft.com/office/drawing/2010/main" xmlns:m="http://schemas.openxmlformats.org/officeDocument/2006/math" xmlns="" val="1"/>
+              <ma14:wrappingTextBoxFlag xmlns="" xmlns:m="http://schemas.openxmlformats.org/officeDocument/2006/math" xmlns:a14="http://schemas.microsoft.com/office/drawing/2010/main" xmlns:ma14="http://schemas.microsoft.com/office/mac/drawingml/2011/main" val="1"/>
             </a:ext>
           </a:extLst>
         </p:spPr>
@@ -28352,7 +28359,7 @@
           </a:ln>
           <a:extLst>
             <a:ext uri="{C572A759-6A51-4108-AA02-DFA0A04FC94B}">
-              <ma14:wrappingTextBoxFlag xmlns:ma14="http://schemas.microsoft.com/office/mac/drawingml/2011/main" xmlns:a14="http://schemas.microsoft.com/office/drawing/2010/main" xmlns:m="http://schemas.openxmlformats.org/officeDocument/2006/math" xmlns="" val="1"/>
+              <ma14:wrappingTextBoxFlag xmlns="" xmlns:m="http://schemas.openxmlformats.org/officeDocument/2006/math" xmlns:a14="http://schemas.microsoft.com/office/drawing/2010/main" xmlns:ma14="http://schemas.microsoft.com/office/mac/drawingml/2011/main" val="1"/>
             </a:ext>
           </a:extLst>
         </p:spPr>
@@ -28387,7 +28394,7 @@
           </a:ln>
           <a:extLst>
             <a:ext uri="{C572A759-6A51-4108-AA02-DFA0A04FC94B}">
-              <ma14:wrappingTextBoxFlag xmlns:ma14="http://schemas.microsoft.com/office/mac/drawingml/2011/main" xmlns:a14="http://schemas.microsoft.com/office/drawing/2010/main" xmlns:m="http://schemas.openxmlformats.org/officeDocument/2006/math" xmlns="" val="1"/>
+              <ma14:wrappingTextBoxFlag xmlns="" xmlns:m="http://schemas.openxmlformats.org/officeDocument/2006/math" xmlns:a14="http://schemas.microsoft.com/office/drawing/2010/main" xmlns:ma14="http://schemas.microsoft.com/office/mac/drawingml/2011/main" val="1"/>
             </a:ext>
           </a:extLst>
         </p:spPr>
@@ -28538,7 +28545,7 @@
           </a:ln>
           <a:extLst>
             <a:ext uri="{C572A759-6A51-4108-AA02-DFA0A04FC94B}">
-              <ma14:wrappingTextBoxFlag xmlns:ma14="http://schemas.microsoft.com/office/mac/drawingml/2011/main" xmlns:a14="http://schemas.microsoft.com/office/drawing/2010/main" xmlns:m="http://schemas.openxmlformats.org/officeDocument/2006/math" xmlns="" val="1"/>
+              <ma14:wrappingTextBoxFlag xmlns="" xmlns:m="http://schemas.openxmlformats.org/officeDocument/2006/math" xmlns:a14="http://schemas.microsoft.com/office/drawing/2010/main" xmlns:ma14="http://schemas.microsoft.com/office/mac/drawingml/2011/main" val="1"/>
             </a:ext>
           </a:extLst>
         </p:spPr>
@@ -28687,7 +28694,7 @@
           </a:ln>
           <a:extLst>
             <a:ext uri="{C572A759-6A51-4108-AA02-DFA0A04FC94B}">
-              <ma14:wrappingTextBoxFlag xmlns:ma14="http://schemas.microsoft.com/office/mac/drawingml/2011/main" xmlns:a14="http://schemas.microsoft.com/office/drawing/2010/main" xmlns:m="http://schemas.openxmlformats.org/officeDocument/2006/math" xmlns="" val="1"/>
+              <ma14:wrappingTextBoxFlag xmlns="" xmlns:m="http://schemas.openxmlformats.org/officeDocument/2006/math" xmlns:a14="http://schemas.microsoft.com/office/drawing/2010/main" xmlns:ma14="http://schemas.microsoft.com/office/mac/drawingml/2011/main" val="1"/>
             </a:ext>
           </a:extLst>
         </p:spPr>
@@ -28836,7 +28843,7 @@
           </a:ln>
           <a:extLst>
             <a:ext uri="{C572A759-6A51-4108-AA02-DFA0A04FC94B}">
-              <ma14:wrappingTextBoxFlag xmlns:ma14="http://schemas.microsoft.com/office/mac/drawingml/2011/main" xmlns:a14="http://schemas.microsoft.com/office/drawing/2010/main" xmlns:m="http://schemas.openxmlformats.org/officeDocument/2006/math" xmlns="" val="1"/>
+              <ma14:wrappingTextBoxFlag xmlns="" xmlns:m="http://schemas.openxmlformats.org/officeDocument/2006/math" xmlns:a14="http://schemas.microsoft.com/office/drawing/2010/main" xmlns:ma14="http://schemas.microsoft.com/office/mac/drawingml/2011/main" val="1"/>
             </a:ext>
           </a:extLst>
         </p:spPr>
@@ -29000,7 +29007,7 @@
           </a:ln>
           <a:extLst>
             <a:ext uri="{C572A759-6A51-4108-AA02-DFA0A04FC94B}">
-              <ma14:wrappingTextBoxFlag xmlns:ma14="http://schemas.microsoft.com/office/mac/drawingml/2011/main" xmlns:a14="http://schemas.microsoft.com/office/drawing/2010/main" xmlns:m="http://schemas.openxmlformats.org/officeDocument/2006/math" xmlns="" val="1"/>
+              <ma14:wrappingTextBoxFlag xmlns="" xmlns:m="http://schemas.openxmlformats.org/officeDocument/2006/math" xmlns:a14="http://schemas.microsoft.com/office/drawing/2010/main" xmlns:ma14="http://schemas.microsoft.com/office/mac/drawingml/2011/main" val="1"/>
             </a:ext>
           </a:extLst>
         </p:spPr>
@@ -29945,7 +29952,7 @@
           </a:ln>
           <a:extLst>
             <a:ext uri="{C572A759-6A51-4108-AA02-DFA0A04FC94B}">
-              <ma14:wrappingTextBoxFlag xmlns:ma14="http://schemas.microsoft.com/office/mac/drawingml/2011/main" xmlns:a14="http://schemas.microsoft.com/office/drawing/2010/main" xmlns:m="http://schemas.openxmlformats.org/officeDocument/2006/math" xmlns="" val="1"/>
+              <ma14:wrappingTextBoxFlag xmlns="" xmlns:m="http://schemas.openxmlformats.org/officeDocument/2006/math" xmlns:a14="http://schemas.microsoft.com/office/drawing/2010/main" xmlns:ma14="http://schemas.microsoft.com/office/mac/drawingml/2011/main" val="1"/>
             </a:ext>
           </a:extLst>
         </p:spPr>
@@ -30674,7 +30681,7 @@
           </a:ln>
           <a:extLst>
             <a:ext uri="{C572A759-6A51-4108-AA02-DFA0A04FC94B}">
-              <ma14:wrappingTextBoxFlag xmlns:ma14="http://schemas.microsoft.com/office/mac/drawingml/2011/main" xmlns:a14="http://schemas.microsoft.com/office/drawing/2010/main" xmlns:m="http://schemas.openxmlformats.org/officeDocument/2006/math" xmlns="" val="1"/>
+              <ma14:wrappingTextBoxFlag xmlns="" xmlns:m="http://schemas.openxmlformats.org/officeDocument/2006/math" xmlns:a14="http://schemas.microsoft.com/office/drawing/2010/main" xmlns:ma14="http://schemas.microsoft.com/office/mac/drawingml/2011/main" val="1"/>
             </a:ext>
           </a:extLst>
         </p:spPr>
@@ -32599,7 +32606,7 @@
           </a:ln>
           <a:extLst>
             <a:ext uri="{C572A759-6A51-4108-AA02-DFA0A04FC94B}">
-              <ma14:wrappingTextBoxFlag xmlns:ma14="http://schemas.microsoft.com/office/mac/drawingml/2011/main" xmlns:a14="http://schemas.microsoft.com/office/drawing/2010/main" xmlns:m="http://schemas.openxmlformats.org/officeDocument/2006/math" xmlns="" val="1"/>
+              <ma14:wrappingTextBoxFlag xmlns="" xmlns:m="http://schemas.openxmlformats.org/officeDocument/2006/math" xmlns:a14="http://schemas.microsoft.com/office/drawing/2010/main" xmlns:ma14="http://schemas.microsoft.com/office/mac/drawingml/2011/main" val="1"/>
             </a:ext>
           </a:extLst>
         </p:spPr>
@@ -32638,7 +32645,7 @@
           </a:ln>
           <a:extLst>
             <a:ext uri="{C572A759-6A51-4108-AA02-DFA0A04FC94B}">
-              <ma14:wrappingTextBoxFlag xmlns:ma14="http://schemas.microsoft.com/office/mac/drawingml/2011/main" xmlns:a14="http://schemas.microsoft.com/office/drawing/2010/main" xmlns:m="http://schemas.openxmlformats.org/officeDocument/2006/math" xmlns="" val="1"/>
+              <ma14:wrappingTextBoxFlag xmlns="" xmlns:m="http://schemas.openxmlformats.org/officeDocument/2006/math" xmlns:a14="http://schemas.microsoft.com/office/drawing/2010/main" xmlns:ma14="http://schemas.microsoft.com/office/mac/drawingml/2011/main" val="1"/>
             </a:ext>
           </a:extLst>
         </p:spPr>
@@ -32695,7 +32702,7 @@
           </a:ln>
           <a:extLst>
             <a:ext uri="{C572A759-6A51-4108-AA02-DFA0A04FC94B}">
-              <ma14:wrappingTextBoxFlag xmlns:ma14="http://schemas.microsoft.com/office/mac/drawingml/2011/main" xmlns:a14="http://schemas.microsoft.com/office/drawing/2010/main" xmlns:m="http://schemas.openxmlformats.org/officeDocument/2006/math" xmlns="" val="1"/>
+              <ma14:wrappingTextBoxFlag xmlns="" xmlns:m="http://schemas.openxmlformats.org/officeDocument/2006/math" xmlns:a14="http://schemas.microsoft.com/office/drawing/2010/main" xmlns:ma14="http://schemas.microsoft.com/office/mac/drawingml/2011/main" val="1"/>
             </a:ext>
           </a:extLst>
         </p:spPr>
@@ -32903,7 +32910,7 @@
           </a:ln>
           <a:extLst>
             <a:ext uri="{C572A759-6A51-4108-AA02-DFA0A04FC94B}">
-              <ma14:wrappingTextBoxFlag xmlns:ma14="http://schemas.microsoft.com/office/mac/drawingml/2011/main" xmlns:a14="http://schemas.microsoft.com/office/drawing/2010/main" xmlns:m="http://schemas.openxmlformats.org/officeDocument/2006/math" xmlns="" val="1"/>
+              <ma14:wrappingTextBoxFlag xmlns="" xmlns:m="http://schemas.openxmlformats.org/officeDocument/2006/math" xmlns:a14="http://schemas.microsoft.com/office/drawing/2010/main" xmlns:ma14="http://schemas.microsoft.com/office/mac/drawingml/2011/main" val="1"/>
             </a:ext>
           </a:extLst>
         </p:spPr>
@@ -32942,7 +32949,7 @@
           </a:ln>
           <a:extLst>
             <a:ext uri="{C572A759-6A51-4108-AA02-DFA0A04FC94B}">
-              <ma14:wrappingTextBoxFlag xmlns:ma14="http://schemas.microsoft.com/office/mac/drawingml/2011/main" xmlns:a14="http://schemas.microsoft.com/office/drawing/2010/main" xmlns:m="http://schemas.openxmlformats.org/officeDocument/2006/math" xmlns="" val="1"/>
+              <ma14:wrappingTextBoxFlag xmlns="" xmlns:m="http://schemas.openxmlformats.org/officeDocument/2006/math" xmlns:a14="http://schemas.microsoft.com/office/drawing/2010/main" xmlns:ma14="http://schemas.microsoft.com/office/mac/drawingml/2011/main" val="1"/>
             </a:ext>
           </a:extLst>
         </p:spPr>
@@ -33318,7 +33325,7 @@
           </a:ln>
           <a:extLst>
             <a:ext uri="{C572A759-6A51-4108-AA02-DFA0A04FC94B}">
-              <ma14:wrappingTextBoxFlag xmlns:ma14="http://schemas.microsoft.com/office/mac/drawingml/2011/main" xmlns:a14="http://schemas.microsoft.com/office/drawing/2010/main" xmlns:m="http://schemas.openxmlformats.org/officeDocument/2006/math" xmlns="" val="1"/>
+              <ma14:wrappingTextBoxFlag xmlns="" xmlns:m="http://schemas.openxmlformats.org/officeDocument/2006/math" xmlns:a14="http://schemas.microsoft.com/office/drawing/2010/main" xmlns:ma14="http://schemas.microsoft.com/office/mac/drawingml/2011/main" val="1"/>
             </a:ext>
           </a:extLst>
         </p:spPr>
@@ -34088,7 +34095,7 @@
           </a:ln>
           <a:extLst>
             <a:ext uri="{C572A759-6A51-4108-AA02-DFA0A04FC94B}">
-              <ma14:wrappingTextBoxFlag xmlns:ma14="http://schemas.microsoft.com/office/mac/drawingml/2011/main" xmlns:a14="http://schemas.microsoft.com/office/drawing/2010/main" xmlns:m="http://schemas.openxmlformats.org/officeDocument/2006/math" xmlns="" val="1"/>
+              <ma14:wrappingTextBoxFlag xmlns="" xmlns:m="http://schemas.openxmlformats.org/officeDocument/2006/math" xmlns:a14="http://schemas.microsoft.com/office/drawing/2010/main" xmlns:ma14="http://schemas.microsoft.com/office/mac/drawingml/2011/main" val="1"/>
             </a:ext>
           </a:extLst>
         </p:spPr>
@@ -34123,7 +34130,7 @@
           </a:ln>
           <a:extLst>
             <a:ext uri="{C572A759-6A51-4108-AA02-DFA0A04FC94B}">
-              <ma14:wrappingTextBoxFlag xmlns:ma14="http://schemas.microsoft.com/office/mac/drawingml/2011/main" xmlns:a14="http://schemas.microsoft.com/office/drawing/2010/main" xmlns:m="http://schemas.openxmlformats.org/officeDocument/2006/math" xmlns="" val="1"/>
+              <ma14:wrappingTextBoxFlag xmlns="" xmlns:m="http://schemas.openxmlformats.org/officeDocument/2006/math" xmlns:a14="http://schemas.microsoft.com/office/drawing/2010/main" xmlns:ma14="http://schemas.microsoft.com/office/mac/drawingml/2011/main" val="1"/>
             </a:ext>
           </a:extLst>
         </p:spPr>
@@ -34158,7 +34165,7 @@
           </a:ln>
           <a:extLst>
             <a:ext uri="{C572A759-6A51-4108-AA02-DFA0A04FC94B}">
-              <ma14:wrappingTextBoxFlag xmlns:ma14="http://schemas.microsoft.com/office/mac/drawingml/2011/main" xmlns:a14="http://schemas.microsoft.com/office/drawing/2010/main" xmlns:m="http://schemas.openxmlformats.org/officeDocument/2006/math" xmlns="" val="1"/>
+              <ma14:wrappingTextBoxFlag xmlns="" xmlns:m="http://schemas.openxmlformats.org/officeDocument/2006/math" xmlns:a14="http://schemas.microsoft.com/office/drawing/2010/main" xmlns:ma14="http://schemas.microsoft.com/office/mac/drawingml/2011/main" val="1"/>
             </a:ext>
           </a:extLst>
         </p:spPr>

</xml_diff>